<commit_message>
Class diagram little fixed
</commit_message>
<xml_diff>
--- a/Auction Framework.pptx
+++ b/Auction Framework.pptx
@@ -1,27 +1,27 @@
 
 <file path=ppt/presentation.xml><?xml version="1.0" encoding="utf-8"?>
-<p:presentation xmlns:a="http://schemas.openxmlformats.org/drawingml/2006/main" xmlns:r="http://schemas.openxmlformats.org/officeDocument/2006/relationships" xmlns:mc="http://schemas.openxmlformats.org/markup-compatibility/2006" xmlns:mv="urn:schemas-microsoft-com:mac:vml" xmlns:p="http://schemas.openxmlformats.org/presentationml/2006/main" xmlns:c="http://schemas.openxmlformats.org/drawingml/2006/chart" xmlns:dgm="http://schemas.openxmlformats.org/drawingml/2006/diagram" xmlns:o="urn:schemas-microsoft-com:office:office" xmlns:v="urn:schemas-microsoft-com:vml" xmlns:pvml="urn:schemas-microsoft-com:office:powerpoint" xmlns:com="http://schemas.openxmlformats.org/drawingml/2006/compatibility" xmlns:p14="http://schemas.microsoft.com/office/powerpoint/2010/main" xmlns:p15="http://schemas.microsoft.com/office/powerpoint/2012/main" autoCompressPictures="0" strictFirstAndLastChars="0" saveSubsetFonts="1">
+<p:presentation xmlns:a="http://schemas.openxmlformats.org/drawingml/2006/main" xmlns:r="http://schemas.openxmlformats.org/officeDocument/2006/relationships" xmlns:p="http://schemas.openxmlformats.org/presentationml/2006/main" strictFirstAndLastChars="0" saveSubsetFonts="1" autoCompressPictures="0">
   <p:sldMasterIdLst>
-    <p:sldMasterId id="2147483659" r:id="rId4"/>
+    <p:sldMasterId id="2147483659" r:id="rId1"/>
   </p:sldMasterIdLst>
   <p:notesMasterIdLst>
-    <p:notesMasterId r:id="rId5"/>
+    <p:notesMasterId r:id="rId11"/>
   </p:notesMasterIdLst>
   <p:sldIdLst>
-    <p:sldId id="256" r:id="rId6"/>
-    <p:sldId id="257" r:id="rId7"/>
-    <p:sldId id="258" r:id="rId8"/>
-    <p:sldId id="259" r:id="rId9"/>
-    <p:sldId id="260" r:id="rId10"/>
-    <p:sldId id="261" r:id="rId11"/>
-    <p:sldId id="262" r:id="rId12"/>
-    <p:sldId id="263" r:id="rId13"/>
-    <p:sldId id="264" r:id="rId14"/>
+    <p:sldId id="256" r:id="rId2"/>
+    <p:sldId id="257" r:id="rId3"/>
+    <p:sldId id="258" r:id="rId4"/>
+    <p:sldId id="259" r:id="rId5"/>
+    <p:sldId id="260" r:id="rId6"/>
+    <p:sldId id="261" r:id="rId7"/>
+    <p:sldId id="262" r:id="rId8"/>
+    <p:sldId id="263" r:id="rId9"/>
+    <p:sldId id="264" r:id="rId10"/>
   </p:sldIdLst>
-  <p:sldSz cy="5143500" cx="9144000"/>
+  <p:sldSz cx="9144000" cy="5143500" type="screen16x9"/>
   <p:notesSz cx="6858000" cy="9144000"/>
   <p:defaultTextStyle>
-    <a:defPPr lvl="0" marR="0" rtl="0" algn="l">
+    <a:defPPr marR="0" lvl="0" algn="l" rtl="0">
       <a:lnSpc>
         <a:spcPct val="100000"/>
       </a:lnSpc>
@@ -32,7 +32,7 @@
         <a:spcPts val="0"/>
       </a:spcAft>
     </a:defPPr>
-    <a:lvl1pPr lvl="0" marR="0" rtl="0" algn="l">
+    <a:lvl1pPr marR="0" lvl="0" algn="l" rtl="0">
       <a:lnSpc>
         <a:spcPct val="100000"/>
       </a:lnSpc>
@@ -46,7 +46,7 @@
         <a:srgbClr val="000000"/>
       </a:buClr>
       <a:buFont typeface="Arial"/>
-      <a:defRPr b="0" i="0" sz="1400" u="none" cap="none" strike="noStrike">
+      <a:defRPr sz="1400" b="0" i="0" u="none" strike="noStrike" cap="none">
         <a:solidFill>
           <a:srgbClr val="000000"/>
         </a:solidFill>
@@ -56,7 +56,7 @@
         <a:sym typeface="Arial"/>
       </a:defRPr>
     </a:lvl1pPr>
-    <a:lvl2pPr lvl="1" marR="0" rtl="0" algn="l">
+    <a:lvl2pPr marR="0" lvl="1" algn="l" rtl="0">
       <a:lnSpc>
         <a:spcPct val="100000"/>
       </a:lnSpc>
@@ -70,7 +70,7 @@
         <a:srgbClr val="000000"/>
       </a:buClr>
       <a:buFont typeface="Arial"/>
-      <a:defRPr b="0" i="0" sz="1400" u="none" cap="none" strike="noStrike">
+      <a:defRPr sz="1400" b="0" i="0" u="none" strike="noStrike" cap="none">
         <a:solidFill>
           <a:srgbClr val="000000"/>
         </a:solidFill>
@@ -80,7 +80,7 @@
         <a:sym typeface="Arial"/>
       </a:defRPr>
     </a:lvl2pPr>
-    <a:lvl3pPr lvl="2" marR="0" rtl="0" algn="l">
+    <a:lvl3pPr marR="0" lvl="2" algn="l" rtl="0">
       <a:lnSpc>
         <a:spcPct val="100000"/>
       </a:lnSpc>
@@ -94,7 +94,7 @@
         <a:srgbClr val="000000"/>
       </a:buClr>
       <a:buFont typeface="Arial"/>
-      <a:defRPr b="0" i="0" sz="1400" u="none" cap="none" strike="noStrike">
+      <a:defRPr sz="1400" b="0" i="0" u="none" strike="noStrike" cap="none">
         <a:solidFill>
           <a:srgbClr val="000000"/>
         </a:solidFill>
@@ -104,7 +104,7 @@
         <a:sym typeface="Arial"/>
       </a:defRPr>
     </a:lvl3pPr>
-    <a:lvl4pPr lvl="3" marR="0" rtl="0" algn="l">
+    <a:lvl4pPr marR="0" lvl="3" algn="l" rtl="0">
       <a:lnSpc>
         <a:spcPct val="100000"/>
       </a:lnSpc>
@@ -118,7 +118,7 @@
         <a:srgbClr val="000000"/>
       </a:buClr>
       <a:buFont typeface="Arial"/>
-      <a:defRPr b="0" i="0" sz="1400" u="none" cap="none" strike="noStrike">
+      <a:defRPr sz="1400" b="0" i="0" u="none" strike="noStrike" cap="none">
         <a:solidFill>
           <a:srgbClr val="000000"/>
         </a:solidFill>
@@ -128,7 +128,7 @@
         <a:sym typeface="Arial"/>
       </a:defRPr>
     </a:lvl4pPr>
-    <a:lvl5pPr lvl="4" marR="0" rtl="0" algn="l">
+    <a:lvl5pPr marR="0" lvl="4" algn="l" rtl="0">
       <a:lnSpc>
         <a:spcPct val="100000"/>
       </a:lnSpc>
@@ -142,7 +142,7 @@
         <a:srgbClr val="000000"/>
       </a:buClr>
       <a:buFont typeface="Arial"/>
-      <a:defRPr b="0" i="0" sz="1400" u="none" cap="none" strike="noStrike">
+      <a:defRPr sz="1400" b="0" i="0" u="none" strike="noStrike" cap="none">
         <a:solidFill>
           <a:srgbClr val="000000"/>
         </a:solidFill>
@@ -152,7 +152,7 @@
         <a:sym typeface="Arial"/>
       </a:defRPr>
     </a:lvl5pPr>
-    <a:lvl6pPr lvl="5" marR="0" rtl="0" algn="l">
+    <a:lvl6pPr marR="0" lvl="5" algn="l" rtl="0">
       <a:lnSpc>
         <a:spcPct val="100000"/>
       </a:lnSpc>
@@ -166,7 +166,7 @@
         <a:srgbClr val="000000"/>
       </a:buClr>
       <a:buFont typeface="Arial"/>
-      <a:defRPr b="0" i="0" sz="1400" u="none" cap="none" strike="noStrike">
+      <a:defRPr sz="1400" b="0" i="0" u="none" strike="noStrike" cap="none">
         <a:solidFill>
           <a:srgbClr val="000000"/>
         </a:solidFill>
@@ -176,7 +176,7 @@
         <a:sym typeface="Arial"/>
       </a:defRPr>
     </a:lvl6pPr>
-    <a:lvl7pPr lvl="6" marR="0" rtl="0" algn="l">
+    <a:lvl7pPr marR="0" lvl="6" algn="l" rtl="0">
       <a:lnSpc>
         <a:spcPct val="100000"/>
       </a:lnSpc>
@@ -190,7 +190,7 @@
         <a:srgbClr val="000000"/>
       </a:buClr>
       <a:buFont typeface="Arial"/>
-      <a:defRPr b="0" i="0" sz="1400" u="none" cap="none" strike="noStrike">
+      <a:defRPr sz="1400" b="0" i="0" u="none" strike="noStrike" cap="none">
         <a:solidFill>
           <a:srgbClr val="000000"/>
         </a:solidFill>
@@ -200,7 +200,7 @@
         <a:sym typeface="Arial"/>
       </a:defRPr>
     </a:lvl7pPr>
-    <a:lvl8pPr lvl="7" marR="0" rtl="0" algn="l">
+    <a:lvl8pPr marR="0" lvl="7" algn="l" rtl="0">
       <a:lnSpc>
         <a:spcPct val="100000"/>
       </a:lnSpc>
@@ -214,7 +214,7 @@
         <a:srgbClr val="000000"/>
       </a:buClr>
       <a:buFont typeface="Arial"/>
-      <a:defRPr b="0" i="0" sz="1400" u="none" cap="none" strike="noStrike">
+      <a:defRPr sz="1400" b="0" i="0" u="none" strike="noStrike" cap="none">
         <a:solidFill>
           <a:srgbClr val="000000"/>
         </a:solidFill>
@@ -224,7 +224,7 @@
         <a:sym typeface="Arial"/>
       </a:defRPr>
     </a:lvl8pPr>
-    <a:lvl9pPr lvl="8" marR="0" rtl="0" algn="l">
+    <a:lvl9pPr marR="0" lvl="8" algn="l" rtl="0">
       <a:lnSpc>
         <a:spcPct val="100000"/>
       </a:lnSpc>
@@ -238,7 +238,7 @@
         <a:srgbClr val="000000"/>
       </a:buClr>
       <a:buFont typeface="Arial"/>
-      <a:defRPr b="0" i="0" sz="1400" u="none" cap="none" strike="noStrike">
+      <a:defRPr sz="1400" b="0" i="0" u="none" strike="noStrike" cap="none">
         <a:solidFill>
           <a:srgbClr val="000000"/>
         </a:solidFill>
@@ -251,7 +251,7 @@
   </p:defaultTextStyle>
   <p:extLst>
     <p:ext uri="{EFAFB233-063F-42B5-8137-9DF3F51BA10A}">
-      <p15:sldGuideLst>
+      <p15:sldGuideLst xmlns:p15="http://schemas.microsoft.com/office/powerpoint/2012/main">
         <p15:guide id="1" orient="horz" pos="1620">
           <p15:clr>
             <a:srgbClr val="A4A3A4"/>
@@ -269,11 +269,16 @@
 </file>
 
 <file path=ppt/notesMasters/notesMaster1.xml><?xml version="1.0" encoding="utf-8"?>
-<p:notesMaster xmlns:a="http://schemas.openxmlformats.org/drawingml/2006/main" xmlns:r="http://schemas.openxmlformats.org/officeDocument/2006/relationships" xmlns:mc="http://schemas.openxmlformats.org/markup-compatibility/2006" xmlns:mv="urn:schemas-microsoft-com:mac:vml" xmlns:p="http://schemas.openxmlformats.org/presentationml/2006/main" xmlns:c="http://schemas.openxmlformats.org/drawingml/2006/chart" xmlns:dgm="http://schemas.openxmlformats.org/drawingml/2006/diagram" xmlns:o="urn:schemas-microsoft-com:office:office" xmlns:v="urn:schemas-microsoft-com:vml" xmlns:pvml="urn:schemas-microsoft-com:office:powerpoint" xmlns:com="http://schemas.openxmlformats.org/drawingml/2006/compatibility" xmlns:p14="http://schemas.microsoft.com/office/powerpoint/2010/main" xmlns:p15="http://schemas.microsoft.com/office/powerpoint/2012/main">
+<p:notesMaster xmlns:a="http://schemas.openxmlformats.org/drawingml/2006/main" xmlns:r="http://schemas.openxmlformats.org/officeDocument/2006/relationships" xmlns:p="http://schemas.openxmlformats.org/presentationml/2006/main">
   <p:cSld>
+    <p:bg>
+      <p:bgRef idx="1001">
+        <a:schemeClr val="bg1"/>
+      </p:bgRef>
+    </p:bg>
     <p:spTree>
       <p:nvGrpSpPr>
-        <p:cNvPr id="2" name="Shape 2"/>
+        <p:cNvPr id="1" name="Shape 2"/>
         <p:cNvGrpSpPr/>
         <p:nvPr/>
       </p:nvGrpSpPr>
@@ -288,9 +293,11 @@
       <p:sp>
         <p:nvSpPr>
           <p:cNvPr id="3" name="Google Shape;3;n"/>
-          <p:cNvSpPr/>
+          <p:cNvSpPr>
+            <a:spLocks noGrp="1" noRot="1" noChangeAspect="1"/>
+          </p:cNvSpPr>
           <p:nvPr>
-            <p:ph idx="2" type="sldImg"/>
+            <p:ph type="sldImg" idx="2"/>
           </p:nvPr>
         </p:nvSpPr>
         <p:spPr>
@@ -299,9 +306,13 @@
             <a:ext cx="6096075" cy="3429000"/>
           </a:xfrm>
           <a:custGeom>
-            <a:rect b="b" l="l" r="r" t="t"/>
+            <a:avLst/>
+            <a:gdLst/>
+            <a:ahLst/>
+            <a:cxnLst/>
+            <a:rect l="l" t="t" r="r" b="b"/>
             <a:pathLst>
-              <a:path extrusionOk="0" h="120000" w="120000">
+              <a:path w="120000" h="120000" extrusionOk="0">
                 <a:moveTo>
                   <a:pt x="0" y="0"/>
                 </a:moveTo>
@@ -319,23 +330,25 @@
             </a:pathLst>
           </a:custGeom>
           <a:noFill/>
-          <a:ln cap="flat" cmpd="sng" w="9525">
+          <a:ln w="9525" cap="flat" cmpd="sng">
             <a:solidFill>
               <a:srgbClr val="000000"/>
             </a:solidFill>
             <a:prstDash val="solid"/>
             <a:round/>
-            <a:headEnd len="sm" w="sm" type="none"/>
-            <a:tailEnd len="sm" w="sm" type="none"/>
+            <a:headEnd type="none" w="sm" len="sm"/>
+            <a:tailEnd type="none" w="sm" len="sm"/>
           </a:ln>
         </p:spPr>
       </p:sp>
       <p:sp>
         <p:nvSpPr>
           <p:cNvPr id="4" name="Google Shape;4;n"/>
-          <p:cNvSpPr txBox="1"/>
+          <p:cNvSpPr txBox="1">
+            <a:spLocks noGrp="1"/>
+          </p:cNvSpPr>
           <p:nvPr>
-            <p:ph idx="1" type="body"/>
+            <p:ph type="body" idx="1"/>
           </p:nvPr>
         </p:nvSpPr>
         <p:spPr>
@@ -352,11 +365,11 @@
           </a:ln>
         </p:spPr>
         <p:txBody>
-          <a:bodyPr anchorCtr="0" anchor="t" bIns="91425" lIns="91425" spcFirstLastPara="1" rIns="91425" wrap="square" tIns="91425">
+          <a:bodyPr spcFirstLastPara="1" wrap="square" lIns="91425" tIns="91425" rIns="91425" bIns="91425" anchor="t" anchorCtr="0">
             <a:noAutofit/>
           </a:bodyPr>
           <a:lstStyle>
-            <a:lvl1pPr indent="-298450" lvl="0" marL="457200">
+            <a:lvl1pPr marL="457200" lvl="0" indent="-298450">
               <a:spcBef>
                 <a:spcPts val="0"/>
               </a:spcBef>
@@ -367,7 +380,7 @@
               <a:buChar char="●"/>
               <a:defRPr sz="1100"/>
             </a:lvl1pPr>
-            <a:lvl2pPr indent="-298450" lvl="1" marL="914400">
+            <a:lvl2pPr marL="914400" lvl="1" indent="-298450">
               <a:spcBef>
                 <a:spcPts val="0"/>
               </a:spcBef>
@@ -378,7 +391,7 @@
               <a:buChar char="○"/>
               <a:defRPr sz="1100"/>
             </a:lvl2pPr>
-            <a:lvl3pPr indent="-298450" lvl="2" marL="1371600">
+            <a:lvl3pPr marL="1371600" lvl="2" indent="-298450">
               <a:spcBef>
                 <a:spcPts val="0"/>
               </a:spcBef>
@@ -389,7 +402,7 @@
               <a:buChar char="■"/>
               <a:defRPr sz="1100"/>
             </a:lvl3pPr>
-            <a:lvl4pPr indent="-298450" lvl="3" marL="1828800">
+            <a:lvl4pPr marL="1828800" lvl="3" indent="-298450">
               <a:spcBef>
                 <a:spcPts val="0"/>
               </a:spcBef>
@@ -400,7 +413,7 @@
               <a:buChar char="●"/>
               <a:defRPr sz="1100"/>
             </a:lvl4pPr>
-            <a:lvl5pPr indent="-298450" lvl="4" marL="2286000">
+            <a:lvl5pPr marL="2286000" lvl="4" indent="-298450">
               <a:spcBef>
                 <a:spcPts val="0"/>
               </a:spcBef>
@@ -411,7 +424,7 @@
               <a:buChar char="○"/>
               <a:defRPr sz="1100"/>
             </a:lvl5pPr>
-            <a:lvl6pPr indent="-298450" lvl="5" marL="2743200">
+            <a:lvl6pPr marL="2743200" lvl="5" indent="-298450">
               <a:spcBef>
                 <a:spcPts val="0"/>
               </a:spcBef>
@@ -422,7 +435,7 @@
               <a:buChar char="■"/>
               <a:defRPr sz="1100"/>
             </a:lvl6pPr>
-            <a:lvl7pPr indent="-298450" lvl="6" marL="3200400">
+            <a:lvl7pPr marL="3200400" lvl="6" indent="-298450">
               <a:spcBef>
                 <a:spcPts val="0"/>
               </a:spcBef>
@@ -433,7 +446,7 @@
               <a:buChar char="●"/>
               <a:defRPr sz="1100"/>
             </a:lvl7pPr>
-            <a:lvl8pPr indent="-298450" lvl="7" marL="3657600">
+            <a:lvl8pPr marL="3657600" lvl="7" indent="-298450">
               <a:spcBef>
                 <a:spcPts val="0"/>
               </a:spcBef>
@@ -444,7 +457,7 @@
               <a:buChar char="○"/>
               <a:defRPr sz="1100"/>
             </a:lvl8pPr>
-            <a:lvl9pPr indent="-298450" lvl="8" marL="4114800">
+            <a:lvl9pPr marL="4114800" lvl="8" indent="-298450">
               <a:spcBef>
                 <a:spcPts val="0"/>
               </a:spcBef>
@@ -456,14 +469,16 @@
               <a:defRPr sz="1100"/>
             </a:lvl9pPr>
           </a:lstStyle>
-          <a:p/>
+          <a:p>
+            <a:endParaRPr/>
+          </a:p>
         </p:txBody>
       </p:sp>
     </p:spTree>
   </p:cSld>
-  <p:clrMap accent1="accent1" accent2="accent2" accent3="accent3" accent4="accent4" accent5="accent5" accent6="accent6" bg1="lt1" bg2="dk2" tx1="dk1" tx2="lt2" folHlink="folHlink" hlink="hlink"/>
+  <p:clrMap bg1="lt1" tx1="dk1" bg2="dk2" tx2="lt2" accent1="accent1" accent2="accent2" accent3="accent3" accent4="accent4" accent5="accent5" accent6="accent6" hlink="hlink" folHlink="folHlink"/>
   <p:notesStyle>
-    <a:defPPr lvl="0" marR="0" rtl="0" algn="l">
+    <a:defPPr marR="0" lvl="0" algn="l" rtl="0">
       <a:lnSpc>
         <a:spcPct val="100000"/>
       </a:lnSpc>
@@ -474,7 +489,7 @@
         <a:spcPts val="0"/>
       </a:spcAft>
     </a:defPPr>
-    <a:lvl1pPr lvl="0" marR="0" rtl="0" algn="l">
+    <a:lvl1pPr marR="0" lvl="0" algn="l" rtl="0">
       <a:lnSpc>
         <a:spcPct val="100000"/>
       </a:lnSpc>
@@ -488,7 +503,7 @@
         <a:srgbClr val="000000"/>
       </a:buClr>
       <a:buFont typeface="Arial"/>
-      <a:defRPr b="0" i="0" sz="1400" u="none" cap="none" strike="noStrike">
+      <a:defRPr sz="1400" b="0" i="0" u="none" strike="noStrike" cap="none">
         <a:solidFill>
           <a:srgbClr val="000000"/>
         </a:solidFill>
@@ -498,7 +513,7 @@
         <a:sym typeface="Arial"/>
       </a:defRPr>
     </a:lvl1pPr>
-    <a:lvl2pPr lvl="1" marR="0" rtl="0" algn="l">
+    <a:lvl2pPr marR="0" lvl="1" algn="l" rtl="0">
       <a:lnSpc>
         <a:spcPct val="100000"/>
       </a:lnSpc>
@@ -512,7 +527,7 @@
         <a:srgbClr val="000000"/>
       </a:buClr>
       <a:buFont typeface="Arial"/>
-      <a:defRPr b="0" i="0" sz="1400" u="none" cap="none" strike="noStrike">
+      <a:defRPr sz="1400" b="0" i="0" u="none" strike="noStrike" cap="none">
         <a:solidFill>
           <a:srgbClr val="000000"/>
         </a:solidFill>
@@ -522,7 +537,7 @@
         <a:sym typeface="Arial"/>
       </a:defRPr>
     </a:lvl2pPr>
-    <a:lvl3pPr lvl="2" marR="0" rtl="0" algn="l">
+    <a:lvl3pPr marR="0" lvl="2" algn="l" rtl="0">
       <a:lnSpc>
         <a:spcPct val="100000"/>
       </a:lnSpc>
@@ -536,7 +551,7 @@
         <a:srgbClr val="000000"/>
       </a:buClr>
       <a:buFont typeface="Arial"/>
-      <a:defRPr b="0" i="0" sz="1400" u="none" cap="none" strike="noStrike">
+      <a:defRPr sz="1400" b="0" i="0" u="none" strike="noStrike" cap="none">
         <a:solidFill>
           <a:srgbClr val="000000"/>
         </a:solidFill>
@@ -546,7 +561,7 @@
         <a:sym typeface="Arial"/>
       </a:defRPr>
     </a:lvl3pPr>
-    <a:lvl4pPr lvl="3" marR="0" rtl="0" algn="l">
+    <a:lvl4pPr marR="0" lvl="3" algn="l" rtl="0">
       <a:lnSpc>
         <a:spcPct val="100000"/>
       </a:lnSpc>
@@ -560,7 +575,7 @@
         <a:srgbClr val="000000"/>
       </a:buClr>
       <a:buFont typeface="Arial"/>
-      <a:defRPr b="0" i="0" sz="1400" u="none" cap="none" strike="noStrike">
+      <a:defRPr sz="1400" b="0" i="0" u="none" strike="noStrike" cap="none">
         <a:solidFill>
           <a:srgbClr val="000000"/>
         </a:solidFill>
@@ -570,7 +585,7 @@
         <a:sym typeface="Arial"/>
       </a:defRPr>
     </a:lvl4pPr>
-    <a:lvl5pPr lvl="4" marR="0" rtl="0" algn="l">
+    <a:lvl5pPr marR="0" lvl="4" algn="l" rtl="0">
       <a:lnSpc>
         <a:spcPct val="100000"/>
       </a:lnSpc>
@@ -584,7 +599,7 @@
         <a:srgbClr val="000000"/>
       </a:buClr>
       <a:buFont typeface="Arial"/>
-      <a:defRPr b="0" i="0" sz="1400" u="none" cap="none" strike="noStrike">
+      <a:defRPr sz="1400" b="0" i="0" u="none" strike="noStrike" cap="none">
         <a:solidFill>
           <a:srgbClr val="000000"/>
         </a:solidFill>
@@ -594,7 +609,7 @@
         <a:sym typeface="Arial"/>
       </a:defRPr>
     </a:lvl5pPr>
-    <a:lvl6pPr lvl="5" marR="0" rtl="0" algn="l">
+    <a:lvl6pPr marR="0" lvl="5" algn="l" rtl="0">
       <a:lnSpc>
         <a:spcPct val="100000"/>
       </a:lnSpc>
@@ -608,7 +623,7 @@
         <a:srgbClr val="000000"/>
       </a:buClr>
       <a:buFont typeface="Arial"/>
-      <a:defRPr b="0" i="0" sz="1400" u="none" cap="none" strike="noStrike">
+      <a:defRPr sz="1400" b="0" i="0" u="none" strike="noStrike" cap="none">
         <a:solidFill>
           <a:srgbClr val="000000"/>
         </a:solidFill>
@@ -618,7 +633,7 @@
         <a:sym typeface="Arial"/>
       </a:defRPr>
     </a:lvl6pPr>
-    <a:lvl7pPr lvl="6" marR="0" rtl="0" algn="l">
+    <a:lvl7pPr marR="0" lvl="6" algn="l" rtl="0">
       <a:lnSpc>
         <a:spcPct val="100000"/>
       </a:lnSpc>
@@ -632,7 +647,7 @@
         <a:srgbClr val="000000"/>
       </a:buClr>
       <a:buFont typeface="Arial"/>
-      <a:defRPr b="0" i="0" sz="1400" u="none" cap="none" strike="noStrike">
+      <a:defRPr sz="1400" b="0" i="0" u="none" strike="noStrike" cap="none">
         <a:solidFill>
           <a:srgbClr val="000000"/>
         </a:solidFill>
@@ -642,7 +657,7 @@
         <a:sym typeface="Arial"/>
       </a:defRPr>
     </a:lvl7pPr>
-    <a:lvl8pPr lvl="7" marR="0" rtl="0" algn="l">
+    <a:lvl8pPr marR="0" lvl="7" algn="l" rtl="0">
       <a:lnSpc>
         <a:spcPct val="100000"/>
       </a:lnSpc>
@@ -656,7 +671,7 @@
         <a:srgbClr val="000000"/>
       </a:buClr>
       <a:buFont typeface="Arial"/>
-      <a:defRPr b="0" i="0" sz="1400" u="none" cap="none" strike="noStrike">
+      <a:defRPr sz="1400" b="0" i="0" u="none" strike="noStrike" cap="none">
         <a:solidFill>
           <a:srgbClr val="000000"/>
         </a:solidFill>
@@ -666,7 +681,7 @@
         <a:sym typeface="Arial"/>
       </a:defRPr>
     </a:lvl8pPr>
-    <a:lvl9pPr lvl="8" marR="0" rtl="0" algn="l">
+    <a:lvl9pPr marR="0" lvl="8" algn="l" rtl="0">
       <a:lnSpc>
         <a:spcPct val="100000"/>
       </a:lnSpc>
@@ -680,7 +695,7 @@
         <a:srgbClr val="000000"/>
       </a:buClr>
       <a:buFont typeface="Arial"/>
-      <a:defRPr b="0" i="0" sz="1400" u="none" cap="none" strike="noStrike">
+      <a:defRPr sz="1400" b="0" i="0" u="none" strike="noStrike" cap="none">
         <a:solidFill>
           <a:srgbClr val="000000"/>
         </a:solidFill>
@@ -695,11 +710,11 @@
 </file>
 
 <file path=ppt/notesSlides/notesSlide1.xml><?xml version="1.0" encoding="utf-8"?>
-<p:notes xmlns:a="http://schemas.openxmlformats.org/drawingml/2006/main" xmlns:r="http://schemas.openxmlformats.org/officeDocument/2006/relationships" xmlns:mc="http://schemas.openxmlformats.org/markup-compatibility/2006" xmlns:mv="urn:schemas-microsoft-com:mac:vml" xmlns:p="http://schemas.openxmlformats.org/presentationml/2006/main" xmlns:c="http://schemas.openxmlformats.org/drawingml/2006/chart" xmlns:dgm="http://schemas.openxmlformats.org/drawingml/2006/diagram" xmlns:o="urn:schemas-microsoft-com:office:office" xmlns:v="urn:schemas-microsoft-com:vml" xmlns:pvml="urn:schemas-microsoft-com:office:powerpoint" xmlns:com="http://schemas.openxmlformats.org/drawingml/2006/compatibility" xmlns:p14="http://schemas.microsoft.com/office/powerpoint/2010/main" xmlns:p15="http://schemas.microsoft.com/office/powerpoint/2012/main" showMasterPhAnim="0" showMasterSp="0">
+<p:notes xmlns:a="http://schemas.openxmlformats.org/drawingml/2006/main" xmlns:r="http://schemas.openxmlformats.org/officeDocument/2006/relationships" xmlns:p="http://schemas.openxmlformats.org/presentationml/2006/main" showMasterSp="0" showMasterPhAnim="0">
   <p:cSld>
     <p:spTree>
       <p:nvGrpSpPr>
-        <p:cNvPr id="50" name="Shape 50"/>
+        <p:cNvPr id="1" name="Shape 50"/>
         <p:cNvGrpSpPr/>
         <p:nvPr/>
       </p:nvGrpSpPr>
@@ -714,9 +729,11 @@
       <p:sp>
         <p:nvSpPr>
           <p:cNvPr id="51" name="Google Shape;51;p:notes"/>
-          <p:cNvSpPr/>
+          <p:cNvSpPr>
+            <a:spLocks noGrp="1" noRot="1" noChangeAspect="1"/>
+          </p:cNvSpPr>
           <p:nvPr>
-            <p:ph idx="2" type="sldImg"/>
+            <p:ph type="sldImg" idx="2"/>
           </p:nvPr>
         </p:nvSpPr>
         <p:spPr>
@@ -725,9 +742,13 @@
             <a:ext cx="6096075" cy="3429000"/>
           </a:xfrm>
           <a:custGeom>
-            <a:rect b="b" l="l" r="r" t="t"/>
+            <a:avLst/>
+            <a:gdLst/>
+            <a:ahLst/>
+            <a:cxnLst/>
+            <a:rect l="l" t="t" r="r" b="b"/>
             <a:pathLst>
-              <a:path extrusionOk="0" h="120000" w="120000">
+              <a:path w="120000" h="120000" extrusionOk="0">
                 <a:moveTo>
                   <a:pt x="0" y="0"/>
                 </a:moveTo>
@@ -749,9 +770,11 @@
       <p:sp>
         <p:nvSpPr>
           <p:cNvPr id="52" name="Google Shape;52;p:notes"/>
-          <p:cNvSpPr txBox="1"/>
+          <p:cNvSpPr txBox="1">
+            <a:spLocks noGrp="1"/>
+          </p:cNvSpPr>
           <p:nvPr>
-            <p:ph idx="1" type="body"/>
+            <p:ph type="body" idx="1"/>
           </p:nvPr>
         </p:nvSpPr>
         <p:spPr>
@@ -764,12 +787,12 @@
           </a:prstGeom>
         </p:spPr>
         <p:txBody>
-          <a:bodyPr anchorCtr="0" anchor="t" bIns="91425" lIns="91425" spcFirstLastPara="1" rIns="91425" wrap="square" tIns="91425">
+          <a:bodyPr spcFirstLastPara="1" wrap="square" lIns="91425" tIns="91425" rIns="91425" bIns="91425" anchor="t" anchorCtr="0">
             <a:noAutofit/>
           </a:bodyPr>
           <a:lstStyle/>
           <a:p>
-            <a:pPr indent="0" lvl="0" marL="0" rtl="0" algn="l">
+            <a:pPr marL="0" lvl="0" indent="0" algn="l" rtl="0">
               <a:spcBef>
                 <a:spcPts val="0"/>
               </a:spcBef>
@@ -778,9 +801,6 @@
               </a:spcAft>
               <a:buNone/>
             </a:pPr>
-            <a:r>
-              <a:t/>
-            </a:r>
             <a:endParaRPr/>
           </a:p>
         </p:txBody>
@@ -794,11 +814,11 @@
 </file>
 
 <file path=ppt/notesSlides/notesSlide2.xml><?xml version="1.0" encoding="utf-8"?>
-<p:notes xmlns:a="http://schemas.openxmlformats.org/drawingml/2006/main" xmlns:r="http://schemas.openxmlformats.org/officeDocument/2006/relationships" xmlns:mc="http://schemas.openxmlformats.org/markup-compatibility/2006" xmlns:mv="urn:schemas-microsoft-com:mac:vml" xmlns:p="http://schemas.openxmlformats.org/presentationml/2006/main" xmlns:c="http://schemas.openxmlformats.org/drawingml/2006/chart" xmlns:dgm="http://schemas.openxmlformats.org/drawingml/2006/diagram" xmlns:o="urn:schemas-microsoft-com:office:office" xmlns:v="urn:schemas-microsoft-com:vml" xmlns:pvml="urn:schemas-microsoft-com:office:powerpoint" xmlns:com="http://schemas.openxmlformats.org/drawingml/2006/compatibility" xmlns:p14="http://schemas.microsoft.com/office/powerpoint/2010/main" xmlns:p15="http://schemas.microsoft.com/office/powerpoint/2012/main" showMasterPhAnim="0" showMasterSp="0">
+<p:notes xmlns:a="http://schemas.openxmlformats.org/drawingml/2006/main" xmlns:r="http://schemas.openxmlformats.org/officeDocument/2006/relationships" xmlns:p="http://schemas.openxmlformats.org/presentationml/2006/main" showMasterSp="0" showMasterPhAnim="0">
   <p:cSld>
     <p:spTree>
       <p:nvGrpSpPr>
-        <p:cNvPr id="57" name="Shape 57"/>
+        <p:cNvPr id="1" name="Shape 57"/>
         <p:cNvGrpSpPr/>
         <p:nvPr/>
       </p:nvGrpSpPr>
@@ -813,9 +833,11 @@
       <p:sp>
         <p:nvSpPr>
           <p:cNvPr id="58" name="Google Shape;58;g5f0eb93fbc_0_0:notes"/>
-          <p:cNvSpPr/>
+          <p:cNvSpPr>
+            <a:spLocks noGrp="1" noRot="1" noChangeAspect="1"/>
+          </p:cNvSpPr>
           <p:nvPr>
-            <p:ph idx="2" type="sldImg"/>
+            <p:ph type="sldImg" idx="2"/>
           </p:nvPr>
         </p:nvSpPr>
         <p:spPr>
@@ -824,9 +846,13 @@
             <a:ext cx="6096000" cy="3429000"/>
           </a:xfrm>
           <a:custGeom>
-            <a:rect b="b" l="l" r="r" t="t"/>
+            <a:avLst/>
+            <a:gdLst/>
+            <a:ahLst/>
+            <a:cxnLst/>
+            <a:rect l="l" t="t" r="r" b="b"/>
             <a:pathLst>
-              <a:path extrusionOk="0" h="120000" w="120000">
+              <a:path w="120000" h="120000" extrusionOk="0">
                 <a:moveTo>
                   <a:pt x="0" y="0"/>
                 </a:moveTo>
@@ -848,9 +874,11 @@
       <p:sp>
         <p:nvSpPr>
           <p:cNvPr id="59" name="Google Shape;59;g5f0eb93fbc_0_0:notes"/>
-          <p:cNvSpPr txBox="1"/>
+          <p:cNvSpPr txBox="1">
+            <a:spLocks noGrp="1"/>
+          </p:cNvSpPr>
           <p:nvPr>
-            <p:ph idx="1" type="body"/>
+            <p:ph type="body" idx="1"/>
           </p:nvPr>
         </p:nvSpPr>
         <p:spPr>
@@ -863,12 +891,12 @@
           </a:prstGeom>
         </p:spPr>
         <p:txBody>
-          <a:bodyPr anchorCtr="0" anchor="t" bIns="91425" lIns="91425" spcFirstLastPara="1" rIns="91425" wrap="square" tIns="91425">
+          <a:bodyPr spcFirstLastPara="1" wrap="square" lIns="91425" tIns="91425" rIns="91425" bIns="91425" anchor="t" anchorCtr="0">
             <a:noAutofit/>
           </a:bodyPr>
           <a:lstStyle/>
           <a:p>
-            <a:pPr indent="0" lvl="0" marL="0" rtl="0" algn="l">
+            <a:pPr marL="0" lvl="0" indent="0" algn="l" rtl="0">
               <a:spcBef>
                 <a:spcPts val="0"/>
               </a:spcBef>
@@ -877,9 +905,6 @@
               </a:spcAft>
               <a:buNone/>
             </a:pPr>
-            <a:r>
-              <a:t/>
-            </a:r>
             <a:endParaRPr/>
           </a:p>
         </p:txBody>
@@ -893,11 +918,11 @@
 </file>
 
 <file path=ppt/notesSlides/notesSlide3.xml><?xml version="1.0" encoding="utf-8"?>
-<p:notes xmlns:a="http://schemas.openxmlformats.org/drawingml/2006/main" xmlns:r="http://schemas.openxmlformats.org/officeDocument/2006/relationships" xmlns:mc="http://schemas.openxmlformats.org/markup-compatibility/2006" xmlns:mv="urn:schemas-microsoft-com:mac:vml" xmlns:p="http://schemas.openxmlformats.org/presentationml/2006/main" xmlns:c="http://schemas.openxmlformats.org/drawingml/2006/chart" xmlns:dgm="http://schemas.openxmlformats.org/drawingml/2006/diagram" xmlns:o="urn:schemas-microsoft-com:office:office" xmlns:v="urn:schemas-microsoft-com:vml" xmlns:pvml="urn:schemas-microsoft-com:office:powerpoint" xmlns:com="http://schemas.openxmlformats.org/drawingml/2006/compatibility" xmlns:p14="http://schemas.microsoft.com/office/powerpoint/2010/main" xmlns:p15="http://schemas.microsoft.com/office/powerpoint/2012/main" showMasterPhAnim="0" showMasterSp="0">
+<p:notes xmlns:a="http://schemas.openxmlformats.org/drawingml/2006/main" xmlns:r="http://schemas.openxmlformats.org/officeDocument/2006/relationships" xmlns:p="http://schemas.openxmlformats.org/presentationml/2006/main" showMasterSp="0" showMasterPhAnim="0">
   <p:cSld>
     <p:spTree>
       <p:nvGrpSpPr>
-        <p:cNvPr id="63" name="Shape 63"/>
+        <p:cNvPr id="1" name="Shape 63"/>
         <p:cNvGrpSpPr/>
         <p:nvPr/>
       </p:nvGrpSpPr>
@@ -912,9 +937,11 @@
       <p:sp>
         <p:nvSpPr>
           <p:cNvPr id="64" name="Google Shape;64;g5f11c5a84e_0_26:notes"/>
-          <p:cNvSpPr/>
+          <p:cNvSpPr>
+            <a:spLocks noGrp="1" noRot="1" noChangeAspect="1"/>
+          </p:cNvSpPr>
           <p:nvPr>
-            <p:ph idx="2" type="sldImg"/>
+            <p:ph type="sldImg" idx="2"/>
           </p:nvPr>
         </p:nvSpPr>
         <p:spPr>
@@ -923,9 +950,13 @@
             <a:ext cx="6096000" cy="3429000"/>
           </a:xfrm>
           <a:custGeom>
-            <a:rect b="b" l="l" r="r" t="t"/>
+            <a:avLst/>
+            <a:gdLst/>
+            <a:ahLst/>
+            <a:cxnLst/>
+            <a:rect l="l" t="t" r="r" b="b"/>
             <a:pathLst>
-              <a:path extrusionOk="0" h="120000" w="120000">
+              <a:path w="120000" h="120000" extrusionOk="0">
                 <a:moveTo>
                   <a:pt x="0" y="0"/>
                 </a:moveTo>
@@ -947,9 +978,11 @@
       <p:sp>
         <p:nvSpPr>
           <p:cNvPr id="65" name="Google Shape;65;g5f11c5a84e_0_26:notes"/>
-          <p:cNvSpPr txBox="1"/>
+          <p:cNvSpPr txBox="1">
+            <a:spLocks noGrp="1"/>
+          </p:cNvSpPr>
           <p:nvPr>
-            <p:ph idx="1" type="body"/>
+            <p:ph type="body" idx="1"/>
           </p:nvPr>
         </p:nvSpPr>
         <p:spPr>
@@ -962,12 +995,12 @@
           </a:prstGeom>
         </p:spPr>
         <p:txBody>
-          <a:bodyPr anchorCtr="0" anchor="t" bIns="91425" lIns="91425" spcFirstLastPara="1" rIns="91425" wrap="square" tIns="91425">
+          <a:bodyPr spcFirstLastPara="1" wrap="square" lIns="91425" tIns="91425" rIns="91425" bIns="91425" anchor="t" anchorCtr="0">
             <a:noAutofit/>
           </a:bodyPr>
           <a:lstStyle/>
           <a:p>
-            <a:pPr indent="0" lvl="0" marL="0" rtl="0" algn="l">
+            <a:pPr marL="0" lvl="0" indent="0" algn="l" rtl="0">
               <a:spcBef>
                 <a:spcPts val="0"/>
               </a:spcBef>
@@ -976,9 +1009,6 @@
               </a:spcAft>
               <a:buNone/>
             </a:pPr>
-            <a:r>
-              <a:t/>
-            </a:r>
             <a:endParaRPr/>
           </a:p>
         </p:txBody>
@@ -992,11 +1022,11 @@
 </file>
 
 <file path=ppt/notesSlides/notesSlide4.xml><?xml version="1.0" encoding="utf-8"?>
-<p:notes xmlns:a="http://schemas.openxmlformats.org/drawingml/2006/main" xmlns:r="http://schemas.openxmlformats.org/officeDocument/2006/relationships" xmlns:mc="http://schemas.openxmlformats.org/markup-compatibility/2006" xmlns:mv="urn:schemas-microsoft-com:mac:vml" xmlns:p="http://schemas.openxmlformats.org/presentationml/2006/main" xmlns:c="http://schemas.openxmlformats.org/drawingml/2006/chart" xmlns:dgm="http://schemas.openxmlformats.org/drawingml/2006/diagram" xmlns:o="urn:schemas-microsoft-com:office:office" xmlns:v="urn:schemas-microsoft-com:vml" xmlns:pvml="urn:schemas-microsoft-com:office:powerpoint" xmlns:com="http://schemas.openxmlformats.org/drawingml/2006/compatibility" xmlns:p14="http://schemas.microsoft.com/office/powerpoint/2010/main" xmlns:p15="http://schemas.microsoft.com/office/powerpoint/2012/main" showMasterPhAnim="0" showMasterSp="0">
+<p:notes xmlns:a="http://schemas.openxmlformats.org/drawingml/2006/main" xmlns:r="http://schemas.openxmlformats.org/officeDocument/2006/relationships" xmlns:p="http://schemas.openxmlformats.org/presentationml/2006/main" showMasterSp="0" showMasterPhAnim="0">
   <p:cSld>
     <p:spTree>
       <p:nvGrpSpPr>
-        <p:cNvPr id="70" name="Shape 70"/>
+        <p:cNvPr id="1" name="Shape 70"/>
         <p:cNvGrpSpPr/>
         <p:nvPr/>
       </p:nvGrpSpPr>
@@ -1011,9 +1041,11 @@
       <p:sp>
         <p:nvSpPr>
           <p:cNvPr id="71" name="Google Shape;71;g5f11c5a84e_0_11:notes"/>
-          <p:cNvSpPr/>
+          <p:cNvSpPr>
+            <a:spLocks noGrp="1" noRot="1" noChangeAspect="1"/>
+          </p:cNvSpPr>
           <p:nvPr>
-            <p:ph idx="2" type="sldImg"/>
+            <p:ph type="sldImg" idx="2"/>
           </p:nvPr>
         </p:nvSpPr>
         <p:spPr>
@@ -1022,9 +1054,13 @@
             <a:ext cx="6096000" cy="3429000"/>
           </a:xfrm>
           <a:custGeom>
-            <a:rect b="b" l="l" r="r" t="t"/>
+            <a:avLst/>
+            <a:gdLst/>
+            <a:ahLst/>
+            <a:cxnLst/>
+            <a:rect l="l" t="t" r="r" b="b"/>
             <a:pathLst>
-              <a:path extrusionOk="0" h="120000" w="120000">
+              <a:path w="120000" h="120000" extrusionOk="0">
                 <a:moveTo>
                   <a:pt x="0" y="0"/>
                 </a:moveTo>
@@ -1046,9 +1082,11 @@
       <p:sp>
         <p:nvSpPr>
           <p:cNvPr id="72" name="Google Shape;72;g5f11c5a84e_0_11:notes"/>
-          <p:cNvSpPr txBox="1"/>
+          <p:cNvSpPr txBox="1">
+            <a:spLocks noGrp="1"/>
+          </p:cNvSpPr>
           <p:nvPr>
-            <p:ph idx="1" type="body"/>
+            <p:ph type="body" idx="1"/>
           </p:nvPr>
         </p:nvSpPr>
         <p:spPr>
@@ -1061,12 +1099,12 @@
           </a:prstGeom>
         </p:spPr>
         <p:txBody>
-          <a:bodyPr anchorCtr="0" anchor="t" bIns="91425" lIns="91425" spcFirstLastPara="1" rIns="91425" wrap="square" tIns="91425">
+          <a:bodyPr spcFirstLastPara="1" wrap="square" lIns="91425" tIns="91425" rIns="91425" bIns="91425" anchor="t" anchorCtr="0">
             <a:noAutofit/>
           </a:bodyPr>
           <a:lstStyle/>
           <a:p>
-            <a:pPr indent="0" lvl="0" marL="0" rtl="0" algn="l">
+            <a:pPr marL="0" lvl="0" indent="0" algn="l" rtl="0">
               <a:spcBef>
                 <a:spcPts val="0"/>
               </a:spcBef>
@@ -1075,9 +1113,6 @@
               </a:spcAft>
               <a:buNone/>
             </a:pPr>
-            <a:r>
-              <a:t/>
-            </a:r>
             <a:endParaRPr/>
           </a:p>
         </p:txBody>
@@ -1091,11 +1126,11 @@
 </file>
 
 <file path=ppt/notesSlides/notesSlide5.xml><?xml version="1.0" encoding="utf-8"?>
-<p:notes xmlns:a="http://schemas.openxmlformats.org/drawingml/2006/main" xmlns:r="http://schemas.openxmlformats.org/officeDocument/2006/relationships" xmlns:mc="http://schemas.openxmlformats.org/markup-compatibility/2006" xmlns:mv="urn:schemas-microsoft-com:mac:vml" xmlns:p="http://schemas.openxmlformats.org/presentationml/2006/main" xmlns:c="http://schemas.openxmlformats.org/drawingml/2006/chart" xmlns:dgm="http://schemas.openxmlformats.org/drawingml/2006/diagram" xmlns:o="urn:schemas-microsoft-com:office:office" xmlns:v="urn:schemas-microsoft-com:vml" xmlns:pvml="urn:schemas-microsoft-com:office:powerpoint" xmlns:com="http://schemas.openxmlformats.org/drawingml/2006/compatibility" xmlns:p14="http://schemas.microsoft.com/office/powerpoint/2010/main" xmlns:p15="http://schemas.microsoft.com/office/powerpoint/2012/main" showMasterPhAnim="0" showMasterSp="0">
+<p:notes xmlns:a="http://schemas.openxmlformats.org/drawingml/2006/main" xmlns:r="http://schemas.openxmlformats.org/officeDocument/2006/relationships" xmlns:p="http://schemas.openxmlformats.org/presentationml/2006/main" showMasterSp="0" showMasterPhAnim="0">
   <p:cSld>
     <p:spTree>
       <p:nvGrpSpPr>
-        <p:cNvPr id="77" name="Shape 77"/>
+        <p:cNvPr id="1" name="Shape 77"/>
         <p:cNvGrpSpPr/>
         <p:nvPr/>
       </p:nvGrpSpPr>
@@ -1110,20 +1145,26 @@
       <p:sp>
         <p:nvSpPr>
           <p:cNvPr id="78" name="Google Shape;78;g5f11c5a84e_0_0:notes"/>
-          <p:cNvSpPr/>
+          <p:cNvSpPr>
+            <a:spLocks noGrp="1" noRot="1" noChangeAspect="1"/>
+          </p:cNvSpPr>
           <p:nvPr>
-            <p:ph idx="2" type="sldImg"/>
+            <p:ph type="sldImg" idx="2"/>
           </p:nvPr>
         </p:nvSpPr>
         <p:spPr>
           <a:xfrm>
-            <a:off x="381300" y="685800"/>
+            <a:off x="381000" y="685800"/>
             <a:ext cx="6096000" cy="3429000"/>
           </a:xfrm>
           <a:custGeom>
-            <a:rect b="b" l="l" r="r" t="t"/>
+            <a:avLst/>
+            <a:gdLst/>
+            <a:ahLst/>
+            <a:cxnLst/>
+            <a:rect l="l" t="t" r="r" b="b"/>
             <a:pathLst>
-              <a:path extrusionOk="0" h="120000" w="120000">
+              <a:path w="120000" h="120000" extrusionOk="0">
                 <a:moveTo>
                   <a:pt x="0" y="0"/>
                 </a:moveTo>
@@ -1145,9 +1186,11 @@
       <p:sp>
         <p:nvSpPr>
           <p:cNvPr id="79" name="Google Shape;79;g5f11c5a84e_0_0:notes"/>
-          <p:cNvSpPr txBox="1"/>
+          <p:cNvSpPr txBox="1">
+            <a:spLocks noGrp="1"/>
+          </p:cNvSpPr>
           <p:nvPr>
-            <p:ph idx="1" type="body"/>
+            <p:ph type="body" idx="1"/>
           </p:nvPr>
         </p:nvSpPr>
         <p:spPr>
@@ -1160,12 +1203,12 @@
           </a:prstGeom>
         </p:spPr>
         <p:txBody>
-          <a:bodyPr anchorCtr="0" anchor="t" bIns="91425" lIns="91425" spcFirstLastPara="1" rIns="91425" wrap="square" tIns="91425">
+          <a:bodyPr spcFirstLastPara="1" wrap="square" lIns="91425" tIns="91425" rIns="91425" bIns="91425" anchor="t" anchorCtr="0">
             <a:noAutofit/>
           </a:bodyPr>
           <a:lstStyle/>
           <a:p>
-            <a:pPr indent="0" lvl="0" marL="0" rtl="0" algn="l">
+            <a:pPr marL="0" lvl="0" indent="0" algn="l" rtl="0">
               <a:spcBef>
                 <a:spcPts val="0"/>
               </a:spcBef>
@@ -1174,9 +1217,6 @@
               </a:spcAft>
               <a:buNone/>
             </a:pPr>
-            <a:r>
-              <a:t/>
-            </a:r>
             <a:endParaRPr/>
           </a:p>
         </p:txBody>
@@ -1190,11 +1230,11 @@
 </file>
 
 <file path=ppt/notesSlides/notesSlide6.xml><?xml version="1.0" encoding="utf-8"?>
-<p:notes xmlns:a="http://schemas.openxmlformats.org/drawingml/2006/main" xmlns:r="http://schemas.openxmlformats.org/officeDocument/2006/relationships" xmlns:mc="http://schemas.openxmlformats.org/markup-compatibility/2006" xmlns:mv="urn:schemas-microsoft-com:mac:vml" xmlns:p="http://schemas.openxmlformats.org/presentationml/2006/main" xmlns:c="http://schemas.openxmlformats.org/drawingml/2006/chart" xmlns:dgm="http://schemas.openxmlformats.org/drawingml/2006/diagram" xmlns:o="urn:schemas-microsoft-com:office:office" xmlns:v="urn:schemas-microsoft-com:vml" xmlns:pvml="urn:schemas-microsoft-com:office:powerpoint" xmlns:com="http://schemas.openxmlformats.org/drawingml/2006/compatibility" xmlns:p14="http://schemas.microsoft.com/office/powerpoint/2010/main" xmlns:p15="http://schemas.microsoft.com/office/powerpoint/2012/main" showMasterPhAnim="0" showMasterSp="0">
+<p:notes xmlns:a="http://schemas.openxmlformats.org/drawingml/2006/main" xmlns:r="http://schemas.openxmlformats.org/officeDocument/2006/relationships" xmlns:p="http://schemas.openxmlformats.org/presentationml/2006/main" showMasterSp="0" showMasterPhAnim="0">
   <p:cSld>
     <p:spTree>
       <p:nvGrpSpPr>
-        <p:cNvPr id="83" name="Shape 83"/>
+        <p:cNvPr id="1" name="Shape 83"/>
         <p:cNvGrpSpPr/>
         <p:nvPr/>
       </p:nvGrpSpPr>
@@ -1209,9 +1249,11 @@
       <p:sp>
         <p:nvSpPr>
           <p:cNvPr id="84" name="Google Shape;84;g5f11c5a84e_0_17:notes"/>
-          <p:cNvSpPr/>
+          <p:cNvSpPr>
+            <a:spLocks noGrp="1" noRot="1" noChangeAspect="1"/>
+          </p:cNvSpPr>
           <p:nvPr>
-            <p:ph idx="2" type="sldImg"/>
+            <p:ph type="sldImg" idx="2"/>
           </p:nvPr>
         </p:nvSpPr>
         <p:spPr>
@@ -1220,9 +1262,13 @@
             <a:ext cx="6096000" cy="3429000"/>
           </a:xfrm>
           <a:custGeom>
-            <a:rect b="b" l="l" r="r" t="t"/>
+            <a:avLst/>
+            <a:gdLst/>
+            <a:ahLst/>
+            <a:cxnLst/>
+            <a:rect l="l" t="t" r="r" b="b"/>
             <a:pathLst>
-              <a:path extrusionOk="0" h="120000" w="120000">
+              <a:path w="120000" h="120000" extrusionOk="0">
                 <a:moveTo>
                   <a:pt x="0" y="0"/>
                 </a:moveTo>
@@ -1244,9 +1290,11 @@
       <p:sp>
         <p:nvSpPr>
           <p:cNvPr id="85" name="Google Shape;85;g5f11c5a84e_0_17:notes"/>
-          <p:cNvSpPr txBox="1"/>
+          <p:cNvSpPr txBox="1">
+            <a:spLocks noGrp="1"/>
+          </p:cNvSpPr>
           <p:nvPr>
-            <p:ph idx="1" type="body"/>
+            <p:ph type="body" idx="1"/>
           </p:nvPr>
         </p:nvSpPr>
         <p:spPr>
@@ -1259,12 +1307,12 @@
           </a:prstGeom>
         </p:spPr>
         <p:txBody>
-          <a:bodyPr anchorCtr="0" anchor="t" bIns="91425" lIns="91425" spcFirstLastPara="1" rIns="91425" wrap="square" tIns="91425">
+          <a:bodyPr spcFirstLastPara="1" wrap="square" lIns="91425" tIns="91425" rIns="91425" bIns="91425" anchor="t" anchorCtr="0">
             <a:noAutofit/>
           </a:bodyPr>
           <a:lstStyle/>
           <a:p>
-            <a:pPr indent="0" lvl="0" marL="0" rtl="0" algn="l">
+            <a:pPr marL="0" lvl="0" indent="0" algn="l" rtl="0">
               <a:spcBef>
                 <a:spcPts val="0"/>
               </a:spcBef>
@@ -1273,9 +1321,6 @@
               </a:spcAft>
               <a:buNone/>
             </a:pPr>
-            <a:r>
-              <a:t/>
-            </a:r>
             <a:endParaRPr/>
           </a:p>
         </p:txBody>
@@ -1289,11 +1334,11 @@
 </file>
 
 <file path=ppt/notesSlides/notesSlide7.xml><?xml version="1.0" encoding="utf-8"?>
-<p:notes xmlns:a="http://schemas.openxmlformats.org/drawingml/2006/main" xmlns:r="http://schemas.openxmlformats.org/officeDocument/2006/relationships" xmlns:mc="http://schemas.openxmlformats.org/markup-compatibility/2006" xmlns:mv="urn:schemas-microsoft-com:mac:vml" xmlns:p="http://schemas.openxmlformats.org/presentationml/2006/main" xmlns:c="http://schemas.openxmlformats.org/drawingml/2006/chart" xmlns:dgm="http://schemas.openxmlformats.org/drawingml/2006/diagram" xmlns:o="urn:schemas-microsoft-com:office:office" xmlns:v="urn:schemas-microsoft-com:vml" xmlns:pvml="urn:schemas-microsoft-com:office:powerpoint" xmlns:com="http://schemas.openxmlformats.org/drawingml/2006/compatibility" xmlns:p14="http://schemas.microsoft.com/office/powerpoint/2010/main" xmlns:p15="http://schemas.microsoft.com/office/powerpoint/2012/main" showMasterPhAnim="0" showMasterSp="0">
+<p:notes xmlns:a="http://schemas.openxmlformats.org/drawingml/2006/main" xmlns:r="http://schemas.openxmlformats.org/officeDocument/2006/relationships" xmlns:p="http://schemas.openxmlformats.org/presentationml/2006/main" showMasterSp="0" showMasterPhAnim="0">
   <p:cSld>
     <p:spTree>
       <p:nvGrpSpPr>
-        <p:cNvPr id="89" name="Shape 89"/>
+        <p:cNvPr id="1" name="Shape 89"/>
         <p:cNvGrpSpPr/>
         <p:nvPr/>
       </p:nvGrpSpPr>
@@ -1308,9 +1353,11 @@
       <p:sp>
         <p:nvSpPr>
           <p:cNvPr id="90" name="Google Shape;90;g5f13677c9b_3_13:notes"/>
-          <p:cNvSpPr/>
+          <p:cNvSpPr>
+            <a:spLocks noGrp="1" noRot="1" noChangeAspect="1"/>
+          </p:cNvSpPr>
           <p:nvPr>
-            <p:ph idx="2" type="sldImg"/>
+            <p:ph type="sldImg" idx="2"/>
           </p:nvPr>
         </p:nvSpPr>
         <p:spPr>
@@ -1319,9 +1366,13 @@
             <a:ext cx="6096000" cy="3429000"/>
           </a:xfrm>
           <a:custGeom>
-            <a:rect b="b" l="l" r="r" t="t"/>
+            <a:avLst/>
+            <a:gdLst/>
+            <a:ahLst/>
+            <a:cxnLst/>
+            <a:rect l="l" t="t" r="r" b="b"/>
             <a:pathLst>
-              <a:path extrusionOk="0" h="120000" w="120000">
+              <a:path w="120000" h="120000" extrusionOk="0">
                 <a:moveTo>
                   <a:pt x="0" y="0"/>
                 </a:moveTo>
@@ -1343,9 +1394,11 @@
       <p:sp>
         <p:nvSpPr>
           <p:cNvPr id="91" name="Google Shape;91;g5f13677c9b_3_13:notes"/>
-          <p:cNvSpPr txBox="1"/>
+          <p:cNvSpPr txBox="1">
+            <a:spLocks noGrp="1"/>
+          </p:cNvSpPr>
           <p:nvPr>
-            <p:ph idx="1" type="body"/>
+            <p:ph type="body" idx="1"/>
           </p:nvPr>
         </p:nvSpPr>
         <p:spPr>
@@ -1358,12 +1411,12 @@
           </a:prstGeom>
         </p:spPr>
         <p:txBody>
-          <a:bodyPr anchorCtr="0" anchor="t" bIns="91425" lIns="91425" spcFirstLastPara="1" rIns="91425" wrap="square" tIns="91425">
+          <a:bodyPr spcFirstLastPara="1" wrap="square" lIns="91425" tIns="91425" rIns="91425" bIns="91425" anchor="t" anchorCtr="0">
             <a:noAutofit/>
           </a:bodyPr>
           <a:lstStyle/>
           <a:p>
-            <a:pPr indent="0" lvl="0" marL="0" rtl="0" algn="l">
+            <a:pPr marL="0" lvl="0" indent="0" algn="l" rtl="0">
               <a:spcBef>
                 <a:spcPts val="0"/>
               </a:spcBef>
@@ -1372,9 +1425,6 @@
               </a:spcAft>
               <a:buNone/>
             </a:pPr>
-            <a:r>
-              <a:t/>
-            </a:r>
             <a:endParaRPr/>
           </a:p>
         </p:txBody>
@@ -1388,11 +1438,11 @@
 </file>
 
 <file path=ppt/notesSlides/notesSlide8.xml><?xml version="1.0" encoding="utf-8"?>
-<p:notes xmlns:a="http://schemas.openxmlformats.org/drawingml/2006/main" xmlns:r="http://schemas.openxmlformats.org/officeDocument/2006/relationships" xmlns:mc="http://schemas.openxmlformats.org/markup-compatibility/2006" xmlns:mv="urn:schemas-microsoft-com:mac:vml" xmlns:p="http://schemas.openxmlformats.org/presentationml/2006/main" xmlns:c="http://schemas.openxmlformats.org/drawingml/2006/chart" xmlns:dgm="http://schemas.openxmlformats.org/drawingml/2006/diagram" xmlns:o="urn:schemas-microsoft-com:office:office" xmlns:v="urn:schemas-microsoft-com:vml" xmlns:pvml="urn:schemas-microsoft-com:office:powerpoint" xmlns:com="http://schemas.openxmlformats.org/drawingml/2006/compatibility" xmlns:p14="http://schemas.microsoft.com/office/powerpoint/2010/main" xmlns:p15="http://schemas.microsoft.com/office/powerpoint/2012/main" showMasterPhAnim="0" showMasterSp="0">
+<p:notes xmlns:a="http://schemas.openxmlformats.org/drawingml/2006/main" xmlns:r="http://schemas.openxmlformats.org/officeDocument/2006/relationships" xmlns:p="http://schemas.openxmlformats.org/presentationml/2006/main" showMasterSp="0" showMasterPhAnim="0">
   <p:cSld>
     <p:spTree>
       <p:nvGrpSpPr>
-        <p:cNvPr id="95" name="Shape 95"/>
+        <p:cNvPr id="1" name="Shape 95"/>
         <p:cNvGrpSpPr/>
         <p:nvPr/>
       </p:nvGrpSpPr>
@@ -1407,9 +1457,11 @@
       <p:sp>
         <p:nvSpPr>
           <p:cNvPr id="96" name="Google Shape;96;g5f11c5a84e_0_31:notes"/>
-          <p:cNvSpPr/>
+          <p:cNvSpPr>
+            <a:spLocks noGrp="1" noRot="1" noChangeAspect="1"/>
+          </p:cNvSpPr>
           <p:nvPr>
-            <p:ph idx="2" type="sldImg"/>
+            <p:ph type="sldImg" idx="2"/>
           </p:nvPr>
         </p:nvSpPr>
         <p:spPr>
@@ -1418,9 +1470,13 @@
             <a:ext cx="6096000" cy="3429000"/>
           </a:xfrm>
           <a:custGeom>
-            <a:rect b="b" l="l" r="r" t="t"/>
+            <a:avLst/>
+            <a:gdLst/>
+            <a:ahLst/>
+            <a:cxnLst/>
+            <a:rect l="l" t="t" r="r" b="b"/>
             <a:pathLst>
-              <a:path extrusionOk="0" h="120000" w="120000">
+              <a:path w="120000" h="120000" extrusionOk="0">
                 <a:moveTo>
                   <a:pt x="0" y="0"/>
                 </a:moveTo>
@@ -1442,9 +1498,11 @@
       <p:sp>
         <p:nvSpPr>
           <p:cNvPr id="97" name="Google Shape;97;g5f11c5a84e_0_31:notes"/>
-          <p:cNvSpPr txBox="1"/>
+          <p:cNvSpPr txBox="1">
+            <a:spLocks noGrp="1"/>
+          </p:cNvSpPr>
           <p:nvPr>
-            <p:ph idx="1" type="body"/>
+            <p:ph type="body" idx="1"/>
           </p:nvPr>
         </p:nvSpPr>
         <p:spPr>
@@ -1457,12 +1515,12 @@
           </a:prstGeom>
         </p:spPr>
         <p:txBody>
-          <a:bodyPr anchorCtr="0" anchor="t" bIns="91425" lIns="91425" spcFirstLastPara="1" rIns="91425" wrap="square" tIns="91425">
+          <a:bodyPr spcFirstLastPara="1" wrap="square" lIns="91425" tIns="91425" rIns="91425" bIns="91425" anchor="t" anchorCtr="0">
             <a:noAutofit/>
           </a:bodyPr>
           <a:lstStyle/>
           <a:p>
-            <a:pPr indent="0" lvl="0" marL="0" rtl="0" algn="l">
+            <a:pPr marL="0" lvl="0" indent="0" algn="l" rtl="0">
               <a:spcBef>
                 <a:spcPts val="0"/>
               </a:spcBef>
@@ -1471,9 +1529,6 @@
               </a:spcAft>
               <a:buNone/>
             </a:pPr>
-            <a:r>
-              <a:t/>
-            </a:r>
             <a:endParaRPr/>
           </a:p>
         </p:txBody>
@@ -1487,11 +1542,11 @@
 </file>
 
 <file path=ppt/notesSlides/notesSlide9.xml><?xml version="1.0" encoding="utf-8"?>
-<p:notes xmlns:a="http://schemas.openxmlformats.org/drawingml/2006/main" xmlns:r="http://schemas.openxmlformats.org/officeDocument/2006/relationships" xmlns:mc="http://schemas.openxmlformats.org/markup-compatibility/2006" xmlns:mv="urn:schemas-microsoft-com:mac:vml" xmlns:p="http://schemas.openxmlformats.org/presentationml/2006/main" xmlns:c="http://schemas.openxmlformats.org/drawingml/2006/chart" xmlns:dgm="http://schemas.openxmlformats.org/drawingml/2006/diagram" xmlns:o="urn:schemas-microsoft-com:office:office" xmlns:v="urn:schemas-microsoft-com:vml" xmlns:pvml="urn:schemas-microsoft-com:office:powerpoint" xmlns:com="http://schemas.openxmlformats.org/drawingml/2006/compatibility" xmlns:p14="http://schemas.microsoft.com/office/powerpoint/2010/main" xmlns:p15="http://schemas.microsoft.com/office/powerpoint/2012/main" showMasterPhAnim="0" showMasterSp="0">
+<p:notes xmlns:a="http://schemas.openxmlformats.org/drawingml/2006/main" xmlns:r="http://schemas.openxmlformats.org/officeDocument/2006/relationships" xmlns:p="http://schemas.openxmlformats.org/presentationml/2006/main" showMasterSp="0" showMasterPhAnim="0">
   <p:cSld>
     <p:spTree>
       <p:nvGrpSpPr>
-        <p:cNvPr id="101" name="Shape 101"/>
+        <p:cNvPr id="1" name="Shape 101"/>
         <p:cNvGrpSpPr/>
         <p:nvPr/>
       </p:nvGrpSpPr>
@@ -1506,9 +1561,11 @@
       <p:sp>
         <p:nvSpPr>
           <p:cNvPr id="102" name="Google Shape;102;g5f11c5a84e_0_6:notes"/>
-          <p:cNvSpPr/>
+          <p:cNvSpPr>
+            <a:spLocks noGrp="1" noRot="1" noChangeAspect="1"/>
+          </p:cNvSpPr>
           <p:nvPr>
-            <p:ph idx="2" type="sldImg"/>
+            <p:ph type="sldImg" idx="2"/>
           </p:nvPr>
         </p:nvSpPr>
         <p:spPr>
@@ -1517,9 +1574,13 @@
             <a:ext cx="6096000" cy="3429000"/>
           </a:xfrm>
           <a:custGeom>
-            <a:rect b="b" l="l" r="r" t="t"/>
+            <a:avLst/>
+            <a:gdLst/>
+            <a:ahLst/>
+            <a:cxnLst/>
+            <a:rect l="l" t="t" r="r" b="b"/>
             <a:pathLst>
-              <a:path extrusionOk="0" h="120000" w="120000">
+              <a:path w="120000" h="120000" extrusionOk="0">
                 <a:moveTo>
                   <a:pt x="0" y="0"/>
                 </a:moveTo>
@@ -1541,9 +1602,11 @@
       <p:sp>
         <p:nvSpPr>
           <p:cNvPr id="103" name="Google Shape;103;g5f11c5a84e_0_6:notes"/>
-          <p:cNvSpPr txBox="1"/>
+          <p:cNvSpPr txBox="1">
+            <a:spLocks noGrp="1"/>
+          </p:cNvSpPr>
           <p:nvPr>
-            <p:ph idx="1" type="body"/>
+            <p:ph type="body" idx="1"/>
           </p:nvPr>
         </p:nvSpPr>
         <p:spPr>
@@ -1556,12 +1619,12 @@
           </a:prstGeom>
         </p:spPr>
         <p:txBody>
-          <a:bodyPr anchorCtr="0" anchor="t" bIns="91425" lIns="91425" spcFirstLastPara="1" rIns="91425" wrap="square" tIns="91425">
+          <a:bodyPr spcFirstLastPara="1" wrap="square" lIns="91425" tIns="91425" rIns="91425" bIns="91425" anchor="t" anchorCtr="0">
             <a:noAutofit/>
           </a:bodyPr>
           <a:lstStyle/>
           <a:p>
-            <a:pPr indent="0" lvl="0" marL="0" rtl="0" algn="l">
+            <a:pPr marL="0" lvl="0" indent="0" algn="l" rtl="0">
               <a:spcBef>
                 <a:spcPts val="0"/>
               </a:spcBef>
@@ -1570,9 +1633,6 @@
               </a:spcAft>
               <a:buNone/>
             </a:pPr>
-            <a:r>
-              <a:t/>
-            </a:r>
             <a:endParaRPr/>
           </a:p>
         </p:txBody>
@@ -1586,11 +1646,11 @@
 </file>
 
 <file path=ppt/slideLayouts/slideLayout1.xml><?xml version="1.0" encoding="utf-8"?>
-<p:sldLayout xmlns:a="http://schemas.openxmlformats.org/drawingml/2006/main" xmlns:r="http://schemas.openxmlformats.org/officeDocument/2006/relationships" xmlns:mc="http://schemas.openxmlformats.org/markup-compatibility/2006" xmlns:mv="urn:schemas-microsoft-com:mac:vml" xmlns:p="http://schemas.openxmlformats.org/presentationml/2006/main" xmlns:c="http://schemas.openxmlformats.org/drawingml/2006/chart" xmlns:dgm="http://schemas.openxmlformats.org/drawingml/2006/diagram" xmlns:o="urn:schemas-microsoft-com:office:office" xmlns:v="urn:schemas-microsoft-com:vml" xmlns:pvml="urn:schemas-microsoft-com:office:powerpoint" xmlns:com="http://schemas.openxmlformats.org/drawingml/2006/compatibility" xmlns:p14="http://schemas.microsoft.com/office/powerpoint/2010/main" xmlns:p15="http://schemas.microsoft.com/office/powerpoint/2012/main" matchingName="Title slide" type="title">
+<p:sldLayout xmlns:a="http://schemas.openxmlformats.org/drawingml/2006/main" xmlns:r="http://schemas.openxmlformats.org/officeDocument/2006/relationships" xmlns:p="http://schemas.openxmlformats.org/presentationml/2006/main" matchingName="Title slide" type="title">
   <p:cSld name="TITLE">
     <p:spTree>
       <p:nvGrpSpPr>
-        <p:cNvPr id="9" name="Shape 9"/>
+        <p:cNvPr id="1" name="Shape 9"/>
         <p:cNvGrpSpPr/>
         <p:nvPr/>
       </p:nvGrpSpPr>
@@ -1605,7 +1665,9 @@
       <p:sp>
         <p:nvSpPr>
           <p:cNvPr id="10" name="Google Shape;10;p2"/>
-          <p:cNvSpPr txBox="1"/>
+          <p:cNvSpPr txBox="1">
+            <a:spLocks noGrp="1"/>
+          </p:cNvSpPr>
           <p:nvPr>
             <p:ph type="ctrTitle"/>
           </p:nvPr>
@@ -1620,7 +1682,7 @@
           </a:prstGeom>
         </p:spPr>
         <p:txBody>
-          <a:bodyPr anchorCtr="0" anchor="b" bIns="91425" lIns="91425" spcFirstLastPara="1" rIns="91425" wrap="square" tIns="91425">
+          <a:bodyPr spcFirstLastPara="1" wrap="square" lIns="91425" tIns="91425" rIns="91425" bIns="91425" anchor="b" anchorCtr="0">
             <a:noAutofit/>
           </a:bodyPr>
           <a:lstStyle>
@@ -1724,15 +1786,19 @@
               <a:defRPr sz="5200"/>
             </a:lvl9pPr>
           </a:lstStyle>
-          <a:p/>
+          <a:p>
+            <a:endParaRPr/>
+          </a:p>
         </p:txBody>
       </p:sp>
       <p:sp>
         <p:nvSpPr>
           <p:cNvPr id="11" name="Google Shape;11;p2"/>
-          <p:cNvSpPr txBox="1"/>
+          <p:cNvSpPr txBox="1">
+            <a:spLocks noGrp="1"/>
+          </p:cNvSpPr>
           <p:nvPr>
-            <p:ph idx="1" type="subTitle"/>
+            <p:ph type="subTitle" idx="1"/>
           </p:nvPr>
         </p:nvSpPr>
         <p:spPr>
@@ -1745,7 +1811,7 @@
           </a:prstGeom>
         </p:spPr>
         <p:txBody>
-          <a:bodyPr anchorCtr="0" anchor="t" bIns="91425" lIns="91425" spcFirstLastPara="1" rIns="91425" wrap="square" tIns="91425">
+          <a:bodyPr spcFirstLastPara="1" wrap="square" lIns="91425" tIns="91425" rIns="91425" bIns="91425" anchor="t" anchorCtr="0">
             <a:noAutofit/>
           </a:bodyPr>
           <a:lstStyle>
@@ -1876,15 +1942,19 @@
               <a:defRPr sz="2800"/>
             </a:lvl9pPr>
           </a:lstStyle>
-          <a:p/>
+          <a:p>
+            <a:endParaRPr/>
+          </a:p>
         </p:txBody>
       </p:sp>
       <p:sp>
         <p:nvSpPr>
           <p:cNvPr id="12" name="Google Shape;12;p2"/>
-          <p:cNvSpPr txBox="1"/>
+          <p:cNvSpPr txBox="1">
+            <a:spLocks noGrp="1"/>
+          </p:cNvSpPr>
           <p:nvPr>
-            <p:ph idx="12" type="sldNum"/>
+            <p:ph type="sldNum" idx="12"/>
           </p:nvPr>
         </p:nvSpPr>
         <p:spPr>
@@ -1897,7 +1967,7 @@
           </a:prstGeom>
         </p:spPr>
         <p:txBody>
-          <a:bodyPr anchorCtr="0" anchor="ctr" bIns="91425" lIns="91425" spcFirstLastPara="1" rIns="91425" wrap="square" tIns="91425">
+          <a:bodyPr spcFirstLastPara="1" wrap="square" lIns="91425" tIns="91425" rIns="91425" bIns="91425" anchor="ctr" anchorCtr="0">
             <a:noAutofit/>
           </a:bodyPr>
           <a:lstStyle>
@@ -1939,7 +2009,7 @@
             </a:lvl9pPr>
           </a:lstStyle>
           <a:p>
-            <a:pPr indent="0" lvl="0" marL="0" rtl="0" algn="r">
+            <a:pPr marL="0" lvl="0" indent="0" algn="r" rtl="0">
               <a:spcBef>
                 <a:spcPts val="0"/>
               </a:spcBef>
@@ -1965,11 +2035,11 @@
 </file>
 
 <file path=ppt/slideLayouts/slideLayout10.xml><?xml version="1.0" encoding="utf-8"?>
-<p:sldLayout xmlns:a="http://schemas.openxmlformats.org/drawingml/2006/main" xmlns:r="http://schemas.openxmlformats.org/officeDocument/2006/relationships" xmlns:mc="http://schemas.openxmlformats.org/markup-compatibility/2006" xmlns:mv="urn:schemas-microsoft-com:mac:vml" xmlns:p="http://schemas.openxmlformats.org/presentationml/2006/main" xmlns:c="http://schemas.openxmlformats.org/drawingml/2006/chart" xmlns:dgm="http://schemas.openxmlformats.org/drawingml/2006/diagram" xmlns:o="urn:schemas-microsoft-com:office:office" xmlns:v="urn:schemas-microsoft-com:vml" xmlns:pvml="urn:schemas-microsoft-com:office:powerpoint" xmlns:com="http://schemas.openxmlformats.org/drawingml/2006/compatibility" xmlns:p14="http://schemas.microsoft.com/office/powerpoint/2010/main" xmlns:p15="http://schemas.microsoft.com/office/powerpoint/2012/main" matchingName="Big number">
+<p:sldLayout xmlns:a="http://schemas.openxmlformats.org/drawingml/2006/main" xmlns:r="http://schemas.openxmlformats.org/officeDocument/2006/relationships" xmlns:p="http://schemas.openxmlformats.org/presentationml/2006/main" matchingName="Big number">
   <p:cSld name="BIG_NUMBER">
     <p:spTree>
       <p:nvGrpSpPr>
-        <p:cNvPr id="44" name="Shape 44"/>
+        <p:cNvPr id="1" name="Shape 44"/>
         <p:cNvGrpSpPr/>
         <p:nvPr/>
       </p:nvGrpSpPr>
@@ -1984,9 +2054,11 @@
       <p:sp>
         <p:nvSpPr>
           <p:cNvPr id="45" name="Google Shape;45;p11"/>
-          <p:cNvSpPr txBox="1"/>
+          <p:cNvSpPr txBox="1">
+            <a:spLocks noGrp="1"/>
+          </p:cNvSpPr>
           <p:nvPr>
-            <p:ph hasCustomPrompt="1" type="title"/>
+            <p:ph type="title" hasCustomPrompt="1"/>
           </p:nvPr>
         </p:nvSpPr>
         <p:spPr>
@@ -1999,7 +2071,7 @@
           </a:prstGeom>
         </p:spPr>
         <p:txBody>
-          <a:bodyPr anchorCtr="0" anchor="b" bIns="91425" lIns="91425" spcFirstLastPara="1" rIns="91425" wrap="square" tIns="91425">
+          <a:bodyPr spcFirstLastPara="1" wrap="square" lIns="91425" tIns="91425" rIns="91425" bIns="91425" anchor="b" anchorCtr="0">
             <a:noAutofit/>
           </a:bodyPr>
           <a:lstStyle>
@@ -2113,9 +2185,11 @@
       <p:sp>
         <p:nvSpPr>
           <p:cNvPr id="46" name="Google Shape;46;p11"/>
-          <p:cNvSpPr txBox="1"/>
+          <p:cNvSpPr txBox="1">
+            <a:spLocks noGrp="1"/>
+          </p:cNvSpPr>
           <p:nvPr>
-            <p:ph idx="1" type="body"/>
+            <p:ph type="body" idx="1"/>
           </p:nvPr>
         </p:nvSpPr>
         <p:spPr>
@@ -2128,11 +2202,11 @@
           </a:prstGeom>
         </p:spPr>
         <p:txBody>
-          <a:bodyPr anchorCtr="0" anchor="t" bIns="91425" lIns="91425" spcFirstLastPara="1" rIns="91425" wrap="square" tIns="91425">
+          <a:bodyPr spcFirstLastPara="1" wrap="square" lIns="91425" tIns="91425" rIns="91425" bIns="91425" anchor="t" anchorCtr="0">
             <a:noAutofit/>
           </a:bodyPr>
           <a:lstStyle>
-            <a:lvl1pPr indent="-342900" lvl="0" marL="457200" algn="ctr">
+            <a:lvl1pPr marL="457200" lvl="0" indent="-342900" algn="ctr">
               <a:spcBef>
                 <a:spcPts val="0"/>
               </a:spcBef>
@@ -2143,7 +2217,7 @@
               <a:buChar char="●"/>
               <a:defRPr/>
             </a:lvl1pPr>
-            <a:lvl2pPr indent="-317500" lvl="1" marL="914400" algn="ctr">
+            <a:lvl2pPr marL="914400" lvl="1" indent="-317500" algn="ctr">
               <a:spcBef>
                 <a:spcPts val="1600"/>
               </a:spcBef>
@@ -2154,7 +2228,7 @@
               <a:buChar char="○"/>
               <a:defRPr/>
             </a:lvl2pPr>
-            <a:lvl3pPr indent="-317500" lvl="2" marL="1371600" algn="ctr">
+            <a:lvl3pPr marL="1371600" lvl="2" indent="-317500" algn="ctr">
               <a:spcBef>
                 <a:spcPts val="1600"/>
               </a:spcBef>
@@ -2165,7 +2239,7 @@
               <a:buChar char="■"/>
               <a:defRPr/>
             </a:lvl3pPr>
-            <a:lvl4pPr indent="-317500" lvl="3" marL="1828800" algn="ctr">
+            <a:lvl4pPr marL="1828800" lvl="3" indent="-317500" algn="ctr">
               <a:spcBef>
                 <a:spcPts val="1600"/>
               </a:spcBef>
@@ -2176,7 +2250,7 @@
               <a:buChar char="●"/>
               <a:defRPr/>
             </a:lvl4pPr>
-            <a:lvl5pPr indent="-317500" lvl="4" marL="2286000" algn="ctr">
+            <a:lvl5pPr marL="2286000" lvl="4" indent="-317500" algn="ctr">
               <a:spcBef>
                 <a:spcPts val="1600"/>
               </a:spcBef>
@@ -2187,7 +2261,7 @@
               <a:buChar char="○"/>
               <a:defRPr/>
             </a:lvl5pPr>
-            <a:lvl6pPr indent="-317500" lvl="5" marL="2743200" algn="ctr">
+            <a:lvl6pPr marL="2743200" lvl="5" indent="-317500" algn="ctr">
               <a:spcBef>
                 <a:spcPts val="1600"/>
               </a:spcBef>
@@ -2198,7 +2272,7 @@
               <a:buChar char="■"/>
               <a:defRPr/>
             </a:lvl6pPr>
-            <a:lvl7pPr indent="-317500" lvl="6" marL="3200400" algn="ctr">
+            <a:lvl7pPr marL="3200400" lvl="6" indent="-317500" algn="ctr">
               <a:spcBef>
                 <a:spcPts val="1600"/>
               </a:spcBef>
@@ -2209,7 +2283,7 @@
               <a:buChar char="●"/>
               <a:defRPr/>
             </a:lvl7pPr>
-            <a:lvl8pPr indent="-317500" lvl="7" marL="3657600" algn="ctr">
+            <a:lvl8pPr marL="3657600" lvl="7" indent="-317500" algn="ctr">
               <a:spcBef>
                 <a:spcPts val="1600"/>
               </a:spcBef>
@@ -2220,7 +2294,7 @@
               <a:buChar char="○"/>
               <a:defRPr/>
             </a:lvl8pPr>
-            <a:lvl9pPr indent="-317500" lvl="8" marL="4114800" algn="ctr">
+            <a:lvl9pPr marL="4114800" lvl="8" indent="-317500" algn="ctr">
               <a:spcBef>
                 <a:spcPts val="1600"/>
               </a:spcBef>
@@ -2232,15 +2306,19 @@
               <a:defRPr/>
             </a:lvl9pPr>
           </a:lstStyle>
-          <a:p/>
+          <a:p>
+            <a:endParaRPr/>
+          </a:p>
         </p:txBody>
       </p:sp>
       <p:sp>
         <p:nvSpPr>
           <p:cNvPr id="47" name="Google Shape;47;p11"/>
-          <p:cNvSpPr txBox="1"/>
+          <p:cNvSpPr txBox="1">
+            <a:spLocks noGrp="1"/>
+          </p:cNvSpPr>
           <p:nvPr>
-            <p:ph idx="12" type="sldNum"/>
+            <p:ph type="sldNum" idx="12"/>
           </p:nvPr>
         </p:nvSpPr>
         <p:spPr>
@@ -2253,7 +2331,7 @@
           </a:prstGeom>
         </p:spPr>
         <p:txBody>
-          <a:bodyPr anchorCtr="0" anchor="ctr" bIns="91425" lIns="91425" spcFirstLastPara="1" rIns="91425" wrap="square" tIns="91425">
+          <a:bodyPr spcFirstLastPara="1" wrap="square" lIns="91425" tIns="91425" rIns="91425" bIns="91425" anchor="ctr" anchorCtr="0">
             <a:noAutofit/>
           </a:bodyPr>
           <a:lstStyle>
@@ -2295,7 +2373,7 @@
             </a:lvl9pPr>
           </a:lstStyle>
           <a:p>
-            <a:pPr indent="0" lvl="0" marL="0" rtl="0" algn="r">
+            <a:pPr marL="0" lvl="0" indent="0" algn="r" rtl="0">
               <a:spcBef>
                 <a:spcPts val="0"/>
               </a:spcBef>
@@ -2321,11 +2399,11 @@
 </file>
 
 <file path=ppt/slideLayouts/slideLayout11.xml><?xml version="1.0" encoding="utf-8"?>
-<p:sldLayout xmlns:a="http://schemas.openxmlformats.org/drawingml/2006/main" xmlns:r="http://schemas.openxmlformats.org/officeDocument/2006/relationships" xmlns:mc="http://schemas.openxmlformats.org/markup-compatibility/2006" xmlns:mv="urn:schemas-microsoft-com:mac:vml" xmlns:p="http://schemas.openxmlformats.org/presentationml/2006/main" xmlns:c="http://schemas.openxmlformats.org/drawingml/2006/chart" xmlns:dgm="http://schemas.openxmlformats.org/drawingml/2006/diagram" xmlns:o="urn:schemas-microsoft-com:office:office" xmlns:v="urn:schemas-microsoft-com:vml" xmlns:pvml="urn:schemas-microsoft-com:office:powerpoint" xmlns:com="http://schemas.openxmlformats.org/drawingml/2006/compatibility" xmlns:p14="http://schemas.microsoft.com/office/powerpoint/2010/main" xmlns:p15="http://schemas.microsoft.com/office/powerpoint/2012/main" matchingName="Blank" type="blank">
+<p:sldLayout xmlns:a="http://schemas.openxmlformats.org/drawingml/2006/main" xmlns:r="http://schemas.openxmlformats.org/officeDocument/2006/relationships" xmlns:p="http://schemas.openxmlformats.org/presentationml/2006/main" matchingName="Blank" type="blank">
   <p:cSld name="BLANK">
     <p:spTree>
       <p:nvGrpSpPr>
-        <p:cNvPr id="48" name="Shape 48"/>
+        <p:cNvPr id="1" name="Shape 48"/>
         <p:cNvGrpSpPr/>
         <p:nvPr/>
       </p:nvGrpSpPr>
@@ -2340,9 +2418,11 @@
       <p:sp>
         <p:nvSpPr>
           <p:cNvPr id="49" name="Google Shape;49;p12"/>
-          <p:cNvSpPr txBox="1"/>
+          <p:cNvSpPr txBox="1">
+            <a:spLocks noGrp="1"/>
+          </p:cNvSpPr>
           <p:nvPr>
-            <p:ph idx="12" type="sldNum"/>
+            <p:ph type="sldNum" idx="12"/>
           </p:nvPr>
         </p:nvSpPr>
         <p:spPr>
@@ -2355,7 +2435,7 @@
           </a:prstGeom>
         </p:spPr>
         <p:txBody>
-          <a:bodyPr anchorCtr="0" anchor="ctr" bIns="91425" lIns="91425" spcFirstLastPara="1" rIns="91425" wrap="square" tIns="91425">
+          <a:bodyPr spcFirstLastPara="1" wrap="square" lIns="91425" tIns="91425" rIns="91425" bIns="91425" anchor="ctr" anchorCtr="0">
             <a:noAutofit/>
           </a:bodyPr>
           <a:lstStyle>
@@ -2397,7 +2477,7 @@
             </a:lvl9pPr>
           </a:lstStyle>
           <a:p>
-            <a:pPr indent="0" lvl="0" marL="0" rtl="0" algn="r">
+            <a:pPr marL="0" lvl="0" indent="0" algn="r" rtl="0">
               <a:spcBef>
                 <a:spcPts val="0"/>
               </a:spcBef>
@@ -2423,11 +2503,11 @@
 </file>
 
 <file path=ppt/slideLayouts/slideLayout2.xml><?xml version="1.0" encoding="utf-8"?>
-<p:sldLayout xmlns:a="http://schemas.openxmlformats.org/drawingml/2006/main" xmlns:r="http://schemas.openxmlformats.org/officeDocument/2006/relationships" xmlns:mc="http://schemas.openxmlformats.org/markup-compatibility/2006" xmlns:mv="urn:schemas-microsoft-com:mac:vml" xmlns:p="http://schemas.openxmlformats.org/presentationml/2006/main" xmlns:c="http://schemas.openxmlformats.org/drawingml/2006/chart" xmlns:dgm="http://schemas.openxmlformats.org/drawingml/2006/diagram" xmlns:o="urn:schemas-microsoft-com:office:office" xmlns:v="urn:schemas-microsoft-com:vml" xmlns:pvml="urn:schemas-microsoft-com:office:powerpoint" xmlns:com="http://schemas.openxmlformats.org/drawingml/2006/compatibility" xmlns:p14="http://schemas.microsoft.com/office/powerpoint/2010/main" xmlns:p15="http://schemas.microsoft.com/office/powerpoint/2012/main" matchingName="Section header" type="secHead">
+<p:sldLayout xmlns:a="http://schemas.openxmlformats.org/drawingml/2006/main" xmlns:r="http://schemas.openxmlformats.org/officeDocument/2006/relationships" xmlns:p="http://schemas.openxmlformats.org/presentationml/2006/main" matchingName="Section header" type="secHead">
   <p:cSld name="SECTION_HEADER">
     <p:spTree>
       <p:nvGrpSpPr>
-        <p:cNvPr id="13" name="Shape 13"/>
+        <p:cNvPr id="1" name="Shape 13"/>
         <p:cNvGrpSpPr/>
         <p:nvPr/>
       </p:nvGrpSpPr>
@@ -2442,7 +2522,9 @@
       <p:sp>
         <p:nvSpPr>
           <p:cNvPr id="14" name="Google Shape;14;p3"/>
-          <p:cNvSpPr txBox="1"/>
+          <p:cNvSpPr txBox="1">
+            <a:spLocks noGrp="1"/>
+          </p:cNvSpPr>
           <p:nvPr>
             <p:ph type="title"/>
           </p:nvPr>
@@ -2457,7 +2539,7 @@
           </a:prstGeom>
         </p:spPr>
         <p:txBody>
-          <a:bodyPr anchorCtr="0" anchor="ctr" bIns="91425" lIns="91425" spcFirstLastPara="1" rIns="91425" wrap="square" tIns="91425">
+          <a:bodyPr spcFirstLastPara="1" wrap="square" lIns="91425" tIns="91425" rIns="91425" bIns="91425" anchor="ctr" anchorCtr="0">
             <a:noAutofit/>
           </a:bodyPr>
           <a:lstStyle>
@@ -2561,15 +2643,19 @@
               <a:defRPr sz="3600"/>
             </a:lvl9pPr>
           </a:lstStyle>
-          <a:p/>
+          <a:p>
+            <a:endParaRPr/>
+          </a:p>
         </p:txBody>
       </p:sp>
       <p:sp>
         <p:nvSpPr>
           <p:cNvPr id="15" name="Google Shape;15;p3"/>
-          <p:cNvSpPr txBox="1"/>
+          <p:cNvSpPr txBox="1">
+            <a:spLocks noGrp="1"/>
+          </p:cNvSpPr>
           <p:nvPr>
-            <p:ph idx="12" type="sldNum"/>
+            <p:ph type="sldNum" idx="12"/>
           </p:nvPr>
         </p:nvSpPr>
         <p:spPr>
@@ -2582,7 +2668,7 @@
           </a:prstGeom>
         </p:spPr>
         <p:txBody>
-          <a:bodyPr anchorCtr="0" anchor="ctr" bIns="91425" lIns="91425" spcFirstLastPara="1" rIns="91425" wrap="square" tIns="91425">
+          <a:bodyPr spcFirstLastPara="1" wrap="square" lIns="91425" tIns="91425" rIns="91425" bIns="91425" anchor="ctr" anchorCtr="0">
             <a:noAutofit/>
           </a:bodyPr>
           <a:lstStyle>
@@ -2624,7 +2710,7 @@
             </a:lvl9pPr>
           </a:lstStyle>
           <a:p>
-            <a:pPr indent="0" lvl="0" marL="0" rtl="0" algn="r">
+            <a:pPr marL="0" lvl="0" indent="0" algn="r" rtl="0">
               <a:spcBef>
                 <a:spcPts val="0"/>
               </a:spcBef>
@@ -2650,11 +2736,11 @@
 </file>
 
 <file path=ppt/slideLayouts/slideLayout3.xml><?xml version="1.0" encoding="utf-8"?>
-<p:sldLayout xmlns:a="http://schemas.openxmlformats.org/drawingml/2006/main" xmlns:r="http://schemas.openxmlformats.org/officeDocument/2006/relationships" xmlns:mc="http://schemas.openxmlformats.org/markup-compatibility/2006" xmlns:mv="urn:schemas-microsoft-com:mac:vml" xmlns:p="http://schemas.openxmlformats.org/presentationml/2006/main" xmlns:c="http://schemas.openxmlformats.org/drawingml/2006/chart" xmlns:dgm="http://schemas.openxmlformats.org/drawingml/2006/diagram" xmlns:o="urn:schemas-microsoft-com:office:office" xmlns:v="urn:schemas-microsoft-com:vml" xmlns:pvml="urn:schemas-microsoft-com:office:powerpoint" xmlns:com="http://schemas.openxmlformats.org/drawingml/2006/compatibility" xmlns:p14="http://schemas.microsoft.com/office/powerpoint/2010/main" xmlns:p15="http://schemas.microsoft.com/office/powerpoint/2012/main" matchingName="Title and body" type="tx">
+<p:sldLayout xmlns:a="http://schemas.openxmlformats.org/drawingml/2006/main" xmlns:r="http://schemas.openxmlformats.org/officeDocument/2006/relationships" xmlns:p="http://schemas.openxmlformats.org/presentationml/2006/main" matchingName="Title and body" type="tx">
   <p:cSld name="TITLE_AND_BODY">
     <p:spTree>
       <p:nvGrpSpPr>
-        <p:cNvPr id="16" name="Shape 16"/>
+        <p:cNvPr id="1" name="Shape 16"/>
         <p:cNvGrpSpPr/>
         <p:nvPr/>
       </p:nvGrpSpPr>
@@ -2669,7 +2755,9 @@
       <p:sp>
         <p:nvSpPr>
           <p:cNvPr id="17" name="Google Shape;17;p4"/>
-          <p:cNvSpPr txBox="1"/>
+          <p:cNvSpPr txBox="1">
+            <a:spLocks noGrp="1"/>
+          </p:cNvSpPr>
           <p:nvPr>
             <p:ph type="title"/>
           </p:nvPr>
@@ -2684,7 +2772,7 @@
           </a:prstGeom>
         </p:spPr>
         <p:txBody>
-          <a:bodyPr anchorCtr="0" anchor="t" bIns="91425" lIns="91425" spcFirstLastPara="1" rIns="91425" wrap="square" tIns="91425">
+          <a:bodyPr spcFirstLastPara="1" wrap="square" lIns="91425" tIns="91425" rIns="91425" bIns="91425" anchor="t" anchorCtr="0">
             <a:noAutofit/>
           </a:bodyPr>
           <a:lstStyle>
@@ -2788,15 +2876,19 @@
               <a:defRPr/>
             </a:lvl9pPr>
           </a:lstStyle>
-          <a:p/>
+          <a:p>
+            <a:endParaRPr/>
+          </a:p>
         </p:txBody>
       </p:sp>
       <p:sp>
         <p:nvSpPr>
           <p:cNvPr id="18" name="Google Shape;18;p4"/>
-          <p:cNvSpPr txBox="1"/>
+          <p:cNvSpPr txBox="1">
+            <a:spLocks noGrp="1"/>
+          </p:cNvSpPr>
           <p:nvPr>
-            <p:ph idx="1" type="body"/>
+            <p:ph type="body" idx="1"/>
           </p:nvPr>
         </p:nvSpPr>
         <p:spPr>
@@ -2809,11 +2901,11 @@
           </a:prstGeom>
         </p:spPr>
         <p:txBody>
-          <a:bodyPr anchorCtr="0" anchor="t" bIns="91425" lIns="91425" spcFirstLastPara="1" rIns="91425" wrap="square" tIns="91425">
+          <a:bodyPr spcFirstLastPara="1" wrap="square" lIns="91425" tIns="91425" rIns="91425" bIns="91425" anchor="t" anchorCtr="0">
             <a:noAutofit/>
           </a:bodyPr>
           <a:lstStyle>
-            <a:lvl1pPr indent="-342900" lvl="0" marL="457200">
+            <a:lvl1pPr marL="457200" lvl="0" indent="-342900">
               <a:spcBef>
                 <a:spcPts val="0"/>
               </a:spcBef>
@@ -2824,7 +2916,7 @@
               <a:buChar char="●"/>
               <a:defRPr/>
             </a:lvl1pPr>
-            <a:lvl2pPr indent="-317500" lvl="1" marL="914400">
+            <a:lvl2pPr marL="914400" lvl="1" indent="-317500">
               <a:spcBef>
                 <a:spcPts val="1600"/>
               </a:spcBef>
@@ -2835,7 +2927,7 @@
               <a:buChar char="○"/>
               <a:defRPr/>
             </a:lvl2pPr>
-            <a:lvl3pPr indent="-317500" lvl="2" marL="1371600">
+            <a:lvl3pPr marL="1371600" lvl="2" indent="-317500">
               <a:spcBef>
                 <a:spcPts val="1600"/>
               </a:spcBef>
@@ -2846,7 +2938,7 @@
               <a:buChar char="■"/>
               <a:defRPr/>
             </a:lvl3pPr>
-            <a:lvl4pPr indent="-317500" lvl="3" marL="1828800">
+            <a:lvl4pPr marL="1828800" lvl="3" indent="-317500">
               <a:spcBef>
                 <a:spcPts val="1600"/>
               </a:spcBef>
@@ -2857,7 +2949,7 @@
               <a:buChar char="●"/>
               <a:defRPr/>
             </a:lvl4pPr>
-            <a:lvl5pPr indent="-317500" lvl="4" marL="2286000">
+            <a:lvl5pPr marL="2286000" lvl="4" indent="-317500">
               <a:spcBef>
                 <a:spcPts val="1600"/>
               </a:spcBef>
@@ -2868,7 +2960,7 @@
               <a:buChar char="○"/>
               <a:defRPr/>
             </a:lvl5pPr>
-            <a:lvl6pPr indent="-317500" lvl="5" marL="2743200">
+            <a:lvl6pPr marL="2743200" lvl="5" indent="-317500">
               <a:spcBef>
                 <a:spcPts val="1600"/>
               </a:spcBef>
@@ -2879,7 +2971,7 @@
               <a:buChar char="■"/>
               <a:defRPr/>
             </a:lvl6pPr>
-            <a:lvl7pPr indent="-317500" lvl="6" marL="3200400">
+            <a:lvl7pPr marL="3200400" lvl="6" indent="-317500">
               <a:spcBef>
                 <a:spcPts val="1600"/>
               </a:spcBef>
@@ -2890,7 +2982,7 @@
               <a:buChar char="●"/>
               <a:defRPr/>
             </a:lvl7pPr>
-            <a:lvl8pPr indent="-317500" lvl="7" marL="3657600">
+            <a:lvl8pPr marL="3657600" lvl="7" indent="-317500">
               <a:spcBef>
                 <a:spcPts val="1600"/>
               </a:spcBef>
@@ -2901,7 +2993,7 @@
               <a:buChar char="○"/>
               <a:defRPr/>
             </a:lvl8pPr>
-            <a:lvl9pPr indent="-317500" lvl="8" marL="4114800">
+            <a:lvl9pPr marL="4114800" lvl="8" indent="-317500">
               <a:spcBef>
                 <a:spcPts val="1600"/>
               </a:spcBef>
@@ -2913,15 +3005,19 @@
               <a:defRPr/>
             </a:lvl9pPr>
           </a:lstStyle>
-          <a:p/>
+          <a:p>
+            <a:endParaRPr/>
+          </a:p>
         </p:txBody>
       </p:sp>
       <p:sp>
         <p:nvSpPr>
           <p:cNvPr id="19" name="Google Shape;19;p4"/>
-          <p:cNvSpPr txBox="1"/>
+          <p:cNvSpPr txBox="1">
+            <a:spLocks noGrp="1"/>
+          </p:cNvSpPr>
           <p:nvPr>
-            <p:ph idx="12" type="sldNum"/>
+            <p:ph type="sldNum" idx="12"/>
           </p:nvPr>
         </p:nvSpPr>
         <p:spPr>
@@ -2934,7 +3030,7 @@
           </a:prstGeom>
         </p:spPr>
         <p:txBody>
-          <a:bodyPr anchorCtr="0" anchor="ctr" bIns="91425" lIns="91425" spcFirstLastPara="1" rIns="91425" wrap="square" tIns="91425">
+          <a:bodyPr spcFirstLastPara="1" wrap="square" lIns="91425" tIns="91425" rIns="91425" bIns="91425" anchor="ctr" anchorCtr="0">
             <a:noAutofit/>
           </a:bodyPr>
           <a:lstStyle>
@@ -2976,7 +3072,7 @@
             </a:lvl9pPr>
           </a:lstStyle>
           <a:p>
-            <a:pPr indent="0" lvl="0" marL="0" rtl="0" algn="r">
+            <a:pPr marL="0" lvl="0" indent="0" algn="r" rtl="0">
               <a:spcBef>
                 <a:spcPts val="0"/>
               </a:spcBef>
@@ -3002,11 +3098,11 @@
 </file>
 
 <file path=ppt/slideLayouts/slideLayout4.xml><?xml version="1.0" encoding="utf-8"?>
-<p:sldLayout xmlns:a="http://schemas.openxmlformats.org/drawingml/2006/main" xmlns:r="http://schemas.openxmlformats.org/officeDocument/2006/relationships" xmlns:mc="http://schemas.openxmlformats.org/markup-compatibility/2006" xmlns:mv="urn:schemas-microsoft-com:mac:vml" xmlns:p="http://schemas.openxmlformats.org/presentationml/2006/main" xmlns:c="http://schemas.openxmlformats.org/drawingml/2006/chart" xmlns:dgm="http://schemas.openxmlformats.org/drawingml/2006/diagram" xmlns:o="urn:schemas-microsoft-com:office:office" xmlns:v="urn:schemas-microsoft-com:vml" xmlns:pvml="urn:schemas-microsoft-com:office:powerpoint" xmlns:com="http://schemas.openxmlformats.org/drawingml/2006/compatibility" xmlns:p14="http://schemas.microsoft.com/office/powerpoint/2010/main" xmlns:p15="http://schemas.microsoft.com/office/powerpoint/2012/main" matchingName="Title and two columns" type="twoColTx">
+<p:sldLayout xmlns:a="http://schemas.openxmlformats.org/drawingml/2006/main" xmlns:r="http://schemas.openxmlformats.org/officeDocument/2006/relationships" xmlns:p="http://schemas.openxmlformats.org/presentationml/2006/main" matchingName="Title and two columns" type="twoColTx">
   <p:cSld name="TITLE_AND_TWO_COLUMNS">
     <p:spTree>
       <p:nvGrpSpPr>
-        <p:cNvPr id="20" name="Shape 20"/>
+        <p:cNvPr id="1" name="Shape 20"/>
         <p:cNvGrpSpPr/>
         <p:nvPr/>
       </p:nvGrpSpPr>
@@ -3021,7 +3117,9 @@
       <p:sp>
         <p:nvSpPr>
           <p:cNvPr id="21" name="Google Shape;21;p5"/>
-          <p:cNvSpPr txBox="1"/>
+          <p:cNvSpPr txBox="1">
+            <a:spLocks noGrp="1"/>
+          </p:cNvSpPr>
           <p:nvPr>
             <p:ph type="title"/>
           </p:nvPr>
@@ -3036,7 +3134,7 @@
           </a:prstGeom>
         </p:spPr>
         <p:txBody>
-          <a:bodyPr anchorCtr="0" anchor="t" bIns="91425" lIns="91425" spcFirstLastPara="1" rIns="91425" wrap="square" tIns="91425">
+          <a:bodyPr spcFirstLastPara="1" wrap="square" lIns="91425" tIns="91425" rIns="91425" bIns="91425" anchor="t" anchorCtr="0">
             <a:noAutofit/>
           </a:bodyPr>
           <a:lstStyle>
@@ -3140,15 +3238,19 @@
               <a:defRPr/>
             </a:lvl9pPr>
           </a:lstStyle>
-          <a:p/>
+          <a:p>
+            <a:endParaRPr/>
+          </a:p>
         </p:txBody>
       </p:sp>
       <p:sp>
         <p:nvSpPr>
           <p:cNvPr id="22" name="Google Shape;22;p5"/>
-          <p:cNvSpPr txBox="1"/>
+          <p:cNvSpPr txBox="1">
+            <a:spLocks noGrp="1"/>
+          </p:cNvSpPr>
           <p:nvPr>
-            <p:ph idx="1" type="body"/>
+            <p:ph type="body" idx="1"/>
           </p:nvPr>
         </p:nvSpPr>
         <p:spPr>
@@ -3161,11 +3263,11 @@
           </a:prstGeom>
         </p:spPr>
         <p:txBody>
-          <a:bodyPr anchorCtr="0" anchor="t" bIns="91425" lIns="91425" spcFirstLastPara="1" rIns="91425" wrap="square" tIns="91425">
+          <a:bodyPr spcFirstLastPara="1" wrap="square" lIns="91425" tIns="91425" rIns="91425" bIns="91425" anchor="t" anchorCtr="0">
             <a:noAutofit/>
           </a:bodyPr>
           <a:lstStyle>
-            <a:lvl1pPr indent="-317500" lvl="0" marL="457200">
+            <a:lvl1pPr marL="457200" lvl="0" indent="-317500">
               <a:spcBef>
                 <a:spcPts val="0"/>
               </a:spcBef>
@@ -3176,7 +3278,7 @@
               <a:buChar char="●"/>
               <a:defRPr sz="1400"/>
             </a:lvl1pPr>
-            <a:lvl2pPr indent="-304800" lvl="1" marL="914400">
+            <a:lvl2pPr marL="914400" lvl="1" indent="-304800">
               <a:spcBef>
                 <a:spcPts val="1600"/>
               </a:spcBef>
@@ -3187,7 +3289,7 @@
               <a:buChar char="○"/>
               <a:defRPr sz="1200"/>
             </a:lvl2pPr>
-            <a:lvl3pPr indent="-304800" lvl="2" marL="1371600">
+            <a:lvl3pPr marL="1371600" lvl="2" indent="-304800">
               <a:spcBef>
                 <a:spcPts val="1600"/>
               </a:spcBef>
@@ -3198,7 +3300,7 @@
               <a:buChar char="■"/>
               <a:defRPr sz="1200"/>
             </a:lvl3pPr>
-            <a:lvl4pPr indent="-304800" lvl="3" marL="1828800">
+            <a:lvl4pPr marL="1828800" lvl="3" indent="-304800">
               <a:spcBef>
                 <a:spcPts val="1600"/>
               </a:spcBef>
@@ -3209,7 +3311,7 @@
               <a:buChar char="●"/>
               <a:defRPr sz="1200"/>
             </a:lvl4pPr>
-            <a:lvl5pPr indent="-304800" lvl="4" marL="2286000">
+            <a:lvl5pPr marL="2286000" lvl="4" indent="-304800">
               <a:spcBef>
                 <a:spcPts val="1600"/>
               </a:spcBef>
@@ -3220,7 +3322,7 @@
               <a:buChar char="○"/>
               <a:defRPr sz="1200"/>
             </a:lvl5pPr>
-            <a:lvl6pPr indent="-304800" lvl="5" marL="2743200">
+            <a:lvl6pPr marL="2743200" lvl="5" indent="-304800">
               <a:spcBef>
                 <a:spcPts val="1600"/>
               </a:spcBef>
@@ -3231,7 +3333,7 @@
               <a:buChar char="■"/>
               <a:defRPr sz="1200"/>
             </a:lvl6pPr>
-            <a:lvl7pPr indent="-304800" lvl="6" marL="3200400">
+            <a:lvl7pPr marL="3200400" lvl="6" indent="-304800">
               <a:spcBef>
                 <a:spcPts val="1600"/>
               </a:spcBef>
@@ -3242,7 +3344,7 @@
               <a:buChar char="●"/>
               <a:defRPr sz="1200"/>
             </a:lvl7pPr>
-            <a:lvl8pPr indent="-304800" lvl="7" marL="3657600">
+            <a:lvl8pPr marL="3657600" lvl="7" indent="-304800">
               <a:spcBef>
                 <a:spcPts val="1600"/>
               </a:spcBef>
@@ -3253,7 +3355,7 @@
               <a:buChar char="○"/>
               <a:defRPr sz="1200"/>
             </a:lvl8pPr>
-            <a:lvl9pPr indent="-304800" lvl="8" marL="4114800">
+            <a:lvl9pPr marL="4114800" lvl="8" indent="-304800">
               <a:spcBef>
                 <a:spcPts val="1600"/>
               </a:spcBef>
@@ -3265,15 +3367,19 @@
               <a:defRPr sz="1200"/>
             </a:lvl9pPr>
           </a:lstStyle>
-          <a:p/>
+          <a:p>
+            <a:endParaRPr/>
+          </a:p>
         </p:txBody>
       </p:sp>
       <p:sp>
         <p:nvSpPr>
           <p:cNvPr id="23" name="Google Shape;23;p5"/>
-          <p:cNvSpPr txBox="1"/>
+          <p:cNvSpPr txBox="1">
+            <a:spLocks noGrp="1"/>
+          </p:cNvSpPr>
           <p:nvPr>
-            <p:ph idx="2" type="body"/>
+            <p:ph type="body" idx="2"/>
           </p:nvPr>
         </p:nvSpPr>
         <p:spPr>
@@ -3286,11 +3392,11 @@
           </a:prstGeom>
         </p:spPr>
         <p:txBody>
-          <a:bodyPr anchorCtr="0" anchor="t" bIns="91425" lIns="91425" spcFirstLastPara="1" rIns="91425" wrap="square" tIns="91425">
+          <a:bodyPr spcFirstLastPara="1" wrap="square" lIns="91425" tIns="91425" rIns="91425" bIns="91425" anchor="t" anchorCtr="0">
             <a:noAutofit/>
           </a:bodyPr>
           <a:lstStyle>
-            <a:lvl1pPr indent="-317500" lvl="0" marL="457200">
+            <a:lvl1pPr marL="457200" lvl="0" indent="-317500">
               <a:spcBef>
                 <a:spcPts val="0"/>
               </a:spcBef>
@@ -3301,7 +3407,7 @@
               <a:buChar char="●"/>
               <a:defRPr sz="1400"/>
             </a:lvl1pPr>
-            <a:lvl2pPr indent="-304800" lvl="1" marL="914400">
+            <a:lvl2pPr marL="914400" lvl="1" indent="-304800">
               <a:spcBef>
                 <a:spcPts val="1600"/>
               </a:spcBef>
@@ -3312,7 +3418,7 @@
               <a:buChar char="○"/>
               <a:defRPr sz="1200"/>
             </a:lvl2pPr>
-            <a:lvl3pPr indent="-304800" lvl="2" marL="1371600">
+            <a:lvl3pPr marL="1371600" lvl="2" indent="-304800">
               <a:spcBef>
                 <a:spcPts val="1600"/>
               </a:spcBef>
@@ -3323,7 +3429,7 @@
               <a:buChar char="■"/>
               <a:defRPr sz="1200"/>
             </a:lvl3pPr>
-            <a:lvl4pPr indent="-304800" lvl="3" marL="1828800">
+            <a:lvl4pPr marL="1828800" lvl="3" indent="-304800">
               <a:spcBef>
                 <a:spcPts val="1600"/>
               </a:spcBef>
@@ -3334,7 +3440,7 @@
               <a:buChar char="●"/>
               <a:defRPr sz="1200"/>
             </a:lvl4pPr>
-            <a:lvl5pPr indent="-304800" lvl="4" marL="2286000">
+            <a:lvl5pPr marL="2286000" lvl="4" indent="-304800">
               <a:spcBef>
                 <a:spcPts val="1600"/>
               </a:spcBef>
@@ -3345,7 +3451,7 @@
               <a:buChar char="○"/>
               <a:defRPr sz="1200"/>
             </a:lvl5pPr>
-            <a:lvl6pPr indent="-304800" lvl="5" marL="2743200">
+            <a:lvl6pPr marL="2743200" lvl="5" indent="-304800">
               <a:spcBef>
                 <a:spcPts val="1600"/>
               </a:spcBef>
@@ -3356,7 +3462,7 @@
               <a:buChar char="■"/>
               <a:defRPr sz="1200"/>
             </a:lvl6pPr>
-            <a:lvl7pPr indent="-304800" lvl="6" marL="3200400">
+            <a:lvl7pPr marL="3200400" lvl="6" indent="-304800">
               <a:spcBef>
                 <a:spcPts val="1600"/>
               </a:spcBef>
@@ -3367,7 +3473,7 @@
               <a:buChar char="●"/>
               <a:defRPr sz="1200"/>
             </a:lvl7pPr>
-            <a:lvl8pPr indent="-304800" lvl="7" marL="3657600">
+            <a:lvl8pPr marL="3657600" lvl="7" indent="-304800">
               <a:spcBef>
                 <a:spcPts val="1600"/>
               </a:spcBef>
@@ -3378,7 +3484,7 @@
               <a:buChar char="○"/>
               <a:defRPr sz="1200"/>
             </a:lvl8pPr>
-            <a:lvl9pPr indent="-304800" lvl="8" marL="4114800">
+            <a:lvl9pPr marL="4114800" lvl="8" indent="-304800">
               <a:spcBef>
                 <a:spcPts val="1600"/>
               </a:spcBef>
@@ -3390,15 +3496,19 @@
               <a:defRPr sz="1200"/>
             </a:lvl9pPr>
           </a:lstStyle>
-          <a:p/>
+          <a:p>
+            <a:endParaRPr/>
+          </a:p>
         </p:txBody>
       </p:sp>
       <p:sp>
         <p:nvSpPr>
           <p:cNvPr id="24" name="Google Shape;24;p5"/>
-          <p:cNvSpPr txBox="1"/>
+          <p:cNvSpPr txBox="1">
+            <a:spLocks noGrp="1"/>
+          </p:cNvSpPr>
           <p:nvPr>
-            <p:ph idx="12" type="sldNum"/>
+            <p:ph type="sldNum" idx="12"/>
           </p:nvPr>
         </p:nvSpPr>
         <p:spPr>
@@ -3411,7 +3521,7 @@
           </a:prstGeom>
         </p:spPr>
         <p:txBody>
-          <a:bodyPr anchorCtr="0" anchor="ctr" bIns="91425" lIns="91425" spcFirstLastPara="1" rIns="91425" wrap="square" tIns="91425">
+          <a:bodyPr spcFirstLastPara="1" wrap="square" lIns="91425" tIns="91425" rIns="91425" bIns="91425" anchor="ctr" anchorCtr="0">
             <a:noAutofit/>
           </a:bodyPr>
           <a:lstStyle>
@@ -3453,7 +3563,7 @@
             </a:lvl9pPr>
           </a:lstStyle>
           <a:p>
-            <a:pPr indent="0" lvl="0" marL="0" rtl="0" algn="r">
+            <a:pPr marL="0" lvl="0" indent="0" algn="r" rtl="0">
               <a:spcBef>
                 <a:spcPts val="0"/>
               </a:spcBef>
@@ -3479,11 +3589,11 @@
 </file>
 
 <file path=ppt/slideLayouts/slideLayout5.xml><?xml version="1.0" encoding="utf-8"?>
-<p:sldLayout xmlns:a="http://schemas.openxmlformats.org/drawingml/2006/main" xmlns:r="http://schemas.openxmlformats.org/officeDocument/2006/relationships" xmlns:mc="http://schemas.openxmlformats.org/markup-compatibility/2006" xmlns:mv="urn:schemas-microsoft-com:mac:vml" xmlns:p="http://schemas.openxmlformats.org/presentationml/2006/main" xmlns:c="http://schemas.openxmlformats.org/drawingml/2006/chart" xmlns:dgm="http://schemas.openxmlformats.org/drawingml/2006/diagram" xmlns:o="urn:schemas-microsoft-com:office:office" xmlns:v="urn:schemas-microsoft-com:vml" xmlns:pvml="urn:schemas-microsoft-com:office:powerpoint" xmlns:com="http://schemas.openxmlformats.org/drawingml/2006/compatibility" xmlns:p14="http://schemas.microsoft.com/office/powerpoint/2010/main" xmlns:p15="http://schemas.microsoft.com/office/powerpoint/2012/main" matchingName="Title only" type="titleOnly">
+<p:sldLayout xmlns:a="http://schemas.openxmlformats.org/drawingml/2006/main" xmlns:r="http://schemas.openxmlformats.org/officeDocument/2006/relationships" xmlns:p="http://schemas.openxmlformats.org/presentationml/2006/main" matchingName="Title only" type="titleOnly">
   <p:cSld name="TITLE_ONLY">
     <p:spTree>
       <p:nvGrpSpPr>
-        <p:cNvPr id="25" name="Shape 25"/>
+        <p:cNvPr id="1" name="Shape 25"/>
         <p:cNvGrpSpPr/>
         <p:nvPr/>
       </p:nvGrpSpPr>
@@ -3498,7 +3608,9 @@
       <p:sp>
         <p:nvSpPr>
           <p:cNvPr id="26" name="Google Shape;26;p6"/>
-          <p:cNvSpPr txBox="1"/>
+          <p:cNvSpPr txBox="1">
+            <a:spLocks noGrp="1"/>
+          </p:cNvSpPr>
           <p:nvPr>
             <p:ph type="title"/>
           </p:nvPr>
@@ -3513,7 +3625,7 @@
           </a:prstGeom>
         </p:spPr>
         <p:txBody>
-          <a:bodyPr anchorCtr="0" anchor="t" bIns="91425" lIns="91425" spcFirstLastPara="1" rIns="91425" wrap="square" tIns="91425">
+          <a:bodyPr spcFirstLastPara="1" wrap="square" lIns="91425" tIns="91425" rIns="91425" bIns="91425" anchor="t" anchorCtr="0">
             <a:noAutofit/>
           </a:bodyPr>
           <a:lstStyle>
@@ -3617,15 +3729,19 @@
               <a:defRPr/>
             </a:lvl9pPr>
           </a:lstStyle>
-          <a:p/>
+          <a:p>
+            <a:endParaRPr/>
+          </a:p>
         </p:txBody>
       </p:sp>
       <p:sp>
         <p:nvSpPr>
           <p:cNvPr id="27" name="Google Shape;27;p6"/>
-          <p:cNvSpPr txBox="1"/>
+          <p:cNvSpPr txBox="1">
+            <a:spLocks noGrp="1"/>
+          </p:cNvSpPr>
           <p:nvPr>
-            <p:ph idx="12" type="sldNum"/>
+            <p:ph type="sldNum" idx="12"/>
           </p:nvPr>
         </p:nvSpPr>
         <p:spPr>
@@ -3638,7 +3754,7 @@
           </a:prstGeom>
         </p:spPr>
         <p:txBody>
-          <a:bodyPr anchorCtr="0" anchor="ctr" bIns="91425" lIns="91425" spcFirstLastPara="1" rIns="91425" wrap="square" tIns="91425">
+          <a:bodyPr spcFirstLastPara="1" wrap="square" lIns="91425" tIns="91425" rIns="91425" bIns="91425" anchor="ctr" anchorCtr="0">
             <a:noAutofit/>
           </a:bodyPr>
           <a:lstStyle>
@@ -3680,7 +3796,7 @@
             </a:lvl9pPr>
           </a:lstStyle>
           <a:p>
-            <a:pPr indent="0" lvl="0" marL="0" rtl="0" algn="r">
+            <a:pPr marL="0" lvl="0" indent="0" algn="r" rtl="0">
               <a:spcBef>
                 <a:spcPts val="0"/>
               </a:spcBef>
@@ -3706,11 +3822,11 @@
 </file>
 
 <file path=ppt/slideLayouts/slideLayout6.xml><?xml version="1.0" encoding="utf-8"?>
-<p:sldLayout xmlns:a="http://schemas.openxmlformats.org/drawingml/2006/main" xmlns:r="http://schemas.openxmlformats.org/officeDocument/2006/relationships" xmlns:mc="http://schemas.openxmlformats.org/markup-compatibility/2006" xmlns:mv="urn:schemas-microsoft-com:mac:vml" xmlns:p="http://schemas.openxmlformats.org/presentationml/2006/main" xmlns:c="http://schemas.openxmlformats.org/drawingml/2006/chart" xmlns:dgm="http://schemas.openxmlformats.org/drawingml/2006/diagram" xmlns:o="urn:schemas-microsoft-com:office:office" xmlns:v="urn:schemas-microsoft-com:vml" xmlns:pvml="urn:schemas-microsoft-com:office:powerpoint" xmlns:com="http://schemas.openxmlformats.org/drawingml/2006/compatibility" xmlns:p14="http://schemas.microsoft.com/office/powerpoint/2010/main" xmlns:p15="http://schemas.microsoft.com/office/powerpoint/2012/main" matchingName="One column text">
+<p:sldLayout xmlns:a="http://schemas.openxmlformats.org/drawingml/2006/main" xmlns:r="http://schemas.openxmlformats.org/officeDocument/2006/relationships" xmlns:p="http://schemas.openxmlformats.org/presentationml/2006/main" matchingName="One column text">
   <p:cSld name="ONE_COLUMN_TEXT">
     <p:spTree>
       <p:nvGrpSpPr>
-        <p:cNvPr id="28" name="Shape 28"/>
+        <p:cNvPr id="1" name="Shape 28"/>
         <p:cNvGrpSpPr/>
         <p:nvPr/>
       </p:nvGrpSpPr>
@@ -3725,7 +3841,9 @@
       <p:sp>
         <p:nvSpPr>
           <p:cNvPr id="29" name="Google Shape;29;p7"/>
-          <p:cNvSpPr txBox="1"/>
+          <p:cNvSpPr txBox="1">
+            <a:spLocks noGrp="1"/>
+          </p:cNvSpPr>
           <p:nvPr>
             <p:ph type="title"/>
           </p:nvPr>
@@ -3740,7 +3858,7 @@
           </a:prstGeom>
         </p:spPr>
         <p:txBody>
-          <a:bodyPr anchorCtr="0" anchor="b" bIns="91425" lIns="91425" spcFirstLastPara="1" rIns="91425" wrap="square" tIns="91425">
+          <a:bodyPr spcFirstLastPara="1" wrap="square" lIns="91425" tIns="91425" rIns="91425" bIns="91425" anchor="b" anchorCtr="0">
             <a:noAutofit/>
           </a:bodyPr>
           <a:lstStyle>
@@ -3844,15 +3962,19 @@
               <a:defRPr sz="2400"/>
             </a:lvl9pPr>
           </a:lstStyle>
-          <a:p/>
+          <a:p>
+            <a:endParaRPr/>
+          </a:p>
         </p:txBody>
       </p:sp>
       <p:sp>
         <p:nvSpPr>
           <p:cNvPr id="30" name="Google Shape;30;p7"/>
-          <p:cNvSpPr txBox="1"/>
+          <p:cNvSpPr txBox="1">
+            <a:spLocks noGrp="1"/>
+          </p:cNvSpPr>
           <p:nvPr>
-            <p:ph idx="1" type="body"/>
+            <p:ph type="body" idx="1"/>
           </p:nvPr>
         </p:nvSpPr>
         <p:spPr>
@@ -3865,11 +3987,11 @@
           </a:prstGeom>
         </p:spPr>
         <p:txBody>
-          <a:bodyPr anchorCtr="0" anchor="t" bIns="91425" lIns="91425" spcFirstLastPara="1" rIns="91425" wrap="square" tIns="91425">
+          <a:bodyPr spcFirstLastPara="1" wrap="square" lIns="91425" tIns="91425" rIns="91425" bIns="91425" anchor="t" anchorCtr="0">
             <a:noAutofit/>
           </a:bodyPr>
           <a:lstStyle>
-            <a:lvl1pPr indent="-304800" lvl="0" marL="457200">
+            <a:lvl1pPr marL="457200" lvl="0" indent="-304800">
               <a:spcBef>
                 <a:spcPts val="0"/>
               </a:spcBef>
@@ -3880,7 +4002,7 @@
               <a:buChar char="●"/>
               <a:defRPr sz="1200"/>
             </a:lvl1pPr>
-            <a:lvl2pPr indent="-304800" lvl="1" marL="914400">
+            <a:lvl2pPr marL="914400" lvl="1" indent="-304800">
               <a:spcBef>
                 <a:spcPts val="1600"/>
               </a:spcBef>
@@ -3891,7 +4013,7 @@
               <a:buChar char="○"/>
               <a:defRPr sz="1200"/>
             </a:lvl2pPr>
-            <a:lvl3pPr indent="-304800" lvl="2" marL="1371600">
+            <a:lvl3pPr marL="1371600" lvl="2" indent="-304800">
               <a:spcBef>
                 <a:spcPts val="1600"/>
               </a:spcBef>
@@ -3902,7 +4024,7 @@
               <a:buChar char="■"/>
               <a:defRPr sz="1200"/>
             </a:lvl3pPr>
-            <a:lvl4pPr indent="-304800" lvl="3" marL="1828800">
+            <a:lvl4pPr marL="1828800" lvl="3" indent="-304800">
               <a:spcBef>
                 <a:spcPts val="1600"/>
               </a:spcBef>
@@ -3913,7 +4035,7 @@
               <a:buChar char="●"/>
               <a:defRPr sz="1200"/>
             </a:lvl4pPr>
-            <a:lvl5pPr indent="-304800" lvl="4" marL="2286000">
+            <a:lvl5pPr marL="2286000" lvl="4" indent="-304800">
               <a:spcBef>
                 <a:spcPts val="1600"/>
               </a:spcBef>
@@ -3924,7 +4046,7 @@
               <a:buChar char="○"/>
               <a:defRPr sz="1200"/>
             </a:lvl5pPr>
-            <a:lvl6pPr indent="-304800" lvl="5" marL="2743200">
+            <a:lvl6pPr marL="2743200" lvl="5" indent="-304800">
               <a:spcBef>
                 <a:spcPts val="1600"/>
               </a:spcBef>
@@ -3935,7 +4057,7 @@
               <a:buChar char="■"/>
               <a:defRPr sz="1200"/>
             </a:lvl6pPr>
-            <a:lvl7pPr indent="-304800" lvl="6" marL="3200400">
+            <a:lvl7pPr marL="3200400" lvl="6" indent="-304800">
               <a:spcBef>
                 <a:spcPts val="1600"/>
               </a:spcBef>
@@ -3946,7 +4068,7 @@
               <a:buChar char="●"/>
               <a:defRPr sz="1200"/>
             </a:lvl7pPr>
-            <a:lvl8pPr indent="-304800" lvl="7" marL="3657600">
+            <a:lvl8pPr marL="3657600" lvl="7" indent="-304800">
               <a:spcBef>
                 <a:spcPts val="1600"/>
               </a:spcBef>
@@ -3957,7 +4079,7 @@
               <a:buChar char="○"/>
               <a:defRPr sz="1200"/>
             </a:lvl8pPr>
-            <a:lvl9pPr indent="-304800" lvl="8" marL="4114800">
+            <a:lvl9pPr marL="4114800" lvl="8" indent="-304800">
               <a:spcBef>
                 <a:spcPts val="1600"/>
               </a:spcBef>
@@ -3969,15 +4091,19 @@
               <a:defRPr sz="1200"/>
             </a:lvl9pPr>
           </a:lstStyle>
-          <a:p/>
+          <a:p>
+            <a:endParaRPr/>
+          </a:p>
         </p:txBody>
       </p:sp>
       <p:sp>
         <p:nvSpPr>
           <p:cNvPr id="31" name="Google Shape;31;p7"/>
-          <p:cNvSpPr txBox="1"/>
+          <p:cNvSpPr txBox="1">
+            <a:spLocks noGrp="1"/>
+          </p:cNvSpPr>
           <p:nvPr>
-            <p:ph idx="12" type="sldNum"/>
+            <p:ph type="sldNum" idx="12"/>
           </p:nvPr>
         </p:nvSpPr>
         <p:spPr>
@@ -3990,7 +4116,7 @@
           </a:prstGeom>
         </p:spPr>
         <p:txBody>
-          <a:bodyPr anchorCtr="0" anchor="ctr" bIns="91425" lIns="91425" spcFirstLastPara="1" rIns="91425" wrap="square" tIns="91425">
+          <a:bodyPr spcFirstLastPara="1" wrap="square" lIns="91425" tIns="91425" rIns="91425" bIns="91425" anchor="ctr" anchorCtr="0">
             <a:noAutofit/>
           </a:bodyPr>
           <a:lstStyle>
@@ -4032,7 +4158,7 @@
             </a:lvl9pPr>
           </a:lstStyle>
           <a:p>
-            <a:pPr indent="0" lvl="0" marL="0" rtl="0" algn="r">
+            <a:pPr marL="0" lvl="0" indent="0" algn="r" rtl="0">
               <a:spcBef>
                 <a:spcPts val="0"/>
               </a:spcBef>
@@ -4058,11 +4184,11 @@
 </file>
 
 <file path=ppt/slideLayouts/slideLayout7.xml><?xml version="1.0" encoding="utf-8"?>
-<p:sldLayout xmlns:a="http://schemas.openxmlformats.org/drawingml/2006/main" xmlns:r="http://schemas.openxmlformats.org/officeDocument/2006/relationships" xmlns:mc="http://schemas.openxmlformats.org/markup-compatibility/2006" xmlns:mv="urn:schemas-microsoft-com:mac:vml" xmlns:p="http://schemas.openxmlformats.org/presentationml/2006/main" xmlns:c="http://schemas.openxmlformats.org/drawingml/2006/chart" xmlns:dgm="http://schemas.openxmlformats.org/drawingml/2006/diagram" xmlns:o="urn:schemas-microsoft-com:office:office" xmlns:v="urn:schemas-microsoft-com:vml" xmlns:pvml="urn:schemas-microsoft-com:office:powerpoint" xmlns:com="http://schemas.openxmlformats.org/drawingml/2006/compatibility" xmlns:p14="http://schemas.microsoft.com/office/powerpoint/2010/main" xmlns:p15="http://schemas.microsoft.com/office/powerpoint/2012/main" matchingName="Main point">
+<p:sldLayout xmlns:a="http://schemas.openxmlformats.org/drawingml/2006/main" xmlns:r="http://schemas.openxmlformats.org/officeDocument/2006/relationships" xmlns:p="http://schemas.openxmlformats.org/presentationml/2006/main" matchingName="Main point">
   <p:cSld name="MAIN_POINT">
     <p:spTree>
       <p:nvGrpSpPr>
-        <p:cNvPr id="32" name="Shape 32"/>
+        <p:cNvPr id="1" name="Shape 32"/>
         <p:cNvGrpSpPr/>
         <p:nvPr/>
       </p:nvGrpSpPr>
@@ -4077,7 +4203,9 @@
       <p:sp>
         <p:nvSpPr>
           <p:cNvPr id="33" name="Google Shape;33;p8"/>
-          <p:cNvSpPr txBox="1"/>
+          <p:cNvSpPr txBox="1">
+            <a:spLocks noGrp="1"/>
+          </p:cNvSpPr>
           <p:nvPr>
             <p:ph type="title"/>
           </p:nvPr>
@@ -4092,7 +4220,7 @@
           </a:prstGeom>
         </p:spPr>
         <p:txBody>
-          <a:bodyPr anchorCtr="0" anchor="ctr" bIns="91425" lIns="91425" spcFirstLastPara="1" rIns="91425" wrap="square" tIns="91425">
+          <a:bodyPr spcFirstLastPara="1" wrap="square" lIns="91425" tIns="91425" rIns="91425" bIns="91425" anchor="ctr" anchorCtr="0">
             <a:noAutofit/>
           </a:bodyPr>
           <a:lstStyle>
@@ -4196,15 +4324,19 @@
               <a:defRPr sz="4800"/>
             </a:lvl9pPr>
           </a:lstStyle>
-          <a:p/>
+          <a:p>
+            <a:endParaRPr/>
+          </a:p>
         </p:txBody>
       </p:sp>
       <p:sp>
         <p:nvSpPr>
           <p:cNvPr id="34" name="Google Shape;34;p8"/>
-          <p:cNvSpPr txBox="1"/>
+          <p:cNvSpPr txBox="1">
+            <a:spLocks noGrp="1"/>
+          </p:cNvSpPr>
           <p:nvPr>
-            <p:ph idx="12" type="sldNum"/>
+            <p:ph type="sldNum" idx="12"/>
           </p:nvPr>
         </p:nvSpPr>
         <p:spPr>
@@ -4217,7 +4349,7 @@
           </a:prstGeom>
         </p:spPr>
         <p:txBody>
-          <a:bodyPr anchorCtr="0" anchor="ctr" bIns="91425" lIns="91425" spcFirstLastPara="1" rIns="91425" wrap="square" tIns="91425">
+          <a:bodyPr spcFirstLastPara="1" wrap="square" lIns="91425" tIns="91425" rIns="91425" bIns="91425" anchor="ctr" anchorCtr="0">
             <a:noAutofit/>
           </a:bodyPr>
           <a:lstStyle>
@@ -4259,7 +4391,7 @@
             </a:lvl9pPr>
           </a:lstStyle>
           <a:p>
-            <a:pPr indent="0" lvl="0" marL="0" rtl="0" algn="r">
+            <a:pPr marL="0" lvl="0" indent="0" algn="r" rtl="0">
               <a:spcBef>
                 <a:spcPts val="0"/>
               </a:spcBef>
@@ -4285,11 +4417,11 @@
 </file>
 
 <file path=ppt/slideLayouts/slideLayout8.xml><?xml version="1.0" encoding="utf-8"?>
-<p:sldLayout xmlns:a="http://schemas.openxmlformats.org/drawingml/2006/main" xmlns:r="http://schemas.openxmlformats.org/officeDocument/2006/relationships" xmlns:mc="http://schemas.openxmlformats.org/markup-compatibility/2006" xmlns:mv="urn:schemas-microsoft-com:mac:vml" xmlns:p="http://schemas.openxmlformats.org/presentationml/2006/main" xmlns:c="http://schemas.openxmlformats.org/drawingml/2006/chart" xmlns:dgm="http://schemas.openxmlformats.org/drawingml/2006/diagram" xmlns:o="urn:schemas-microsoft-com:office:office" xmlns:v="urn:schemas-microsoft-com:vml" xmlns:pvml="urn:schemas-microsoft-com:office:powerpoint" xmlns:com="http://schemas.openxmlformats.org/drawingml/2006/compatibility" xmlns:p14="http://schemas.microsoft.com/office/powerpoint/2010/main" xmlns:p15="http://schemas.microsoft.com/office/powerpoint/2012/main" matchingName="Section title and description">
+<p:sldLayout xmlns:a="http://schemas.openxmlformats.org/drawingml/2006/main" xmlns:r="http://schemas.openxmlformats.org/officeDocument/2006/relationships" xmlns:p="http://schemas.openxmlformats.org/presentationml/2006/main" matchingName="Section title and description">
   <p:cSld name="SECTION_TITLE_AND_DESCRIPTION">
     <p:spTree>
       <p:nvGrpSpPr>
-        <p:cNvPr id="35" name="Shape 35"/>
+        <p:cNvPr id="1" name="Shape 35"/>
         <p:cNvGrpSpPr/>
         <p:nvPr/>
       </p:nvGrpSpPr>
@@ -4323,12 +4455,12 @@
           </a:ln>
         </p:spPr>
         <p:txBody>
-          <a:bodyPr anchorCtr="0" anchor="ctr" bIns="91425" lIns="91425" spcFirstLastPara="1" rIns="91425" wrap="square" tIns="91425">
+          <a:bodyPr spcFirstLastPara="1" wrap="square" lIns="91425" tIns="91425" rIns="91425" bIns="91425" anchor="ctr" anchorCtr="0">
             <a:noAutofit/>
           </a:bodyPr>
           <a:lstStyle/>
           <a:p>
-            <a:pPr indent="0" lvl="0" marL="0" rtl="0" algn="l">
+            <a:pPr marL="0" lvl="0" indent="0" algn="l" rtl="0">
               <a:spcBef>
                 <a:spcPts val="0"/>
               </a:spcBef>
@@ -4337,9 +4469,6 @@
               </a:spcAft>
               <a:buNone/>
             </a:pPr>
-            <a:r>
-              <a:t/>
-            </a:r>
             <a:endParaRPr/>
           </a:p>
         </p:txBody>
@@ -4347,7 +4476,9 @@
       <p:sp>
         <p:nvSpPr>
           <p:cNvPr id="37" name="Google Shape;37;p9"/>
-          <p:cNvSpPr txBox="1"/>
+          <p:cNvSpPr txBox="1">
+            <a:spLocks noGrp="1"/>
+          </p:cNvSpPr>
           <p:nvPr>
             <p:ph type="title"/>
           </p:nvPr>
@@ -4362,7 +4493,7 @@
           </a:prstGeom>
         </p:spPr>
         <p:txBody>
-          <a:bodyPr anchorCtr="0" anchor="b" bIns="91425" lIns="91425" spcFirstLastPara="1" rIns="91425" wrap="square" tIns="91425">
+          <a:bodyPr spcFirstLastPara="1" wrap="square" lIns="91425" tIns="91425" rIns="91425" bIns="91425" anchor="b" anchorCtr="0">
             <a:noAutofit/>
           </a:bodyPr>
           <a:lstStyle>
@@ -4466,15 +4597,19 @@
               <a:defRPr sz="4200"/>
             </a:lvl9pPr>
           </a:lstStyle>
-          <a:p/>
+          <a:p>
+            <a:endParaRPr/>
+          </a:p>
         </p:txBody>
       </p:sp>
       <p:sp>
         <p:nvSpPr>
           <p:cNvPr id="38" name="Google Shape;38;p9"/>
-          <p:cNvSpPr txBox="1"/>
+          <p:cNvSpPr txBox="1">
+            <a:spLocks noGrp="1"/>
+          </p:cNvSpPr>
           <p:nvPr>
-            <p:ph idx="1" type="subTitle"/>
+            <p:ph type="subTitle" idx="1"/>
           </p:nvPr>
         </p:nvSpPr>
         <p:spPr>
@@ -4487,7 +4622,7 @@
           </a:prstGeom>
         </p:spPr>
         <p:txBody>
-          <a:bodyPr anchorCtr="0" anchor="t" bIns="91425" lIns="91425" spcFirstLastPara="1" rIns="91425" wrap="square" tIns="91425">
+          <a:bodyPr spcFirstLastPara="1" wrap="square" lIns="91425" tIns="91425" rIns="91425" bIns="91425" anchor="t" anchorCtr="0">
             <a:noAutofit/>
           </a:bodyPr>
           <a:lstStyle>
@@ -4618,15 +4753,19 @@
               <a:defRPr sz="2100"/>
             </a:lvl9pPr>
           </a:lstStyle>
-          <a:p/>
+          <a:p>
+            <a:endParaRPr/>
+          </a:p>
         </p:txBody>
       </p:sp>
       <p:sp>
         <p:nvSpPr>
           <p:cNvPr id="39" name="Google Shape;39;p9"/>
-          <p:cNvSpPr txBox="1"/>
+          <p:cNvSpPr txBox="1">
+            <a:spLocks noGrp="1"/>
+          </p:cNvSpPr>
           <p:nvPr>
-            <p:ph idx="2" type="body"/>
+            <p:ph type="body" idx="2"/>
           </p:nvPr>
         </p:nvSpPr>
         <p:spPr>
@@ -4639,11 +4778,11 @@
           </a:prstGeom>
         </p:spPr>
         <p:txBody>
-          <a:bodyPr anchorCtr="0" anchor="ctr" bIns="91425" lIns="91425" spcFirstLastPara="1" rIns="91425" wrap="square" tIns="91425">
+          <a:bodyPr spcFirstLastPara="1" wrap="square" lIns="91425" tIns="91425" rIns="91425" bIns="91425" anchor="ctr" anchorCtr="0">
             <a:noAutofit/>
           </a:bodyPr>
           <a:lstStyle>
-            <a:lvl1pPr indent="-342900" lvl="0" marL="457200">
+            <a:lvl1pPr marL="457200" lvl="0" indent="-342900">
               <a:spcBef>
                 <a:spcPts val="0"/>
               </a:spcBef>
@@ -4654,7 +4793,7 @@
               <a:buChar char="●"/>
               <a:defRPr/>
             </a:lvl1pPr>
-            <a:lvl2pPr indent="-317500" lvl="1" marL="914400">
+            <a:lvl2pPr marL="914400" lvl="1" indent="-317500">
               <a:spcBef>
                 <a:spcPts val="1600"/>
               </a:spcBef>
@@ -4665,7 +4804,7 @@
               <a:buChar char="○"/>
               <a:defRPr/>
             </a:lvl2pPr>
-            <a:lvl3pPr indent="-317500" lvl="2" marL="1371600">
+            <a:lvl3pPr marL="1371600" lvl="2" indent="-317500">
               <a:spcBef>
                 <a:spcPts val="1600"/>
               </a:spcBef>
@@ -4676,7 +4815,7 @@
               <a:buChar char="■"/>
               <a:defRPr/>
             </a:lvl3pPr>
-            <a:lvl4pPr indent="-317500" lvl="3" marL="1828800">
+            <a:lvl4pPr marL="1828800" lvl="3" indent="-317500">
               <a:spcBef>
                 <a:spcPts val="1600"/>
               </a:spcBef>
@@ -4687,7 +4826,7 @@
               <a:buChar char="●"/>
               <a:defRPr/>
             </a:lvl4pPr>
-            <a:lvl5pPr indent="-317500" lvl="4" marL="2286000">
+            <a:lvl5pPr marL="2286000" lvl="4" indent="-317500">
               <a:spcBef>
                 <a:spcPts val="1600"/>
               </a:spcBef>
@@ -4698,7 +4837,7 @@
               <a:buChar char="○"/>
               <a:defRPr/>
             </a:lvl5pPr>
-            <a:lvl6pPr indent="-317500" lvl="5" marL="2743200">
+            <a:lvl6pPr marL="2743200" lvl="5" indent="-317500">
               <a:spcBef>
                 <a:spcPts val="1600"/>
               </a:spcBef>
@@ -4709,7 +4848,7 @@
               <a:buChar char="■"/>
               <a:defRPr/>
             </a:lvl6pPr>
-            <a:lvl7pPr indent="-317500" lvl="6" marL="3200400">
+            <a:lvl7pPr marL="3200400" lvl="6" indent="-317500">
               <a:spcBef>
                 <a:spcPts val="1600"/>
               </a:spcBef>
@@ -4720,7 +4859,7 @@
               <a:buChar char="●"/>
               <a:defRPr/>
             </a:lvl7pPr>
-            <a:lvl8pPr indent="-317500" lvl="7" marL="3657600">
+            <a:lvl8pPr marL="3657600" lvl="7" indent="-317500">
               <a:spcBef>
                 <a:spcPts val="1600"/>
               </a:spcBef>
@@ -4731,7 +4870,7 @@
               <a:buChar char="○"/>
               <a:defRPr/>
             </a:lvl8pPr>
-            <a:lvl9pPr indent="-317500" lvl="8" marL="4114800">
+            <a:lvl9pPr marL="4114800" lvl="8" indent="-317500">
               <a:spcBef>
                 <a:spcPts val="1600"/>
               </a:spcBef>
@@ -4743,15 +4882,19 @@
               <a:defRPr/>
             </a:lvl9pPr>
           </a:lstStyle>
-          <a:p/>
+          <a:p>
+            <a:endParaRPr/>
+          </a:p>
         </p:txBody>
       </p:sp>
       <p:sp>
         <p:nvSpPr>
           <p:cNvPr id="40" name="Google Shape;40;p9"/>
-          <p:cNvSpPr txBox="1"/>
+          <p:cNvSpPr txBox="1">
+            <a:spLocks noGrp="1"/>
+          </p:cNvSpPr>
           <p:nvPr>
-            <p:ph idx="12" type="sldNum"/>
+            <p:ph type="sldNum" idx="12"/>
           </p:nvPr>
         </p:nvSpPr>
         <p:spPr>
@@ -4764,7 +4907,7 @@
           </a:prstGeom>
         </p:spPr>
         <p:txBody>
-          <a:bodyPr anchorCtr="0" anchor="ctr" bIns="91425" lIns="91425" spcFirstLastPara="1" rIns="91425" wrap="square" tIns="91425">
+          <a:bodyPr spcFirstLastPara="1" wrap="square" lIns="91425" tIns="91425" rIns="91425" bIns="91425" anchor="ctr" anchorCtr="0">
             <a:noAutofit/>
           </a:bodyPr>
           <a:lstStyle>
@@ -4806,7 +4949,7 @@
             </a:lvl9pPr>
           </a:lstStyle>
           <a:p>
-            <a:pPr indent="0" lvl="0" marL="0" rtl="0" algn="r">
+            <a:pPr marL="0" lvl="0" indent="0" algn="r" rtl="0">
               <a:spcBef>
                 <a:spcPts val="0"/>
               </a:spcBef>
@@ -4832,11 +4975,11 @@
 </file>
 
 <file path=ppt/slideLayouts/slideLayout9.xml><?xml version="1.0" encoding="utf-8"?>
-<p:sldLayout xmlns:a="http://schemas.openxmlformats.org/drawingml/2006/main" xmlns:r="http://schemas.openxmlformats.org/officeDocument/2006/relationships" xmlns:mc="http://schemas.openxmlformats.org/markup-compatibility/2006" xmlns:mv="urn:schemas-microsoft-com:mac:vml" xmlns:p="http://schemas.openxmlformats.org/presentationml/2006/main" xmlns:c="http://schemas.openxmlformats.org/drawingml/2006/chart" xmlns:dgm="http://schemas.openxmlformats.org/drawingml/2006/diagram" xmlns:o="urn:schemas-microsoft-com:office:office" xmlns:v="urn:schemas-microsoft-com:vml" xmlns:pvml="urn:schemas-microsoft-com:office:powerpoint" xmlns:com="http://schemas.openxmlformats.org/drawingml/2006/compatibility" xmlns:p14="http://schemas.microsoft.com/office/powerpoint/2010/main" xmlns:p15="http://schemas.microsoft.com/office/powerpoint/2012/main" matchingName="Caption">
+<p:sldLayout xmlns:a="http://schemas.openxmlformats.org/drawingml/2006/main" xmlns:r="http://schemas.openxmlformats.org/officeDocument/2006/relationships" xmlns:p="http://schemas.openxmlformats.org/presentationml/2006/main" matchingName="Caption">
   <p:cSld name="CAPTION_ONLY">
     <p:spTree>
       <p:nvGrpSpPr>
-        <p:cNvPr id="41" name="Shape 41"/>
+        <p:cNvPr id="1" name="Shape 41"/>
         <p:cNvGrpSpPr/>
         <p:nvPr/>
       </p:nvGrpSpPr>
@@ -4851,9 +4994,11 @@
       <p:sp>
         <p:nvSpPr>
           <p:cNvPr id="42" name="Google Shape;42;p10"/>
-          <p:cNvSpPr txBox="1"/>
+          <p:cNvSpPr txBox="1">
+            <a:spLocks noGrp="1"/>
+          </p:cNvSpPr>
           <p:nvPr>
-            <p:ph idx="1" type="body"/>
+            <p:ph type="body" idx="1"/>
           </p:nvPr>
         </p:nvSpPr>
         <p:spPr>
@@ -4866,11 +5011,11 @@
           </a:prstGeom>
         </p:spPr>
         <p:txBody>
-          <a:bodyPr anchorCtr="0" anchor="ctr" bIns="91425" lIns="91425" spcFirstLastPara="1" rIns="91425" wrap="square" tIns="91425">
+          <a:bodyPr spcFirstLastPara="1" wrap="square" lIns="91425" tIns="91425" rIns="91425" bIns="91425" anchor="ctr" anchorCtr="0">
             <a:noAutofit/>
           </a:bodyPr>
           <a:lstStyle>
-            <a:lvl1pPr indent="-228600" lvl="0" marL="457200">
+            <a:lvl1pPr marL="457200" lvl="0" indent="-228600">
               <a:lnSpc>
                 <a:spcPct val="100000"/>
               </a:lnSpc>
@@ -4885,15 +5030,19 @@
               <a:defRPr/>
             </a:lvl1pPr>
           </a:lstStyle>
-          <a:p/>
+          <a:p>
+            <a:endParaRPr/>
+          </a:p>
         </p:txBody>
       </p:sp>
       <p:sp>
         <p:nvSpPr>
           <p:cNvPr id="43" name="Google Shape;43;p10"/>
-          <p:cNvSpPr txBox="1"/>
+          <p:cNvSpPr txBox="1">
+            <a:spLocks noGrp="1"/>
+          </p:cNvSpPr>
           <p:nvPr>
-            <p:ph idx="12" type="sldNum"/>
+            <p:ph type="sldNum" idx="12"/>
           </p:nvPr>
         </p:nvSpPr>
         <p:spPr>
@@ -4906,7 +5055,7 @@
           </a:prstGeom>
         </p:spPr>
         <p:txBody>
-          <a:bodyPr anchorCtr="0" anchor="ctr" bIns="91425" lIns="91425" spcFirstLastPara="1" rIns="91425" wrap="square" tIns="91425">
+          <a:bodyPr spcFirstLastPara="1" wrap="square" lIns="91425" tIns="91425" rIns="91425" bIns="91425" anchor="ctr" anchorCtr="0">
             <a:noAutofit/>
           </a:bodyPr>
           <a:lstStyle>
@@ -4948,7 +5097,7 @@
             </a:lvl9pPr>
           </a:lstStyle>
           <a:p>
-            <a:pPr indent="0" lvl="0" marL="0" rtl="0" algn="r">
+            <a:pPr marL="0" lvl="0" indent="0" algn="r" rtl="0">
               <a:spcBef>
                 <a:spcPts val="0"/>
               </a:spcBef>
@@ -4974,18 +5123,19 @@
 </file>
 
 <file path=ppt/slideMasters/slideMaster1.xml><?xml version="1.0" encoding="utf-8"?>
-<p:sldMaster xmlns:a="http://schemas.openxmlformats.org/drawingml/2006/main" xmlns:r="http://schemas.openxmlformats.org/officeDocument/2006/relationships" xmlns:mc="http://schemas.openxmlformats.org/markup-compatibility/2006" xmlns:mv="urn:schemas-microsoft-com:mac:vml" xmlns:p="http://schemas.openxmlformats.org/presentationml/2006/main" xmlns:c="http://schemas.openxmlformats.org/drawingml/2006/chart" xmlns:dgm="http://schemas.openxmlformats.org/drawingml/2006/diagram" xmlns:o="urn:schemas-microsoft-com:office:office" xmlns:v="urn:schemas-microsoft-com:vml" xmlns:pvml="urn:schemas-microsoft-com:office:powerpoint" xmlns:com="http://schemas.openxmlformats.org/drawingml/2006/compatibility" xmlns:p14="http://schemas.microsoft.com/office/powerpoint/2010/main" xmlns:p15="http://schemas.microsoft.com/office/powerpoint/2012/main">
+<p:sldMaster xmlns:a="http://schemas.openxmlformats.org/drawingml/2006/main" xmlns:r="http://schemas.openxmlformats.org/officeDocument/2006/relationships" xmlns:p="http://schemas.openxmlformats.org/presentationml/2006/main">
   <p:cSld name="simple-light-2">
     <p:bg>
       <p:bgPr>
         <a:solidFill>
           <a:schemeClr val="lt1"/>
         </a:solidFill>
+        <a:effectLst/>
       </p:bgPr>
     </p:bg>
     <p:spTree>
       <p:nvGrpSpPr>
-        <p:cNvPr id="5" name="Shape 5"/>
+        <p:cNvPr id="1" name="Shape 5"/>
         <p:cNvGrpSpPr/>
         <p:nvPr/>
       </p:nvGrpSpPr>
@@ -5000,7 +5150,9 @@
       <p:sp>
         <p:nvSpPr>
           <p:cNvPr id="6" name="Google Shape;6;p1"/>
-          <p:cNvSpPr txBox="1"/>
+          <p:cNvSpPr txBox="1">
+            <a:spLocks noGrp="1"/>
+          </p:cNvSpPr>
           <p:nvPr>
             <p:ph type="title"/>
           </p:nvPr>
@@ -5019,7 +5171,7 @@
           </a:ln>
         </p:spPr>
         <p:txBody>
-          <a:bodyPr anchorCtr="0" anchor="t" bIns="91425" lIns="91425" spcFirstLastPara="1" rIns="91425" wrap="square" tIns="91425">
+          <a:bodyPr spcFirstLastPara="1" wrap="square" lIns="91425" tIns="91425" rIns="91425" bIns="91425" anchor="t" anchorCtr="0">
             <a:noAutofit/>
           </a:bodyPr>
           <a:lstStyle>
@@ -5186,15 +5338,19 @@
               </a:defRPr>
             </a:lvl9pPr>
           </a:lstStyle>
-          <a:p/>
+          <a:p>
+            <a:endParaRPr/>
+          </a:p>
         </p:txBody>
       </p:sp>
       <p:sp>
         <p:nvSpPr>
           <p:cNvPr id="7" name="Google Shape;7;p1"/>
-          <p:cNvSpPr txBox="1"/>
+          <p:cNvSpPr txBox="1">
+            <a:spLocks noGrp="1"/>
+          </p:cNvSpPr>
           <p:nvPr>
-            <p:ph idx="1" type="body"/>
+            <p:ph type="body" idx="1"/>
           </p:nvPr>
         </p:nvSpPr>
         <p:spPr>
@@ -5211,11 +5367,11 @@
           </a:ln>
         </p:spPr>
         <p:txBody>
-          <a:bodyPr anchorCtr="0" anchor="t" bIns="91425" lIns="91425" spcFirstLastPara="1" rIns="91425" wrap="square" tIns="91425">
+          <a:bodyPr spcFirstLastPara="1" wrap="square" lIns="91425" tIns="91425" rIns="91425" bIns="91425" anchor="t" anchorCtr="0">
             <a:noAutofit/>
           </a:bodyPr>
           <a:lstStyle>
-            <a:lvl1pPr indent="-342900" lvl="0" marL="457200">
+            <a:lvl1pPr marL="457200" lvl="0" indent="-342900">
               <a:lnSpc>
                 <a:spcPct val="115000"/>
               </a:lnSpc>
@@ -5236,7 +5392,7 @@
                 </a:solidFill>
               </a:defRPr>
             </a:lvl1pPr>
-            <a:lvl2pPr indent="-317500" lvl="1" marL="914400">
+            <a:lvl2pPr marL="914400" lvl="1" indent="-317500">
               <a:lnSpc>
                 <a:spcPct val="115000"/>
               </a:lnSpc>
@@ -5257,7 +5413,7 @@
                 </a:solidFill>
               </a:defRPr>
             </a:lvl2pPr>
-            <a:lvl3pPr indent="-317500" lvl="2" marL="1371600">
+            <a:lvl3pPr marL="1371600" lvl="2" indent="-317500">
               <a:lnSpc>
                 <a:spcPct val="115000"/>
               </a:lnSpc>
@@ -5278,7 +5434,7 @@
                 </a:solidFill>
               </a:defRPr>
             </a:lvl3pPr>
-            <a:lvl4pPr indent="-317500" lvl="3" marL="1828800">
+            <a:lvl4pPr marL="1828800" lvl="3" indent="-317500">
               <a:lnSpc>
                 <a:spcPct val="115000"/>
               </a:lnSpc>
@@ -5299,7 +5455,7 @@
                 </a:solidFill>
               </a:defRPr>
             </a:lvl4pPr>
-            <a:lvl5pPr indent="-317500" lvl="4" marL="2286000">
+            <a:lvl5pPr marL="2286000" lvl="4" indent="-317500">
               <a:lnSpc>
                 <a:spcPct val="115000"/>
               </a:lnSpc>
@@ -5320,7 +5476,7 @@
                 </a:solidFill>
               </a:defRPr>
             </a:lvl5pPr>
-            <a:lvl6pPr indent="-317500" lvl="5" marL="2743200">
+            <a:lvl6pPr marL="2743200" lvl="5" indent="-317500">
               <a:lnSpc>
                 <a:spcPct val="115000"/>
               </a:lnSpc>
@@ -5341,7 +5497,7 @@
                 </a:solidFill>
               </a:defRPr>
             </a:lvl6pPr>
-            <a:lvl7pPr indent="-317500" lvl="6" marL="3200400">
+            <a:lvl7pPr marL="3200400" lvl="6" indent="-317500">
               <a:lnSpc>
                 <a:spcPct val="115000"/>
               </a:lnSpc>
@@ -5362,7 +5518,7 @@
                 </a:solidFill>
               </a:defRPr>
             </a:lvl7pPr>
-            <a:lvl8pPr indent="-317500" lvl="7" marL="3657600">
+            <a:lvl8pPr marL="3657600" lvl="7" indent="-317500">
               <a:lnSpc>
                 <a:spcPct val="115000"/>
               </a:lnSpc>
@@ -5383,7 +5539,7 @@
                 </a:solidFill>
               </a:defRPr>
             </a:lvl8pPr>
-            <a:lvl9pPr indent="-317500" lvl="8" marL="4114800">
+            <a:lvl9pPr marL="4114800" lvl="8" indent="-317500">
               <a:lnSpc>
                 <a:spcPct val="115000"/>
               </a:lnSpc>
@@ -5405,15 +5561,19 @@
               </a:defRPr>
             </a:lvl9pPr>
           </a:lstStyle>
-          <a:p/>
+          <a:p>
+            <a:endParaRPr/>
+          </a:p>
         </p:txBody>
       </p:sp>
       <p:sp>
         <p:nvSpPr>
           <p:cNvPr id="8" name="Google Shape;8;p1"/>
-          <p:cNvSpPr txBox="1"/>
+          <p:cNvSpPr txBox="1">
+            <a:spLocks noGrp="1"/>
+          </p:cNvSpPr>
           <p:nvPr>
-            <p:ph idx="12" type="sldNum"/>
+            <p:ph type="sldNum" idx="12"/>
           </p:nvPr>
         </p:nvSpPr>
         <p:spPr>
@@ -5430,7 +5590,7 @@
           </a:ln>
         </p:spPr>
         <p:txBody>
-          <a:bodyPr anchorCtr="0" anchor="ctr" bIns="91425" lIns="91425" spcFirstLastPara="1" rIns="91425" wrap="square" tIns="91425">
+          <a:bodyPr spcFirstLastPara="1" wrap="square" lIns="91425" tIns="91425" rIns="91425" bIns="91425" anchor="ctr" anchorCtr="0">
             <a:noAutofit/>
           </a:bodyPr>
           <a:lstStyle>
@@ -5508,7 +5668,7 @@
             </a:lvl9pPr>
           </a:lstStyle>
           <a:p>
-            <a:pPr indent="0" lvl="0" marL="0" rtl="0" algn="r">
+            <a:pPr marL="0" lvl="0" indent="0" algn="r" rtl="0">
               <a:spcBef>
                 <a:spcPts val="0"/>
               </a:spcBef>
@@ -5527,7 +5687,7 @@
       </p:sp>
     </p:spTree>
   </p:cSld>
-  <p:clrMap accent1="accent1" accent2="accent2" accent3="accent3" accent4="accent4" accent5="accent5" accent6="accent6" bg1="lt1" bg2="dk2" tx1="dk1" tx2="lt2" folHlink="folHlink" hlink="hlink"/>
+  <p:clrMap bg1="lt1" tx1="dk1" bg2="dk2" tx2="lt2" accent1="accent1" accent2="accent2" accent3="accent3" accent4="accent4" accent5="accent5" accent6="accent6" hlink="hlink" folHlink="folHlink"/>
   <p:sldLayoutIdLst>
     <p:sldLayoutId id="2147483648" r:id="rId1"/>
     <p:sldLayoutId id="2147483649" r:id="rId2"/>
@@ -5541,10 +5701,10 @@
     <p:sldLayoutId id="2147483657" r:id="rId10"/>
     <p:sldLayoutId id="2147483658" r:id="rId11"/>
   </p:sldLayoutIdLst>
-  <p:hf dt="0" ftr="0" hdr="0" sldNum="0"/>
+  <p:hf sldNum="0" hdr="0" ftr="0" dt="0"/>
   <p:txStyles>
     <p:titleStyle>
-      <a:defPPr lvl="0" marR="0" rtl="0" algn="l">
+      <a:defPPr marR="0" lvl="0" algn="l" rtl="0">
         <a:lnSpc>
           <a:spcPct val="100000"/>
         </a:lnSpc>
@@ -5555,7 +5715,7 @@
           <a:spcPts val="0"/>
         </a:spcAft>
       </a:defPPr>
-      <a:lvl1pPr lvl="0" marR="0" rtl="0" algn="l">
+      <a:lvl1pPr marR="0" lvl="0" algn="l" rtl="0">
         <a:lnSpc>
           <a:spcPct val="100000"/>
         </a:lnSpc>
@@ -5569,7 +5729,7 @@
           <a:srgbClr val="000000"/>
         </a:buClr>
         <a:buFont typeface="Arial"/>
-        <a:defRPr b="0" i="0" sz="1400" u="none" cap="none" strike="noStrike">
+        <a:defRPr sz="1400" b="0" i="0" u="none" strike="noStrike" cap="none">
           <a:solidFill>
             <a:srgbClr val="000000"/>
           </a:solidFill>
@@ -5579,7 +5739,7 @@
           <a:sym typeface="Arial"/>
         </a:defRPr>
       </a:lvl1pPr>
-      <a:lvl2pPr lvl="1" marR="0" rtl="0" algn="l">
+      <a:lvl2pPr marR="0" lvl="1" algn="l" rtl="0">
         <a:lnSpc>
           <a:spcPct val="100000"/>
         </a:lnSpc>
@@ -5593,7 +5753,7 @@
           <a:srgbClr val="000000"/>
         </a:buClr>
         <a:buFont typeface="Arial"/>
-        <a:defRPr b="0" i="0" sz="1400" u="none" cap="none" strike="noStrike">
+        <a:defRPr sz="1400" b="0" i="0" u="none" strike="noStrike" cap="none">
           <a:solidFill>
             <a:srgbClr val="000000"/>
           </a:solidFill>
@@ -5603,7 +5763,7 @@
           <a:sym typeface="Arial"/>
         </a:defRPr>
       </a:lvl2pPr>
-      <a:lvl3pPr lvl="2" marR="0" rtl="0" algn="l">
+      <a:lvl3pPr marR="0" lvl="2" algn="l" rtl="0">
         <a:lnSpc>
           <a:spcPct val="100000"/>
         </a:lnSpc>
@@ -5617,7 +5777,7 @@
           <a:srgbClr val="000000"/>
         </a:buClr>
         <a:buFont typeface="Arial"/>
-        <a:defRPr b="0" i="0" sz="1400" u="none" cap="none" strike="noStrike">
+        <a:defRPr sz="1400" b="0" i="0" u="none" strike="noStrike" cap="none">
           <a:solidFill>
             <a:srgbClr val="000000"/>
           </a:solidFill>
@@ -5627,7 +5787,7 @@
           <a:sym typeface="Arial"/>
         </a:defRPr>
       </a:lvl3pPr>
-      <a:lvl4pPr lvl="3" marR="0" rtl="0" algn="l">
+      <a:lvl4pPr marR="0" lvl="3" algn="l" rtl="0">
         <a:lnSpc>
           <a:spcPct val="100000"/>
         </a:lnSpc>
@@ -5641,7 +5801,7 @@
           <a:srgbClr val="000000"/>
         </a:buClr>
         <a:buFont typeface="Arial"/>
-        <a:defRPr b="0" i="0" sz="1400" u="none" cap="none" strike="noStrike">
+        <a:defRPr sz="1400" b="0" i="0" u="none" strike="noStrike" cap="none">
           <a:solidFill>
             <a:srgbClr val="000000"/>
           </a:solidFill>
@@ -5651,7 +5811,7 @@
           <a:sym typeface="Arial"/>
         </a:defRPr>
       </a:lvl4pPr>
-      <a:lvl5pPr lvl="4" marR="0" rtl="0" algn="l">
+      <a:lvl5pPr marR="0" lvl="4" algn="l" rtl="0">
         <a:lnSpc>
           <a:spcPct val="100000"/>
         </a:lnSpc>
@@ -5665,7 +5825,7 @@
           <a:srgbClr val="000000"/>
         </a:buClr>
         <a:buFont typeface="Arial"/>
-        <a:defRPr b="0" i="0" sz="1400" u="none" cap="none" strike="noStrike">
+        <a:defRPr sz="1400" b="0" i="0" u="none" strike="noStrike" cap="none">
           <a:solidFill>
             <a:srgbClr val="000000"/>
           </a:solidFill>
@@ -5675,7 +5835,7 @@
           <a:sym typeface="Arial"/>
         </a:defRPr>
       </a:lvl5pPr>
-      <a:lvl6pPr lvl="5" marR="0" rtl="0" algn="l">
+      <a:lvl6pPr marR="0" lvl="5" algn="l" rtl="0">
         <a:lnSpc>
           <a:spcPct val="100000"/>
         </a:lnSpc>
@@ -5689,7 +5849,7 @@
           <a:srgbClr val="000000"/>
         </a:buClr>
         <a:buFont typeface="Arial"/>
-        <a:defRPr b="0" i="0" sz="1400" u="none" cap="none" strike="noStrike">
+        <a:defRPr sz="1400" b="0" i="0" u="none" strike="noStrike" cap="none">
           <a:solidFill>
             <a:srgbClr val="000000"/>
           </a:solidFill>
@@ -5699,7 +5859,7 @@
           <a:sym typeface="Arial"/>
         </a:defRPr>
       </a:lvl6pPr>
-      <a:lvl7pPr lvl="6" marR="0" rtl="0" algn="l">
+      <a:lvl7pPr marR="0" lvl="6" algn="l" rtl="0">
         <a:lnSpc>
           <a:spcPct val="100000"/>
         </a:lnSpc>
@@ -5713,7 +5873,7 @@
           <a:srgbClr val="000000"/>
         </a:buClr>
         <a:buFont typeface="Arial"/>
-        <a:defRPr b="0" i="0" sz="1400" u="none" cap="none" strike="noStrike">
+        <a:defRPr sz="1400" b="0" i="0" u="none" strike="noStrike" cap="none">
           <a:solidFill>
             <a:srgbClr val="000000"/>
           </a:solidFill>
@@ -5723,7 +5883,7 @@
           <a:sym typeface="Arial"/>
         </a:defRPr>
       </a:lvl7pPr>
-      <a:lvl8pPr lvl="7" marR="0" rtl="0" algn="l">
+      <a:lvl8pPr marR="0" lvl="7" algn="l" rtl="0">
         <a:lnSpc>
           <a:spcPct val="100000"/>
         </a:lnSpc>
@@ -5737,7 +5897,7 @@
           <a:srgbClr val="000000"/>
         </a:buClr>
         <a:buFont typeface="Arial"/>
-        <a:defRPr b="0" i="0" sz="1400" u="none" cap="none" strike="noStrike">
+        <a:defRPr sz="1400" b="0" i="0" u="none" strike="noStrike" cap="none">
           <a:solidFill>
             <a:srgbClr val="000000"/>
           </a:solidFill>
@@ -5747,7 +5907,7 @@
           <a:sym typeface="Arial"/>
         </a:defRPr>
       </a:lvl8pPr>
-      <a:lvl9pPr lvl="8" marR="0" rtl="0" algn="l">
+      <a:lvl9pPr marR="0" lvl="8" algn="l" rtl="0">
         <a:lnSpc>
           <a:spcPct val="100000"/>
         </a:lnSpc>
@@ -5761,7 +5921,7 @@
           <a:srgbClr val="000000"/>
         </a:buClr>
         <a:buFont typeface="Arial"/>
-        <a:defRPr b="0" i="0" sz="1400" u="none" cap="none" strike="noStrike">
+        <a:defRPr sz="1400" b="0" i="0" u="none" strike="noStrike" cap="none">
           <a:solidFill>
             <a:srgbClr val="000000"/>
           </a:solidFill>
@@ -5773,7 +5933,7 @@
       </a:lvl9pPr>
     </p:titleStyle>
     <p:bodyStyle>
-      <a:defPPr lvl="0" marR="0" rtl="0" algn="l">
+      <a:defPPr marR="0" lvl="0" algn="l" rtl="0">
         <a:lnSpc>
           <a:spcPct val="100000"/>
         </a:lnSpc>
@@ -5784,7 +5944,7 @@
           <a:spcPts val="0"/>
         </a:spcAft>
       </a:defPPr>
-      <a:lvl1pPr lvl="0" marR="0" rtl="0" algn="l">
+      <a:lvl1pPr marR="0" lvl="0" algn="l" rtl="0">
         <a:lnSpc>
           <a:spcPct val="100000"/>
         </a:lnSpc>
@@ -5798,7 +5958,7 @@
           <a:srgbClr val="000000"/>
         </a:buClr>
         <a:buFont typeface="Arial"/>
-        <a:defRPr b="0" i="0" sz="1400" u="none" cap="none" strike="noStrike">
+        <a:defRPr sz="1400" b="0" i="0" u="none" strike="noStrike" cap="none">
           <a:solidFill>
             <a:srgbClr val="000000"/>
           </a:solidFill>
@@ -5808,7 +5968,7 @@
           <a:sym typeface="Arial"/>
         </a:defRPr>
       </a:lvl1pPr>
-      <a:lvl2pPr lvl="1" marR="0" rtl="0" algn="l">
+      <a:lvl2pPr marR="0" lvl="1" algn="l" rtl="0">
         <a:lnSpc>
           <a:spcPct val="100000"/>
         </a:lnSpc>
@@ -5822,7 +5982,7 @@
           <a:srgbClr val="000000"/>
         </a:buClr>
         <a:buFont typeface="Arial"/>
-        <a:defRPr b="0" i="0" sz="1400" u="none" cap="none" strike="noStrike">
+        <a:defRPr sz="1400" b="0" i="0" u="none" strike="noStrike" cap="none">
           <a:solidFill>
             <a:srgbClr val="000000"/>
           </a:solidFill>
@@ -5832,7 +5992,7 @@
           <a:sym typeface="Arial"/>
         </a:defRPr>
       </a:lvl2pPr>
-      <a:lvl3pPr lvl="2" marR="0" rtl="0" algn="l">
+      <a:lvl3pPr marR="0" lvl="2" algn="l" rtl="0">
         <a:lnSpc>
           <a:spcPct val="100000"/>
         </a:lnSpc>
@@ -5846,7 +6006,7 @@
           <a:srgbClr val="000000"/>
         </a:buClr>
         <a:buFont typeface="Arial"/>
-        <a:defRPr b="0" i="0" sz="1400" u="none" cap="none" strike="noStrike">
+        <a:defRPr sz="1400" b="0" i="0" u="none" strike="noStrike" cap="none">
           <a:solidFill>
             <a:srgbClr val="000000"/>
           </a:solidFill>
@@ -5856,7 +6016,7 @@
           <a:sym typeface="Arial"/>
         </a:defRPr>
       </a:lvl3pPr>
-      <a:lvl4pPr lvl="3" marR="0" rtl="0" algn="l">
+      <a:lvl4pPr marR="0" lvl="3" algn="l" rtl="0">
         <a:lnSpc>
           <a:spcPct val="100000"/>
         </a:lnSpc>
@@ -5870,7 +6030,7 @@
           <a:srgbClr val="000000"/>
         </a:buClr>
         <a:buFont typeface="Arial"/>
-        <a:defRPr b="0" i="0" sz="1400" u="none" cap="none" strike="noStrike">
+        <a:defRPr sz="1400" b="0" i="0" u="none" strike="noStrike" cap="none">
           <a:solidFill>
             <a:srgbClr val="000000"/>
           </a:solidFill>
@@ -5880,7 +6040,7 @@
           <a:sym typeface="Arial"/>
         </a:defRPr>
       </a:lvl4pPr>
-      <a:lvl5pPr lvl="4" marR="0" rtl="0" algn="l">
+      <a:lvl5pPr marR="0" lvl="4" algn="l" rtl="0">
         <a:lnSpc>
           <a:spcPct val="100000"/>
         </a:lnSpc>
@@ -5894,7 +6054,7 @@
           <a:srgbClr val="000000"/>
         </a:buClr>
         <a:buFont typeface="Arial"/>
-        <a:defRPr b="0" i="0" sz="1400" u="none" cap="none" strike="noStrike">
+        <a:defRPr sz="1400" b="0" i="0" u="none" strike="noStrike" cap="none">
           <a:solidFill>
             <a:srgbClr val="000000"/>
           </a:solidFill>
@@ -5904,7 +6064,7 @@
           <a:sym typeface="Arial"/>
         </a:defRPr>
       </a:lvl5pPr>
-      <a:lvl6pPr lvl="5" marR="0" rtl="0" algn="l">
+      <a:lvl6pPr marR="0" lvl="5" algn="l" rtl="0">
         <a:lnSpc>
           <a:spcPct val="100000"/>
         </a:lnSpc>
@@ -5918,7 +6078,7 @@
           <a:srgbClr val="000000"/>
         </a:buClr>
         <a:buFont typeface="Arial"/>
-        <a:defRPr b="0" i="0" sz="1400" u="none" cap="none" strike="noStrike">
+        <a:defRPr sz="1400" b="0" i="0" u="none" strike="noStrike" cap="none">
           <a:solidFill>
             <a:srgbClr val="000000"/>
           </a:solidFill>
@@ -5928,7 +6088,7 @@
           <a:sym typeface="Arial"/>
         </a:defRPr>
       </a:lvl6pPr>
-      <a:lvl7pPr lvl="6" marR="0" rtl="0" algn="l">
+      <a:lvl7pPr marR="0" lvl="6" algn="l" rtl="0">
         <a:lnSpc>
           <a:spcPct val="100000"/>
         </a:lnSpc>
@@ -5942,7 +6102,7 @@
           <a:srgbClr val="000000"/>
         </a:buClr>
         <a:buFont typeface="Arial"/>
-        <a:defRPr b="0" i="0" sz="1400" u="none" cap="none" strike="noStrike">
+        <a:defRPr sz="1400" b="0" i="0" u="none" strike="noStrike" cap="none">
           <a:solidFill>
             <a:srgbClr val="000000"/>
           </a:solidFill>
@@ -5952,7 +6112,7 @@
           <a:sym typeface="Arial"/>
         </a:defRPr>
       </a:lvl7pPr>
-      <a:lvl8pPr lvl="7" marR="0" rtl="0" algn="l">
+      <a:lvl8pPr marR="0" lvl="7" algn="l" rtl="0">
         <a:lnSpc>
           <a:spcPct val="100000"/>
         </a:lnSpc>
@@ -5966,7 +6126,7 @@
           <a:srgbClr val="000000"/>
         </a:buClr>
         <a:buFont typeface="Arial"/>
-        <a:defRPr b="0" i="0" sz="1400" u="none" cap="none" strike="noStrike">
+        <a:defRPr sz="1400" b="0" i="0" u="none" strike="noStrike" cap="none">
           <a:solidFill>
             <a:srgbClr val="000000"/>
           </a:solidFill>
@@ -5976,7 +6136,7 @@
           <a:sym typeface="Arial"/>
         </a:defRPr>
       </a:lvl8pPr>
-      <a:lvl9pPr lvl="8" marR="0" rtl="0" algn="l">
+      <a:lvl9pPr marR="0" lvl="8" algn="l" rtl="0">
         <a:lnSpc>
           <a:spcPct val="100000"/>
         </a:lnSpc>
@@ -5990,7 +6150,7 @@
           <a:srgbClr val="000000"/>
         </a:buClr>
         <a:buFont typeface="Arial"/>
-        <a:defRPr b="0" i="0" sz="1400" u="none" cap="none" strike="noStrike">
+        <a:defRPr sz="1400" b="0" i="0" u="none" strike="noStrike" cap="none">
           <a:solidFill>
             <a:srgbClr val="000000"/>
           </a:solidFill>
@@ -6002,7 +6162,7 @@
       </a:lvl9pPr>
     </p:bodyStyle>
     <p:otherStyle>
-      <a:defPPr lvl="0" marR="0" rtl="0" algn="l">
+      <a:defPPr marR="0" lvl="0" algn="l" rtl="0">
         <a:lnSpc>
           <a:spcPct val="100000"/>
         </a:lnSpc>
@@ -6013,7 +6173,7 @@
           <a:spcPts val="0"/>
         </a:spcAft>
       </a:defPPr>
-      <a:lvl1pPr lvl="0" marR="0" rtl="0" algn="l">
+      <a:lvl1pPr marR="0" lvl="0" algn="l" rtl="0">
         <a:lnSpc>
           <a:spcPct val="100000"/>
         </a:lnSpc>
@@ -6027,7 +6187,7 @@
           <a:srgbClr val="000000"/>
         </a:buClr>
         <a:buFont typeface="Arial"/>
-        <a:defRPr b="0" i="0" sz="1400" u="none" cap="none" strike="noStrike">
+        <a:defRPr sz="1400" b="0" i="0" u="none" strike="noStrike" cap="none">
           <a:solidFill>
             <a:srgbClr val="000000"/>
           </a:solidFill>
@@ -6037,7 +6197,7 @@
           <a:sym typeface="Arial"/>
         </a:defRPr>
       </a:lvl1pPr>
-      <a:lvl2pPr lvl="1" marR="0" rtl="0" algn="l">
+      <a:lvl2pPr marR="0" lvl="1" algn="l" rtl="0">
         <a:lnSpc>
           <a:spcPct val="100000"/>
         </a:lnSpc>
@@ -6051,7 +6211,7 @@
           <a:srgbClr val="000000"/>
         </a:buClr>
         <a:buFont typeface="Arial"/>
-        <a:defRPr b="0" i="0" sz="1400" u="none" cap="none" strike="noStrike">
+        <a:defRPr sz="1400" b="0" i="0" u="none" strike="noStrike" cap="none">
           <a:solidFill>
             <a:srgbClr val="000000"/>
           </a:solidFill>
@@ -6061,7 +6221,7 @@
           <a:sym typeface="Arial"/>
         </a:defRPr>
       </a:lvl2pPr>
-      <a:lvl3pPr lvl="2" marR="0" rtl="0" algn="l">
+      <a:lvl3pPr marR="0" lvl="2" algn="l" rtl="0">
         <a:lnSpc>
           <a:spcPct val="100000"/>
         </a:lnSpc>
@@ -6075,7 +6235,7 @@
           <a:srgbClr val="000000"/>
         </a:buClr>
         <a:buFont typeface="Arial"/>
-        <a:defRPr b="0" i="0" sz="1400" u="none" cap="none" strike="noStrike">
+        <a:defRPr sz="1400" b="0" i="0" u="none" strike="noStrike" cap="none">
           <a:solidFill>
             <a:srgbClr val="000000"/>
           </a:solidFill>
@@ -6085,7 +6245,7 @@
           <a:sym typeface="Arial"/>
         </a:defRPr>
       </a:lvl3pPr>
-      <a:lvl4pPr lvl="3" marR="0" rtl="0" algn="l">
+      <a:lvl4pPr marR="0" lvl="3" algn="l" rtl="0">
         <a:lnSpc>
           <a:spcPct val="100000"/>
         </a:lnSpc>
@@ -6099,7 +6259,7 @@
           <a:srgbClr val="000000"/>
         </a:buClr>
         <a:buFont typeface="Arial"/>
-        <a:defRPr b="0" i="0" sz="1400" u="none" cap="none" strike="noStrike">
+        <a:defRPr sz="1400" b="0" i="0" u="none" strike="noStrike" cap="none">
           <a:solidFill>
             <a:srgbClr val="000000"/>
           </a:solidFill>
@@ -6109,7 +6269,7 @@
           <a:sym typeface="Arial"/>
         </a:defRPr>
       </a:lvl4pPr>
-      <a:lvl5pPr lvl="4" marR="0" rtl="0" algn="l">
+      <a:lvl5pPr marR="0" lvl="4" algn="l" rtl="0">
         <a:lnSpc>
           <a:spcPct val="100000"/>
         </a:lnSpc>
@@ -6123,7 +6283,7 @@
           <a:srgbClr val="000000"/>
         </a:buClr>
         <a:buFont typeface="Arial"/>
-        <a:defRPr b="0" i="0" sz="1400" u="none" cap="none" strike="noStrike">
+        <a:defRPr sz="1400" b="0" i="0" u="none" strike="noStrike" cap="none">
           <a:solidFill>
             <a:srgbClr val="000000"/>
           </a:solidFill>
@@ -6133,7 +6293,7 @@
           <a:sym typeface="Arial"/>
         </a:defRPr>
       </a:lvl5pPr>
-      <a:lvl6pPr lvl="5" marR="0" rtl="0" algn="l">
+      <a:lvl6pPr marR="0" lvl="5" algn="l" rtl="0">
         <a:lnSpc>
           <a:spcPct val="100000"/>
         </a:lnSpc>
@@ -6147,7 +6307,7 @@
           <a:srgbClr val="000000"/>
         </a:buClr>
         <a:buFont typeface="Arial"/>
-        <a:defRPr b="0" i="0" sz="1400" u="none" cap="none" strike="noStrike">
+        <a:defRPr sz="1400" b="0" i="0" u="none" strike="noStrike" cap="none">
           <a:solidFill>
             <a:srgbClr val="000000"/>
           </a:solidFill>
@@ -6157,7 +6317,7 @@
           <a:sym typeface="Arial"/>
         </a:defRPr>
       </a:lvl6pPr>
-      <a:lvl7pPr lvl="6" marR="0" rtl="0" algn="l">
+      <a:lvl7pPr marR="0" lvl="6" algn="l" rtl="0">
         <a:lnSpc>
           <a:spcPct val="100000"/>
         </a:lnSpc>
@@ -6171,7 +6331,7 @@
           <a:srgbClr val="000000"/>
         </a:buClr>
         <a:buFont typeface="Arial"/>
-        <a:defRPr b="0" i="0" sz="1400" u="none" cap="none" strike="noStrike">
+        <a:defRPr sz="1400" b="0" i="0" u="none" strike="noStrike" cap="none">
           <a:solidFill>
             <a:srgbClr val="000000"/>
           </a:solidFill>
@@ -6181,7 +6341,7 @@
           <a:sym typeface="Arial"/>
         </a:defRPr>
       </a:lvl7pPr>
-      <a:lvl8pPr lvl="7" marR="0" rtl="0" algn="l">
+      <a:lvl8pPr marR="0" lvl="7" algn="l" rtl="0">
         <a:lnSpc>
           <a:spcPct val="100000"/>
         </a:lnSpc>
@@ -6195,7 +6355,7 @@
           <a:srgbClr val="000000"/>
         </a:buClr>
         <a:buFont typeface="Arial"/>
-        <a:defRPr b="0" i="0" sz="1400" u="none" cap="none" strike="noStrike">
+        <a:defRPr sz="1400" b="0" i="0" u="none" strike="noStrike" cap="none">
           <a:solidFill>
             <a:srgbClr val="000000"/>
           </a:solidFill>
@@ -6205,7 +6365,7 @@
           <a:sym typeface="Arial"/>
         </a:defRPr>
       </a:lvl8pPr>
-      <a:lvl9pPr lvl="8" marR="0" rtl="0" algn="l">
+      <a:lvl9pPr marR="0" lvl="8" algn="l" rtl="0">
         <a:lnSpc>
           <a:spcPct val="100000"/>
         </a:lnSpc>
@@ -6219,7 +6379,7 @@
           <a:srgbClr val="000000"/>
         </a:buClr>
         <a:buFont typeface="Arial"/>
-        <a:defRPr b="0" i="0" sz="1400" u="none" cap="none" strike="noStrike">
+        <a:defRPr sz="1400" b="0" i="0" u="none" strike="noStrike" cap="none">
           <a:solidFill>
             <a:srgbClr val="000000"/>
           </a:solidFill>
@@ -6235,11 +6395,11 @@
 </file>
 
 <file path=ppt/slides/slide1.xml><?xml version="1.0" encoding="utf-8"?>
-<p:sld xmlns:a="http://schemas.openxmlformats.org/drawingml/2006/main" xmlns:r="http://schemas.openxmlformats.org/officeDocument/2006/relationships" xmlns:mc="http://schemas.openxmlformats.org/markup-compatibility/2006" xmlns:mv="urn:schemas-microsoft-com:mac:vml" xmlns:p="http://schemas.openxmlformats.org/presentationml/2006/main" xmlns:c="http://schemas.openxmlformats.org/drawingml/2006/chart" xmlns:dgm="http://schemas.openxmlformats.org/drawingml/2006/diagram" xmlns:o="urn:schemas-microsoft-com:office:office" xmlns:v="urn:schemas-microsoft-com:vml" xmlns:pvml="urn:schemas-microsoft-com:office:powerpoint" xmlns:com="http://schemas.openxmlformats.org/drawingml/2006/compatibility" xmlns:p14="http://schemas.microsoft.com/office/powerpoint/2010/main" xmlns:p15="http://schemas.microsoft.com/office/powerpoint/2012/main">
+<p:sld xmlns:a="http://schemas.openxmlformats.org/drawingml/2006/main" xmlns:r="http://schemas.openxmlformats.org/officeDocument/2006/relationships" xmlns:p="http://schemas.openxmlformats.org/presentationml/2006/main">
   <p:cSld>
     <p:spTree>
       <p:nvGrpSpPr>
-        <p:cNvPr id="53" name="Shape 53"/>
+        <p:cNvPr id="1" name="Shape 53"/>
         <p:cNvGrpSpPr/>
         <p:nvPr/>
       </p:nvGrpSpPr>
@@ -6254,7 +6414,9 @@
       <p:sp>
         <p:nvSpPr>
           <p:cNvPr id="54" name="Google Shape;54;p13"/>
-          <p:cNvSpPr txBox="1"/>
+          <p:cNvSpPr txBox="1">
+            <a:spLocks noGrp="1"/>
+          </p:cNvSpPr>
           <p:nvPr>
             <p:ph type="ctrTitle"/>
           </p:nvPr>
@@ -6269,12 +6431,12 @@
           </a:prstGeom>
         </p:spPr>
         <p:txBody>
-          <a:bodyPr anchorCtr="0" anchor="b" bIns="91425" lIns="91425" spcFirstLastPara="1" rIns="91425" wrap="square" tIns="91425">
+          <a:bodyPr spcFirstLastPara="1" wrap="square" lIns="91425" tIns="91425" rIns="91425" bIns="91425" anchor="b" anchorCtr="0">
             <a:noAutofit/>
           </a:bodyPr>
           <a:lstStyle/>
           <a:p>
-            <a:pPr indent="0" lvl="0" marL="0" rtl="0" algn="l">
+            <a:pPr marL="0" lvl="0" indent="0" algn="l" rtl="0">
               <a:spcBef>
                 <a:spcPts val="0"/>
               </a:spcBef>
@@ -6311,12 +6473,12 @@
           </a:ln>
         </p:spPr>
         <p:txBody>
-          <a:bodyPr anchorCtr="0" anchor="t" bIns="91425" lIns="91425" spcFirstLastPara="1" rIns="91425" wrap="square" tIns="91425">
+          <a:bodyPr spcFirstLastPara="1" wrap="square" lIns="91425" tIns="91425" rIns="91425" bIns="91425" anchor="t" anchorCtr="0">
             <a:noAutofit/>
           </a:bodyPr>
           <a:lstStyle/>
           <a:p>
-            <a:pPr indent="0" lvl="0" marL="0" rtl="0" algn="l">
+            <a:pPr marL="0" lvl="0" indent="0" algn="l" rtl="0">
               <a:spcBef>
                 <a:spcPts val="0"/>
               </a:spcBef>
@@ -6340,7 +6502,7 @@
             </a:endParaRPr>
           </a:p>
           <a:p>
-            <a:pPr indent="0" lvl="0" marL="0" rtl="0" algn="l">
+            <a:pPr marL="0" lvl="0" indent="0" algn="l" rtl="0">
               <a:spcBef>
                 <a:spcPts val="0"/>
               </a:spcBef>
@@ -6364,7 +6526,7 @@
             </a:endParaRPr>
           </a:p>
           <a:p>
-            <a:pPr indent="0" lvl="0" marL="0" rtl="0" algn="l">
+            <a:pPr marL="0" lvl="0" indent="0" algn="l" rtl="0">
               <a:spcBef>
                 <a:spcPts val="0"/>
               </a:spcBef>
@@ -6422,11 +6584,11 @@
 </file>
 
 <file path=ppt/slides/slide2.xml><?xml version="1.0" encoding="utf-8"?>
-<p:sld xmlns:a="http://schemas.openxmlformats.org/drawingml/2006/main" xmlns:r="http://schemas.openxmlformats.org/officeDocument/2006/relationships" xmlns:mc="http://schemas.openxmlformats.org/markup-compatibility/2006" xmlns:mv="urn:schemas-microsoft-com:mac:vml" xmlns:p="http://schemas.openxmlformats.org/presentationml/2006/main" xmlns:c="http://schemas.openxmlformats.org/drawingml/2006/chart" xmlns:dgm="http://schemas.openxmlformats.org/drawingml/2006/diagram" xmlns:o="urn:schemas-microsoft-com:office:office" xmlns:v="urn:schemas-microsoft-com:vml" xmlns:pvml="urn:schemas-microsoft-com:office:powerpoint" xmlns:com="http://schemas.openxmlformats.org/drawingml/2006/compatibility" xmlns:p14="http://schemas.microsoft.com/office/powerpoint/2010/main" xmlns:p15="http://schemas.microsoft.com/office/powerpoint/2012/main">
+<p:sld xmlns:a="http://schemas.openxmlformats.org/drawingml/2006/main" xmlns:r="http://schemas.openxmlformats.org/officeDocument/2006/relationships" xmlns:p="http://schemas.openxmlformats.org/presentationml/2006/main">
   <p:cSld>
     <p:spTree>
       <p:nvGrpSpPr>
-        <p:cNvPr id="60" name="Shape 60"/>
+        <p:cNvPr id="1" name="Shape 60"/>
         <p:cNvGrpSpPr/>
         <p:nvPr/>
       </p:nvGrpSpPr>
@@ -6441,7 +6603,9 @@
       <p:sp>
         <p:nvSpPr>
           <p:cNvPr id="61" name="Google Shape;61;p14"/>
-          <p:cNvSpPr txBox="1"/>
+          <p:cNvSpPr txBox="1">
+            <a:spLocks noGrp="1"/>
+          </p:cNvSpPr>
           <p:nvPr>
             <p:ph type="title"/>
           </p:nvPr>
@@ -6456,12 +6620,12 @@
           </a:prstGeom>
         </p:spPr>
         <p:txBody>
-          <a:bodyPr anchorCtr="0" anchor="t" bIns="91425" lIns="91425" spcFirstLastPara="1" rIns="91425" wrap="square" tIns="91425">
+          <a:bodyPr spcFirstLastPara="1" wrap="square" lIns="91425" tIns="91425" rIns="91425" bIns="91425" anchor="t" anchorCtr="0">
             <a:noAutofit/>
           </a:bodyPr>
           <a:lstStyle/>
           <a:p>
-            <a:pPr indent="0" lvl="0" marL="0" rtl="0" algn="l">
+            <a:pPr marL="0" lvl="0" indent="0" algn="l" rtl="0">
               <a:spcBef>
                 <a:spcPts val="0"/>
               </a:spcBef>
@@ -6481,9 +6645,11 @@
       <p:sp>
         <p:nvSpPr>
           <p:cNvPr id="62" name="Google Shape;62;p14"/>
-          <p:cNvSpPr txBox="1"/>
+          <p:cNvSpPr txBox="1">
+            <a:spLocks noGrp="1"/>
+          </p:cNvSpPr>
           <p:nvPr>
-            <p:ph idx="1" type="body"/>
+            <p:ph type="body" idx="1"/>
           </p:nvPr>
         </p:nvSpPr>
         <p:spPr>
@@ -6496,12 +6662,12 @@
           </a:prstGeom>
         </p:spPr>
         <p:txBody>
-          <a:bodyPr anchorCtr="0" anchor="t" bIns="91425" lIns="91425" spcFirstLastPara="1" rIns="91425" wrap="square" tIns="91425">
+          <a:bodyPr spcFirstLastPara="1" wrap="square" lIns="91425" tIns="91425" rIns="91425" bIns="91425" anchor="t" anchorCtr="0">
             <a:noAutofit/>
           </a:bodyPr>
           <a:lstStyle/>
           <a:p>
-            <a:pPr indent="0" lvl="0" marL="0" rtl="0" algn="l">
+            <a:pPr marL="0" lvl="0" indent="0" algn="l" rtl="0">
               <a:spcBef>
                 <a:spcPts val="0"/>
               </a:spcBef>
@@ -6517,7 +6683,7 @@
             <a:endParaRPr/>
           </a:p>
           <a:p>
-            <a:pPr indent="0" lvl="0" marL="0" rtl="0" algn="l">
+            <a:pPr marL="0" lvl="0" indent="0" algn="l" rtl="0">
               <a:spcBef>
                 <a:spcPts val="1600"/>
               </a:spcBef>
@@ -6533,7 +6699,7 @@
             <a:endParaRPr/>
           </a:p>
           <a:p>
-            <a:pPr indent="0" lvl="0" marL="0" rtl="0" algn="l">
+            <a:pPr marL="0" lvl="0" indent="0" algn="l" rtl="0">
               <a:spcBef>
                 <a:spcPts val="1600"/>
               </a:spcBef>
@@ -6549,7 +6715,7 @@
             <a:endParaRPr/>
           </a:p>
           <a:p>
-            <a:pPr indent="0" lvl="0" marL="0" rtl="0" algn="l">
+            <a:pPr marL="0" lvl="0" indent="0" algn="l" rtl="0">
               <a:spcBef>
                 <a:spcPts val="1600"/>
               </a:spcBef>
@@ -6558,13 +6724,10 @@
               </a:spcAft>
               <a:buNone/>
             </a:pPr>
-            <a:r>
-              <a:t/>
-            </a:r>
             <a:endParaRPr/>
           </a:p>
           <a:p>
-            <a:pPr indent="0" lvl="0" marL="0" rtl="0" algn="l">
+            <a:pPr marL="0" lvl="0" indent="0" algn="l" rtl="0">
               <a:spcBef>
                 <a:spcPts val="1600"/>
               </a:spcBef>
@@ -6578,9 +6741,6 @@
               <a:buFont typeface="Arial"/>
               <a:buNone/>
             </a:pPr>
-            <a:r>
-              <a:t/>
-            </a:r>
             <a:endParaRPr/>
           </a:p>
         </p:txBody>
@@ -6594,11 +6754,11 @@
 </file>
 
 <file path=ppt/slides/slide3.xml><?xml version="1.0" encoding="utf-8"?>
-<p:sld xmlns:a="http://schemas.openxmlformats.org/drawingml/2006/main" xmlns:r="http://schemas.openxmlformats.org/officeDocument/2006/relationships" xmlns:mc="http://schemas.openxmlformats.org/markup-compatibility/2006" xmlns:mv="urn:schemas-microsoft-com:mac:vml" xmlns:p="http://schemas.openxmlformats.org/presentationml/2006/main" xmlns:c="http://schemas.openxmlformats.org/drawingml/2006/chart" xmlns:dgm="http://schemas.openxmlformats.org/drawingml/2006/diagram" xmlns:o="urn:schemas-microsoft-com:office:office" xmlns:v="urn:schemas-microsoft-com:vml" xmlns:pvml="urn:schemas-microsoft-com:office:powerpoint" xmlns:com="http://schemas.openxmlformats.org/drawingml/2006/compatibility" xmlns:p14="http://schemas.microsoft.com/office/powerpoint/2010/main" xmlns:p15="http://schemas.microsoft.com/office/powerpoint/2012/main">
+<p:sld xmlns:a="http://schemas.openxmlformats.org/drawingml/2006/main" xmlns:r="http://schemas.openxmlformats.org/officeDocument/2006/relationships" xmlns:p="http://schemas.openxmlformats.org/presentationml/2006/main">
   <p:cSld>
     <p:spTree>
       <p:nvGrpSpPr>
-        <p:cNvPr id="66" name="Shape 66"/>
+        <p:cNvPr id="1" name="Shape 66"/>
         <p:cNvGrpSpPr/>
         <p:nvPr/>
       </p:nvGrpSpPr>
@@ -6613,7 +6773,9 @@
       <p:sp>
         <p:nvSpPr>
           <p:cNvPr id="67" name="Google Shape;67;p15"/>
-          <p:cNvSpPr txBox="1"/>
+          <p:cNvSpPr txBox="1">
+            <a:spLocks noGrp="1"/>
+          </p:cNvSpPr>
           <p:nvPr>
             <p:ph type="title"/>
           </p:nvPr>
@@ -6628,12 +6790,12 @@
           </a:prstGeom>
         </p:spPr>
         <p:txBody>
-          <a:bodyPr anchorCtr="0" anchor="t" bIns="91425" lIns="91425" spcFirstLastPara="1" rIns="91425" wrap="square" tIns="91425">
+          <a:bodyPr spcFirstLastPara="1" wrap="square" lIns="91425" tIns="91425" rIns="91425" bIns="91425" anchor="t" anchorCtr="0">
             <a:noAutofit/>
           </a:bodyPr>
           <a:lstStyle/>
           <a:p>
-            <a:pPr indent="0" lvl="0" marL="0" rtl="0" algn="l">
+            <a:pPr marL="0" lvl="0" indent="0" algn="l" rtl="0">
               <a:spcBef>
                 <a:spcPts val="0"/>
               </a:spcBef>
@@ -6653,9 +6815,11 @@
       <p:sp>
         <p:nvSpPr>
           <p:cNvPr id="68" name="Google Shape;68;p15"/>
-          <p:cNvSpPr txBox="1"/>
+          <p:cNvSpPr txBox="1">
+            <a:spLocks noGrp="1"/>
+          </p:cNvSpPr>
           <p:nvPr>
-            <p:ph idx="1" type="body"/>
+            <p:ph type="body" idx="1"/>
           </p:nvPr>
         </p:nvSpPr>
         <p:spPr>
@@ -6668,12 +6832,12 @@
           </a:prstGeom>
         </p:spPr>
         <p:txBody>
-          <a:bodyPr anchorCtr="0" anchor="t" bIns="91425" lIns="91425" spcFirstLastPara="1" rIns="91425" wrap="square" tIns="91425">
+          <a:bodyPr spcFirstLastPara="1" wrap="square" lIns="91425" tIns="91425" rIns="91425" bIns="91425" anchor="t" anchorCtr="0">
             <a:noAutofit/>
           </a:bodyPr>
           <a:lstStyle/>
           <a:p>
-            <a:pPr indent="0" lvl="0" marL="0" rtl="0" algn="l">
+            <a:pPr marL="0" lvl="0" indent="0" algn="l" rtl="0">
               <a:spcBef>
                 <a:spcPts val="0"/>
               </a:spcBef>
@@ -6683,13 +6847,13 @@
               <a:buNone/>
             </a:pPr>
             <a:r>
-              <a:rPr b="1" lang="en-GB"/>
+              <a:rPr lang="en-GB" b="1"/>
               <a:t>What is an auction?</a:t>
             </a:r>
             <a:endParaRPr b="1"/>
           </a:p>
           <a:p>
-            <a:pPr indent="0" lvl="0" marL="0" rtl="0" algn="l">
+            <a:pPr marL="0" lvl="0" indent="0" algn="l" rtl="0">
               <a:spcBef>
                 <a:spcPts val="1600"/>
               </a:spcBef>
@@ -6705,7 +6869,7 @@
             <a:endParaRPr/>
           </a:p>
           <a:p>
-            <a:pPr indent="0" lvl="0" marL="0" rtl="0" algn="l">
+            <a:pPr marL="0" lvl="0" indent="0" algn="l" rtl="0">
               <a:spcBef>
                 <a:spcPts val="1600"/>
               </a:spcBef>
@@ -6715,13 +6879,13 @@
               <a:buNone/>
             </a:pPr>
             <a:r>
-              <a:rPr b="1" lang="en-GB"/>
+              <a:rPr lang="en-GB" b="1"/>
               <a:t>Why we chose it?</a:t>
             </a:r>
             <a:endParaRPr b="1"/>
           </a:p>
           <a:p>
-            <a:pPr indent="0" lvl="0" marL="0" rtl="0" algn="l">
+            <a:pPr marL="0" lvl="0" indent="0" algn="l" rtl="0">
               <a:spcBef>
                 <a:spcPts val="1600"/>
               </a:spcBef>
@@ -6758,12 +6922,12 @@
           </a:ln>
         </p:spPr>
         <p:txBody>
-          <a:bodyPr anchorCtr="0" anchor="t" bIns="91425" lIns="91425" spcFirstLastPara="1" rIns="91425" wrap="square" tIns="91425">
+          <a:bodyPr spcFirstLastPara="1" wrap="square" lIns="91425" tIns="91425" rIns="91425" bIns="91425" anchor="t" anchorCtr="0">
             <a:noAutofit/>
           </a:bodyPr>
           <a:lstStyle/>
           <a:p>
-            <a:pPr indent="-317500" lvl="0" marL="457200" rtl="0" algn="l">
+            <a:pPr marL="457200" lvl="0" indent="-317500" algn="l" rtl="0">
               <a:spcBef>
                 <a:spcPts val="0"/>
               </a:spcBef>
@@ -6801,11 +6965,11 @@
 </file>
 
 <file path=ppt/slides/slide4.xml><?xml version="1.0" encoding="utf-8"?>
-<p:sld xmlns:a="http://schemas.openxmlformats.org/drawingml/2006/main" xmlns:r="http://schemas.openxmlformats.org/officeDocument/2006/relationships" xmlns:mc="http://schemas.openxmlformats.org/markup-compatibility/2006" xmlns:mv="urn:schemas-microsoft-com:mac:vml" xmlns:p="http://schemas.openxmlformats.org/presentationml/2006/main" xmlns:c="http://schemas.openxmlformats.org/drawingml/2006/chart" xmlns:dgm="http://schemas.openxmlformats.org/drawingml/2006/diagram" xmlns:o="urn:schemas-microsoft-com:office:office" xmlns:v="urn:schemas-microsoft-com:vml" xmlns:pvml="urn:schemas-microsoft-com:office:powerpoint" xmlns:com="http://schemas.openxmlformats.org/drawingml/2006/compatibility" xmlns:p14="http://schemas.microsoft.com/office/powerpoint/2010/main" xmlns:p15="http://schemas.microsoft.com/office/powerpoint/2012/main">
+<p:sld xmlns:a="http://schemas.openxmlformats.org/drawingml/2006/main" xmlns:r="http://schemas.openxmlformats.org/officeDocument/2006/relationships" xmlns:p="http://schemas.openxmlformats.org/presentationml/2006/main">
   <p:cSld>
     <p:spTree>
       <p:nvGrpSpPr>
-        <p:cNvPr id="73" name="Shape 73"/>
+        <p:cNvPr id="1" name="Shape 73"/>
         <p:cNvGrpSpPr/>
         <p:nvPr/>
       </p:nvGrpSpPr>
@@ -6820,7 +6984,9 @@
       <p:sp>
         <p:nvSpPr>
           <p:cNvPr id="74" name="Google Shape;74;p16"/>
-          <p:cNvSpPr txBox="1"/>
+          <p:cNvSpPr txBox="1">
+            <a:spLocks noGrp="1"/>
+          </p:cNvSpPr>
           <p:nvPr>
             <p:ph type="title"/>
           </p:nvPr>
@@ -6835,12 +7001,12 @@
           </a:prstGeom>
         </p:spPr>
         <p:txBody>
-          <a:bodyPr anchorCtr="0" anchor="t" bIns="91425" lIns="91425" spcFirstLastPara="1" rIns="91425" wrap="square" tIns="91425">
+          <a:bodyPr spcFirstLastPara="1" wrap="square" lIns="91425" tIns="91425" rIns="91425" bIns="91425" anchor="t" anchorCtr="0">
             <a:noAutofit/>
           </a:bodyPr>
           <a:lstStyle/>
           <a:p>
-            <a:pPr indent="0" lvl="0" marL="0" rtl="0" algn="l">
+            <a:pPr marL="0" lvl="0" indent="0" algn="l" rtl="0">
               <a:spcBef>
                 <a:spcPts val="0"/>
               </a:spcBef>
@@ -6860,9 +7026,11 @@
       <p:sp>
         <p:nvSpPr>
           <p:cNvPr id="75" name="Google Shape;75;p16"/>
-          <p:cNvSpPr txBox="1"/>
+          <p:cNvSpPr txBox="1">
+            <a:spLocks noGrp="1"/>
+          </p:cNvSpPr>
           <p:nvPr>
-            <p:ph idx="1" type="body"/>
+            <p:ph type="body" idx="1"/>
           </p:nvPr>
         </p:nvSpPr>
         <p:spPr>
@@ -6875,12 +7043,12 @@
           </a:prstGeom>
         </p:spPr>
         <p:txBody>
-          <a:bodyPr anchorCtr="0" anchor="t" bIns="91425" lIns="91425" spcFirstLastPara="1" rIns="91425" wrap="square" tIns="91425">
+          <a:bodyPr spcFirstLastPara="1" wrap="square" lIns="91425" tIns="91425" rIns="91425" bIns="91425" anchor="t" anchorCtr="0">
             <a:noAutofit/>
           </a:bodyPr>
           <a:lstStyle/>
           <a:p>
-            <a:pPr indent="0" lvl="0" marL="0" rtl="0" algn="l">
+            <a:pPr marL="0" lvl="0" indent="0" algn="l" rtl="0">
               <a:spcBef>
                 <a:spcPts val="0"/>
               </a:spcBef>
@@ -6896,7 +7064,7 @@
             <a:endParaRPr/>
           </a:p>
           <a:p>
-            <a:pPr indent="-342900" lvl="0" marL="457200" rtl="0" algn="l">
+            <a:pPr marL="457200" lvl="0" indent="-342900" algn="l" rtl="0">
               <a:spcBef>
                 <a:spcPts val="1600"/>
               </a:spcBef>
@@ -6907,27 +7075,15 @@
               <a:buChar char="●"/>
             </a:pPr>
             <a:r>
-              <a:rPr b="1" lang="en-GB"/>
-              <a:t>Built-in auction types</a:t>
-            </a:r>
-            <a:r>
-              <a:rPr b="1" lang="en-GB"/>
-              <a:t> </a:t>
+              <a:rPr lang="en-GB" b="1"/>
+              <a:t>Built-in auction types </a:t>
             </a:r>
             <a:r>
               <a:rPr lang="en-GB"/>
-              <a:t>- There are couple of specific auction types that are commonly used in the industry. We have implemented them already in the framework so application developer doesn’t have to write code from scratch. If developers want to create a new types of auction or add </a:t>
+              <a:t>- There are couple of specific auction types that are commonly used in the industry. We have implemented them already in the framework so application developer doesn’t have to write code from scratch. If developers want to create a new types of auction or add features specific to to their requirements, our framework will allow them to override </a:t>
             </a:r>
             <a:r>
-              <a:rPr lang="en-GB"/>
-              <a:t>features</a:t>
-            </a:r>
-            <a:r>
-              <a:rPr lang="en-GB"/>
-              <a:t> specific to to their requirements, our framework will allow them to override </a:t>
-            </a:r>
-            <a:r>
-              <a:rPr b="1" lang="en-GB"/>
+              <a:rPr lang="en-GB" b="1"/>
               <a:t>default strategies</a:t>
             </a:r>
             <a:r>
@@ -6937,7 +7093,7 @@
             <a:endParaRPr/>
           </a:p>
           <a:p>
-            <a:pPr indent="0" lvl="0" marL="457200" rtl="0" algn="l">
+            <a:pPr marL="457200" lvl="0" indent="0" algn="l" rtl="0">
               <a:spcBef>
                 <a:spcPts val="1600"/>
               </a:spcBef>
@@ -6946,9 +7102,6 @@
               </a:spcAft>
               <a:buNone/>
             </a:pPr>
-            <a:r>
-              <a:t/>
-            </a:r>
             <a:endParaRPr/>
           </a:p>
         </p:txBody>
@@ -6970,23 +7123,23 @@
           <a:solidFill>
             <a:schemeClr val="lt2"/>
           </a:solidFill>
-          <a:ln cap="flat" cmpd="sng" w="9525">
+          <a:ln w="9525" cap="flat" cmpd="sng">
             <a:solidFill>
               <a:schemeClr val="dk2"/>
             </a:solidFill>
             <a:prstDash val="solid"/>
             <a:round/>
-            <a:headEnd len="sm" w="sm" type="none"/>
-            <a:tailEnd len="sm" w="sm" type="none"/>
+            <a:headEnd type="none" w="sm" len="sm"/>
+            <a:tailEnd type="none" w="sm" len="sm"/>
           </a:ln>
         </p:spPr>
         <p:txBody>
-          <a:bodyPr anchorCtr="0" anchor="ctr" bIns="91425" lIns="91425" spcFirstLastPara="1" rIns="91425" wrap="square" tIns="91425">
+          <a:bodyPr spcFirstLastPara="1" wrap="square" lIns="91425" tIns="91425" rIns="91425" bIns="91425" anchor="ctr" anchorCtr="0">
             <a:noAutofit/>
           </a:bodyPr>
           <a:lstStyle/>
           <a:p>
-            <a:pPr indent="0" lvl="0" marL="0" rtl="0" algn="l">
+            <a:pPr marL="0" lvl="0" indent="0" algn="l" rtl="0">
               <a:lnSpc>
                 <a:spcPct val="115000"/>
               </a:lnSpc>
@@ -7013,7 +7166,7 @@
             </a:endParaRPr>
           </a:p>
           <a:p>
-            <a:pPr indent="-298450" lvl="0" marL="457200" rtl="0" algn="l">
+            <a:pPr marL="457200" lvl="0" indent="-298450" algn="l" rtl="0">
               <a:lnSpc>
                 <a:spcPct val="115000"/>
               </a:lnSpc>
@@ -7044,7 +7197,7 @@
             </a:endParaRPr>
           </a:p>
           <a:p>
-            <a:pPr indent="-298450" lvl="0" marL="457200" rtl="0" algn="l">
+            <a:pPr marL="457200" lvl="0" indent="-298450" algn="l" rtl="0">
               <a:lnSpc>
                 <a:spcPct val="115000"/>
               </a:lnSpc>
@@ -7081,11 +7234,11 @@
 </file>
 
 <file path=ppt/slides/slide5.xml><?xml version="1.0" encoding="utf-8"?>
-<p:sld xmlns:a="http://schemas.openxmlformats.org/drawingml/2006/main" xmlns:r="http://schemas.openxmlformats.org/officeDocument/2006/relationships" xmlns:mc="http://schemas.openxmlformats.org/markup-compatibility/2006" xmlns:mv="urn:schemas-microsoft-com:mac:vml" xmlns:p="http://schemas.openxmlformats.org/presentationml/2006/main" xmlns:c="http://schemas.openxmlformats.org/drawingml/2006/chart" xmlns:dgm="http://schemas.openxmlformats.org/drawingml/2006/diagram" xmlns:o="urn:schemas-microsoft-com:office:office" xmlns:v="urn:schemas-microsoft-com:vml" xmlns:pvml="urn:schemas-microsoft-com:office:powerpoint" xmlns:com="http://schemas.openxmlformats.org/drawingml/2006/compatibility" xmlns:p14="http://schemas.microsoft.com/office/powerpoint/2010/main" xmlns:p15="http://schemas.microsoft.com/office/powerpoint/2012/main">
+<p:sld xmlns:a="http://schemas.openxmlformats.org/drawingml/2006/main" xmlns:r="http://schemas.openxmlformats.org/officeDocument/2006/relationships" xmlns:p="http://schemas.openxmlformats.org/presentationml/2006/main">
   <p:cSld>
     <p:spTree>
       <p:nvGrpSpPr>
-        <p:cNvPr id="80" name="Shape 80"/>
+        <p:cNvPr id="1" name="Shape 80"/>
         <p:cNvGrpSpPr/>
         <p:nvPr/>
       </p:nvGrpSpPr>
@@ -7104,16 +7257,13 @@
           <p:nvPr/>
         </p:nvPicPr>
         <p:blipFill>
-          <a:blip r:embed="rId3">
-            <a:alphaModFix/>
-          </a:blip>
-          <a:stretch>
-            <a:fillRect/>
-          </a:stretch>
+          <a:blip r:embed="rId3"/>
+          <a:srcRect/>
+          <a:stretch/>
         </p:blipFill>
         <p:spPr>
           <a:xfrm>
-            <a:off x="0" y="-81800"/>
+            <a:off x="1" y="-81800"/>
             <a:ext cx="9144000" cy="5307100"/>
           </a:xfrm>
           <a:prstGeom prst="rect">
@@ -7128,14 +7278,16 @@
       <p:sp>
         <p:nvSpPr>
           <p:cNvPr id="82" name="Google Shape;82;p17"/>
-          <p:cNvSpPr txBox="1"/>
+          <p:cNvSpPr txBox="1">
+            <a:spLocks noGrp="1"/>
+          </p:cNvSpPr>
           <p:nvPr>
             <p:ph type="title"/>
           </p:nvPr>
         </p:nvSpPr>
         <p:spPr>
           <a:xfrm>
-            <a:off x="589050" y="117250"/>
+            <a:off x="91508" y="0"/>
             <a:ext cx="3134100" cy="572700"/>
           </a:xfrm>
           <a:prstGeom prst="rect">
@@ -7143,12 +7295,12 @@
           </a:prstGeom>
         </p:spPr>
         <p:txBody>
-          <a:bodyPr anchorCtr="0" anchor="t" bIns="91425" lIns="91425" spcFirstLastPara="1" rIns="91425" wrap="square" tIns="91425">
+          <a:bodyPr spcFirstLastPara="1" wrap="square" lIns="91425" tIns="91425" rIns="91425" bIns="91425" anchor="t" anchorCtr="0">
             <a:noAutofit/>
           </a:bodyPr>
           <a:lstStyle/>
           <a:p>
-            <a:pPr indent="0" lvl="0" marL="0" rtl="0" algn="l">
+            <a:pPr marL="0" lvl="0" indent="0" algn="l" rtl="0">
               <a:spcBef>
                 <a:spcPts val="0"/>
               </a:spcBef>
@@ -7158,10 +7310,10 @@
               <a:buNone/>
             </a:pPr>
             <a:r>
-              <a:rPr lang="en-GB"/>
+              <a:rPr lang="en-GB" sz="2000" dirty="0"/>
               <a:t>Class diagram</a:t>
             </a:r>
-            <a:endParaRPr/>
+            <a:endParaRPr sz="2000" dirty="0"/>
           </a:p>
         </p:txBody>
       </p:sp>
@@ -7174,11 +7326,11 @@
 </file>
 
 <file path=ppt/slides/slide6.xml><?xml version="1.0" encoding="utf-8"?>
-<p:sld xmlns:a="http://schemas.openxmlformats.org/drawingml/2006/main" xmlns:r="http://schemas.openxmlformats.org/officeDocument/2006/relationships" xmlns:mc="http://schemas.openxmlformats.org/markup-compatibility/2006" xmlns:mv="urn:schemas-microsoft-com:mac:vml" xmlns:p="http://schemas.openxmlformats.org/presentationml/2006/main" xmlns:c="http://schemas.openxmlformats.org/drawingml/2006/chart" xmlns:dgm="http://schemas.openxmlformats.org/drawingml/2006/diagram" xmlns:o="urn:schemas-microsoft-com:office:office" xmlns:v="urn:schemas-microsoft-com:vml" xmlns:pvml="urn:schemas-microsoft-com:office:powerpoint" xmlns:com="http://schemas.openxmlformats.org/drawingml/2006/compatibility" xmlns:p14="http://schemas.microsoft.com/office/powerpoint/2010/main" xmlns:p15="http://schemas.microsoft.com/office/powerpoint/2012/main">
+<p:sld xmlns:a="http://schemas.openxmlformats.org/drawingml/2006/main" xmlns:r="http://schemas.openxmlformats.org/officeDocument/2006/relationships" xmlns:p="http://schemas.openxmlformats.org/presentationml/2006/main">
   <p:cSld>
     <p:spTree>
       <p:nvGrpSpPr>
-        <p:cNvPr id="86" name="Shape 86"/>
+        <p:cNvPr id="1" name="Shape 86"/>
         <p:cNvGrpSpPr/>
         <p:nvPr/>
       </p:nvGrpSpPr>
@@ -7193,7 +7345,9 @@
       <p:sp>
         <p:nvSpPr>
           <p:cNvPr id="87" name="Google Shape;87;p18"/>
-          <p:cNvSpPr txBox="1"/>
+          <p:cNvSpPr txBox="1">
+            <a:spLocks noGrp="1"/>
+          </p:cNvSpPr>
           <p:nvPr>
             <p:ph type="title"/>
           </p:nvPr>
@@ -7208,12 +7362,12 @@
           </a:prstGeom>
         </p:spPr>
         <p:txBody>
-          <a:bodyPr anchorCtr="0" anchor="t" bIns="91425" lIns="91425" spcFirstLastPara="1" rIns="91425" wrap="square" tIns="91425">
+          <a:bodyPr spcFirstLastPara="1" wrap="square" lIns="91425" tIns="91425" rIns="91425" bIns="91425" anchor="t" anchorCtr="0">
             <a:noAutofit/>
           </a:bodyPr>
           <a:lstStyle/>
           <a:p>
-            <a:pPr indent="0" lvl="0" marL="0" rtl="0" algn="l">
+            <a:pPr marL="0" lvl="0" indent="0" algn="l" rtl="0">
               <a:spcBef>
                 <a:spcPts val="0"/>
               </a:spcBef>
@@ -7238,9 +7392,11 @@
       <p:sp>
         <p:nvSpPr>
           <p:cNvPr id="88" name="Google Shape;88;p18"/>
-          <p:cNvSpPr txBox="1"/>
+          <p:cNvSpPr txBox="1">
+            <a:spLocks noGrp="1"/>
+          </p:cNvSpPr>
           <p:nvPr>
-            <p:ph idx="1" type="body"/>
+            <p:ph type="body" idx="1"/>
           </p:nvPr>
         </p:nvSpPr>
         <p:spPr>
@@ -7253,12 +7409,12 @@
           </a:prstGeom>
         </p:spPr>
         <p:txBody>
-          <a:bodyPr anchorCtr="0" anchor="t" bIns="91425" lIns="91425" spcFirstLastPara="1" rIns="91425" wrap="square" tIns="91425">
+          <a:bodyPr spcFirstLastPara="1" wrap="square" lIns="91425" tIns="91425" rIns="91425" bIns="91425" anchor="t" anchorCtr="0">
             <a:noAutofit/>
           </a:bodyPr>
           <a:lstStyle/>
           <a:p>
-            <a:pPr indent="0" lvl="0" marL="0" rtl="0" algn="l">
+            <a:pPr marL="0" lvl="0" indent="0" algn="l" rtl="0">
               <a:spcBef>
                 <a:spcPts val="0"/>
               </a:spcBef>
@@ -7268,12 +7424,8 @@
               <a:buNone/>
             </a:pPr>
             <a:r>
-              <a:rPr b="1" lang="en-GB"/>
-              <a:t>Auction</a:t>
-            </a:r>
-            <a:r>
-              <a:rPr b="1" lang="en-GB"/>
-              <a:t> type pricing :- </a:t>
+              <a:rPr lang="en-GB" b="1"/>
+              <a:t>Auction type pricing :- </a:t>
             </a:r>
             <a:r>
               <a:rPr lang="en-GB"/>
@@ -7282,7 +7434,7 @@
             <a:endParaRPr/>
           </a:p>
           <a:p>
-            <a:pPr indent="-342900" lvl="0" marL="457200" rtl="0" algn="l">
+            <a:pPr marL="457200" lvl="0" indent="-342900" algn="l" rtl="0">
               <a:spcBef>
                 <a:spcPts val="1600"/>
               </a:spcBef>
@@ -7297,7 +7449,7 @@
               <a:t>Absolute (Strategy pattern )</a:t>
             </a:r>
             <a:r>
-              <a:rPr b="1" lang="en-GB"/>
+              <a:rPr lang="en-GB" b="1"/>
               <a:t>:</a:t>
             </a:r>
             <a:r>
@@ -7325,7 +7477,7 @@
             </a:endParaRPr>
           </a:p>
           <a:p>
-            <a:pPr indent="-304800" lvl="0" marL="457200" rtl="0" algn="l">
+            <a:pPr marL="457200" lvl="0" indent="-304800" algn="l" rtl="0">
               <a:lnSpc>
                 <a:spcPct val="140000"/>
               </a:lnSpc>
@@ -7385,7 +7537,7 @@
             </a:endParaRPr>
           </a:p>
           <a:p>
-            <a:pPr indent="0" lvl="0" marL="0" rtl="0" algn="l">
+            <a:pPr marL="0" lvl="0" indent="0" algn="l" rtl="0">
               <a:spcBef>
                 <a:spcPts val="1000"/>
               </a:spcBef>
@@ -7406,7 +7558,7 @@
             <a:endParaRPr/>
           </a:p>
           <a:p>
-            <a:pPr indent="0" lvl="0" marL="0" rtl="0" algn="l">
+            <a:pPr marL="0" lvl="0" indent="0" algn="l" rtl="0">
               <a:spcBef>
                 <a:spcPts val="1600"/>
               </a:spcBef>
@@ -7422,7 +7574,7 @@
             <a:endParaRPr/>
           </a:p>
           <a:p>
-            <a:pPr indent="0" lvl="0" marL="0" rtl="0" algn="l">
+            <a:pPr marL="0" lvl="0" indent="0" algn="l" rtl="0">
               <a:spcBef>
                 <a:spcPts val="1600"/>
               </a:spcBef>
@@ -7431,9 +7583,6 @@
               </a:spcAft>
               <a:buNone/>
             </a:pPr>
-            <a:r>
-              <a:t/>
-            </a:r>
             <a:endParaRPr/>
           </a:p>
         </p:txBody>
@@ -7447,11 +7596,11 @@
 </file>
 
 <file path=ppt/slides/slide7.xml><?xml version="1.0" encoding="utf-8"?>
-<p:sld xmlns:a="http://schemas.openxmlformats.org/drawingml/2006/main" xmlns:r="http://schemas.openxmlformats.org/officeDocument/2006/relationships" xmlns:mc="http://schemas.openxmlformats.org/markup-compatibility/2006" xmlns:mv="urn:schemas-microsoft-com:mac:vml" xmlns:p="http://schemas.openxmlformats.org/presentationml/2006/main" xmlns:c="http://schemas.openxmlformats.org/drawingml/2006/chart" xmlns:dgm="http://schemas.openxmlformats.org/drawingml/2006/diagram" xmlns:o="urn:schemas-microsoft-com:office:office" xmlns:v="urn:schemas-microsoft-com:vml" xmlns:pvml="urn:schemas-microsoft-com:office:powerpoint" xmlns:com="http://schemas.openxmlformats.org/drawingml/2006/compatibility" xmlns:p14="http://schemas.microsoft.com/office/powerpoint/2010/main" xmlns:p15="http://schemas.microsoft.com/office/powerpoint/2012/main">
+<p:sld xmlns:a="http://schemas.openxmlformats.org/drawingml/2006/main" xmlns:r="http://schemas.openxmlformats.org/officeDocument/2006/relationships" xmlns:p="http://schemas.openxmlformats.org/presentationml/2006/main">
   <p:cSld>
     <p:spTree>
       <p:nvGrpSpPr>
-        <p:cNvPr id="92" name="Shape 92"/>
+        <p:cNvPr id="1" name="Shape 92"/>
         <p:cNvGrpSpPr/>
         <p:nvPr/>
       </p:nvGrpSpPr>
@@ -7466,7 +7615,9 @@
       <p:sp>
         <p:nvSpPr>
           <p:cNvPr id="93" name="Google Shape;93;p19"/>
-          <p:cNvSpPr txBox="1"/>
+          <p:cNvSpPr txBox="1">
+            <a:spLocks noGrp="1"/>
+          </p:cNvSpPr>
           <p:nvPr>
             <p:ph type="title"/>
           </p:nvPr>
@@ -7481,12 +7632,12 @@
           </a:prstGeom>
         </p:spPr>
         <p:txBody>
-          <a:bodyPr anchorCtr="0" anchor="t" bIns="91425" lIns="91425" spcFirstLastPara="1" rIns="91425" wrap="square" tIns="91425">
+          <a:bodyPr spcFirstLastPara="1" wrap="square" lIns="91425" tIns="91425" rIns="91425" bIns="91425" anchor="t" anchorCtr="0">
             <a:noAutofit/>
           </a:bodyPr>
           <a:lstStyle/>
           <a:p>
-            <a:pPr indent="0" lvl="0" marL="0" rtl="0" algn="l">
+            <a:pPr marL="0" lvl="0" indent="0" algn="l" rtl="0">
               <a:lnSpc>
                 <a:spcPct val="115000"/>
               </a:lnSpc>
@@ -7504,7 +7655,7 @@
               <a:buNone/>
             </a:pPr>
             <a:r>
-              <a:rPr b="1" lang="en-GB" sz="1800">
+              <a:rPr lang="en-GB" sz="1800" b="1">
                 <a:solidFill>
                   <a:schemeClr val="dk2"/>
                 </a:solidFill>
@@ -7520,7 +7671,7 @@
               <a:t>State pattern</a:t>
             </a:r>
             <a:r>
-              <a:rPr b="1" lang="en-GB" sz="1800">
+              <a:rPr lang="en-GB" sz="1800" b="1">
                 <a:solidFill>
                   <a:schemeClr val="dk2"/>
                 </a:solidFill>
@@ -7534,9 +7685,11 @@
       <p:sp>
         <p:nvSpPr>
           <p:cNvPr id="94" name="Google Shape;94;p19"/>
-          <p:cNvSpPr txBox="1"/>
+          <p:cNvSpPr txBox="1">
+            <a:spLocks noGrp="1"/>
+          </p:cNvSpPr>
           <p:nvPr>
-            <p:ph idx="1" type="body"/>
+            <p:ph type="body" idx="1"/>
           </p:nvPr>
         </p:nvSpPr>
         <p:spPr>
@@ -7549,12 +7702,12 @@
           </a:prstGeom>
         </p:spPr>
         <p:txBody>
-          <a:bodyPr anchorCtr="0" anchor="t" bIns="91425" lIns="91425" spcFirstLastPara="1" rIns="91425" wrap="square" tIns="91425">
+          <a:bodyPr spcFirstLastPara="1" wrap="square" lIns="91425" tIns="91425" rIns="91425" bIns="91425" anchor="t" anchorCtr="0">
             <a:noAutofit/>
           </a:bodyPr>
           <a:lstStyle/>
           <a:p>
-            <a:pPr indent="0" lvl="0" marL="0" rtl="0" algn="l">
+            <a:pPr marL="0" lvl="0" indent="0" algn="l" rtl="0">
               <a:spcBef>
                 <a:spcPts val="0"/>
               </a:spcBef>
@@ -7564,19 +7717,15 @@
               <a:buNone/>
             </a:pPr>
             <a:r>
-              <a:rPr b="1" lang="en-GB"/>
-              <a:t>Paid and Free </a:t>
-            </a:r>
-            <a:r>
-              <a:rPr b="1" lang="en-GB"/>
-              <a:t>Membership </a:t>
+              <a:rPr lang="en-GB" b="1"/>
+              <a:t>Paid and Free Membership </a:t>
             </a:r>
             <a:r>
               <a:rPr lang="en-GB"/>
               <a:t>(State pattern)</a:t>
             </a:r>
             <a:r>
-              <a:rPr b="1" lang="en-GB"/>
+              <a:rPr lang="en-GB" b="1"/>
               <a:t>:</a:t>
             </a:r>
             <a:r>
@@ -7586,7 +7735,7 @@
             <a:endParaRPr/>
           </a:p>
           <a:p>
-            <a:pPr indent="0" lvl="0" marL="0" rtl="0" algn="l">
+            <a:pPr marL="0" lvl="0" indent="0" algn="l" rtl="0">
               <a:spcBef>
                 <a:spcPts val="1600"/>
               </a:spcBef>
@@ -7601,7 +7750,7 @@
               <a:buNone/>
             </a:pPr>
             <a:r>
-              <a:rPr b="1" lang="en-GB"/>
+              <a:rPr lang="en-GB" b="1"/>
               <a:t>Calculation methods </a:t>
             </a:r>
             <a:r>
@@ -7609,7 +7758,7 @@
               <a:t>(Visitor pattern)</a:t>
             </a:r>
             <a:r>
-              <a:rPr b="1" lang="en-GB"/>
+              <a:rPr lang="en-GB" b="1"/>
               <a:t>:</a:t>
             </a:r>
             <a:r>
@@ -7619,7 +7768,7 @@
             <a:endParaRPr/>
           </a:p>
           <a:p>
-            <a:pPr indent="0" lvl="0" marL="0" rtl="0" algn="l">
+            <a:pPr marL="0" lvl="0" indent="0" algn="l" rtl="0">
               <a:spcBef>
                 <a:spcPts val="1600"/>
               </a:spcBef>
@@ -7634,7 +7783,7 @@
               <a:buNone/>
             </a:pPr>
             <a:r>
-              <a:rPr b="1" lang="en-GB"/>
+              <a:rPr lang="en-GB" b="1"/>
               <a:t>Bid status update </a:t>
             </a:r>
             <a:r>
@@ -7642,7 +7791,7 @@
               <a:t>(Observer pattern)</a:t>
             </a:r>
             <a:r>
-              <a:rPr b="1" lang="en-GB"/>
+              <a:rPr lang="en-GB" b="1"/>
               <a:t>:</a:t>
             </a:r>
             <a:r>
@@ -7662,11 +7811,11 @@
 </file>
 
 <file path=ppt/slides/slide8.xml><?xml version="1.0" encoding="utf-8"?>
-<p:sld xmlns:a="http://schemas.openxmlformats.org/drawingml/2006/main" xmlns:r="http://schemas.openxmlformats.org/officeDocument/2006/relationships" xmlns:mc="http://schemas.openxmlformats.org/markup-compatibility/2006" xmlns:mv="urn:schemas-microsoft-com:mac:vml" xmlns:p="http://schemas.openxmlformats.org/presentationml/2006/main" xmlns:c="http://schemas.openxmlformats.org/drawingml/2006/chart" xmlns:dgm="http://schemas.openxmlformats.org/drawingml/2006/diagram" xmlns:o="urn:schemas-microsoft-com:office:office" xmlns:v="urn:schemas-microsoft-com:vml" xmlns:pvml="urn:schemas-microsoft-com:office:powerpoint" xmlns:com="http://schemas.openxmlformats.org/drawingml/2006/compatibility" xmlns:p14="http://schemas.microsoft.com/office/powerpoint/2010/main" xmlns:p15="http://schemas.microsoft.com/office/powerpoint/2012/main">
+<p:sld xmlns:a="http://schemas.openxmlformats.org/drawingml/2006/main" xmlns:r="http://schemas.openxmlformats.org/officeDocument/2006/relationships" xmlns:p="http://schemas.openxmlformats.org/presentationml/2006/main">
   <p:cSld>
     <p:spTree>
       <p:nvGrpSpPr>
-        <p:cNvPr id="98" name="Shape 98"/>
+        <p:cNvPr id="1" name="Shape 98"/>
         <p:cNvGrpSpPr/>
         <p:nvPr/>
       </p:nvGrpSpPr>
@@ -7681,7 +7830,9 @@
       <p:sp>
         <p:nvSpPr>
           <p:cNvPr id="99" name="Google Shape;99;p20"/>
-          <p:cNvSpPr txBox="1"/>
+          <p:cNvSpPr txBox="1">
+            <a:spLocks noGrp="1"/>
+          </p:cNvSpPr>
           <p:nvPr>
             <p:ph type="title"/>
           </p:nvPr>
@@ -7696,12 +7847,12 @@
           </a:prstGeom>
         </p:spPr>
         <p:txBody>
-          <a:bodyPr anchorCtr="0" anchor="t" bIns="91425" lIns="91425" spcFirstLastPara="1" rIns="91425" wrap="square" tIns="91425">
+          <a:bodyPr spcFirstLastPara="1" wrap="square" lIns="91425" tIns="91425" rIns="91425" bIns="91425" anchor="t" anchorCtr="0">
             <a:noAutofit/>
           </a:bodyPr>
           <a:lstStyle/>
           <a:p>
-            <a:pPr indent="0" lvl="0" marL="0" rtl="0" algn="l">
+            <a:pPr marL="0" lvl="0" indent="0" algn="l" rtl="0">
               <a:spcBef>
                 <a:spcPts val="0"/>
               </a:spcBef>
@@ -7721,9 +7872,11 @@
       <p:sp>
         <p:nvSpPr>
           <p:cNvPr id="100" name="Google Shape;100;p20"/>
-          <p:cNvSpPr txBox="1"/>
+          <p:cNvSpPr txBox="1">
+            <a:spLocks noGrp="1"/>
+          </p:cNvSpPr>
           <p:nvPr>
-            <p:ph idx="1" type="body"/>
+            <p:ph type="body" idx="1"/>
           </p:nvPr>
         </p:nvSpPr>
         <p:spPr>
@@ -7736,12 +7889,12 @@
           </a:prstGeom>
         </p:spPr>
         <p:txBody>
-          <a:bodyPr anchorCtr="0" anchor="t" bIns="91425" lIns="91425" spcFirstLastPara="1" rIns="91425" wrap="square" tIns="91425">
+          <a:bodyPr spcFirstLastPara="1" wrap="square" lIns="91425" tIns="91425" rIns="91425" bIns="91425" anchor="t" anchorCtr="0">
             <a:noAutofit/>
           </a:bodyPr>
           <a:lstStyle/>
           <a:p>
-            <a:pPr indent="0" lvl="0" marL="0" rtl="0" algn="l">
+            <a:pPr marL="0" lvl="0" indent="0" algn="l" rtl="0">
               <a:spcBef>
                 <a:spcPts val="0"/>
               </a:spcBef>
@@ -7751,7 +7904,7 @@
               <a:buNone/>
             </a:pPr>
             <a:r>
-              <a:rPr b="1" lang="en-GB"/>
+              <a:rPr lang="en-GB" b="1"/>
               <a:t>Item and User </a:t>
             </a:r>
             <a:r>
@@ -7759,25 +7912,17 @@
               <a:t>(Factory method, Singleton pattern)</a:t>
             </a:r>
             <a:r>
-              <a:rPr b="1" lang="en-GB"/>
+              <a:rPr lang="en-GB" b="1"/>
               <a:t>:</a:t>
             </a:r>
             <a:r>
               <a:rPr lang="en-GB"/>
-              <a:t> We used factory method for creating a new User and </a:t>
-            </a:r>
-            <a:r>
-              <a:rPr lang="en-GB"/>
-              <a:t>Auction Item</a:t>
-            </a:r>
-            <a:r>
-              <a:rPr lang="en-GB"/>
-              <a:t>.</a:t>
+              <a:t> We used factory method for creating a new User and Auction Item.</a:t>
             </a:r>
             <a:endParaRPr/>
           </a:p>
           <a:p>
-            <a:pPr indent="0" lvl="0" marL="0" rtl="0" algn="l">
+            <a:pPr marL="0" lvl="0" indent="0" algn="l" rtl="0">
               <a:spcBef>
                 <a:spcPts val="1600"/>
               </a:spcBef>
@@ -7787,7 +7932,7 @@
               <a:buNone/>
             </a:pPr>
             <a:r>
-              <a:rPr b="1" lang="en-GB"/>
+              <a:rPr lang="en-GB" b="1"/>
               <a:t>Item Iterator </a:t>
             </a:r>
             <a:r>
@@ -7795,7 +7940,7 @@
               <a:t>(Iterator pattern)</a:t>
             </a:r>
             <a:r>
-              <a:rPr b="1" lang="en-GB"/>
+              <a:rPr lang="en-GB" b="1"/>
               <a:t>:</a:t>
             </a:r>
             <a:r>
@@ -7805,7 +7950,7 @@
             <a:endParaRPr/>
           </a:p>
           <a:p>
-            <a:pPr indent="0" lvl="0" marL="0" rtl="0" algn="l">
+            <a:pPr marL="0" lvl="0" indent="0" algn="l" rtl="0">
               <a:spcBef>
                 <a:spcPts val="1600"/>
               </a:spcBef>
@@ -7814,13 +7959,10 @@
               </a:spcAft>
               <a:buNone/>
             </a:pPr>
-            <a:r>
-              <a:t/>
-            </a:r>
             <a:endParaRPr/>
           </a:p>
           <a:p>
-            <a:pPr indent="0" lvl="0" marL="0" rtl="0" algn="l">
+            <a:pPr marL="0" lvl="0" indent="0" algn="l" rtl="0">
               <a:spcBef>
                 <a:spcPts val="1600"/>
               </a:spcBef>
@@ -7836,7 +7978,7 @@
             <a:endParaRPr b="1"/>
           </a:p>
           <a:p>
-            <a:pPr indent="0" lvl="0" marL="0" rtl="0" algn="l">
+            <a:pPr marL="0" lvl="0" indent="0" algn="l" rtl="0">
               <a:spcBef>
                 <a:spcPts val="1600"/>
               </a:spcBef>
@@ -7852,7 +7994,7 @@
             <a:endParaRPr/>
           </a:p>
           <a:p>
-            <a:pPr indent="0" lvl="0" marL="0" rtl="0" algn="l">
+            <a:pPr marL="0" lvl="0" indent="0" algn="l" rtl="0">
               <a:spcBef>
                 <a:spcPts val="1600"/>
               </a:spcBef>
@@ -7861,9 +8003,6 @@
               </a:spcAft>
               <a:buNone/>
             </a:pPr>
-            <a:r>
-              <a:t/>
-            </a:r>
             <a:endParaRPr/>
           </a:p>
         </p:txBody>
@@ -7877,11 +8016,11 @@
 </file>
 
 <file path=ppt/slides/slide9.xml><?xml version="1.0" encoding="utf-8"?>
-<p:sld xmlns:a="http://schemas.openxmlformats.org/drawingml/2006/main" xmlns:r="http://schemas.openxmlformats.org/officeDocument/2006/relationships" xmlns:mc="http://schemas.openxmlformats.org/markup-compatibility/2006" xmlns:mv="urn:schemas-microsoft-com:mac:vml" xmlns:p="http://schemas.openxmlformats.org/presentationml/2006/main" xmlns:c="http://schemas.openxmlformats.org/drawingml/2006/chart" xmlns:dgm="http://schemas.openxmlformats.org/drawingml/2006/diagram" xmlns:o="urn:schemas-microsoft-com:office:office" xmlns:v="urn:schemas-microsoft-com:vml" xmlns:pvml="urn:schemas-microsoft-com:office:powerpoint" xmlns:com="http://schemas.openxmlformats.org/drawingml/2006/compatibility" xmlns:p14="http://schemas.microsoft.com/office/powerpoint/2010/main" xmlns:p15="http://schemas.microsoft.com/office/powerpoint/2012/main">
+<p:sld xmlns:a="http://schemas.openxmlformats.org/drawingml/2006/main" xmlns:r="http://schemas.openxmlformats.org/officeDocument/2006/relationships" xmlns:p="http://schemas.openxmlformats.org/presentationml/2006/main">
   <p:cSld>
     <p:spTree>
       <p:nvGrpSpPr>
-        <p:cNvPr id="104" name="Shape 104"/>
+        <p:cNvPr id="1" name="Shape 104"/>
         <p:cNvGrpSpPr/>
         <p:nvPr/>
       </p:nvGrpSpPr>
@@ -7896,7 +8035,9 @@
       <p:sp>
         <p:nvSpPr>
           <p:cNvPr id="105" name="Google Shape;105;p21"/>
-          <p:cNvSpPr txBox="1"/>
+          <p:cNvSpPr txBox="1">
+            <a:spLocks noGrp="1"/>
+          </p:cNvSpPr>
           <p:nvPr>
             <p:ph type="title"/>
           </p:nvPr>
@@ -7911,12 +8052,12 @@
           </a:prstGeom>
         </p:spPr>
         <p:txBody>
-          <a:bodyPr anchorCtr="0" anchor="t" bIns="91425" lIns="91425" spcFirstLastPara="1" rIns="91425" wrap="square" tIns="91425">
+          <a:bodyPr spcFirstLastPara="1" wrap="square" lIns="91425" tIns="91425" rIns="91425" bIns="91425" anchor="t" anchorCtr="0">
             <a:noAutofit/>
           </a:bodyPr>
           <a:lstStyle/>
           <a:p>
-            <a:pPr indent="0" lvl="0" marL="0" rtl="0" algn="l">
+            <a:pPr marL="0" lvl="0" indent="0" algn="l" rtl="0">
               <a:spcBef>
                 <a:spcPts val="0"/>
               </a:spcBef>
@@ -7927,11 +8068,7 @@
             </a:pPr>
             <a:r>
               <a:rPr lang="en-GB"/>
-              <a:t>Implementation Advice </a:t>
-            </a:r>
-            <a:r>
-              <a:rPr lang="en-GB"/>
-              <a:t> </a:t>
+              <a:t>Implementation Advice  </a:t>
             </a:r>
             <a:endParaRPr/>
           </a:p>
@@ -7940,9 +8077,11 @@
       <p:sp>
         <p:nvSpPr>
           <p:cNvPr id="106" name="Google Shape;106;p21"/>
-          <p:cNvSpPr txBox="1"/>
+          <p:cNvSpPr txBox="1">
+            <a:spLocks noGrp="1"/>
+          </p:cNvSpPr>
           <p:nvPr>
-            <p:ph idx="1" type="body"/>
+            <p:ph type="body" idx="1"/>
           </p:nvPr>
         </p:nvSpPr>
         <p:spPr>
@@ -7955,12 +8094,12 @@
           </a:prstGeom>
         </p:spPr>
         <p:txBody>
-          <a:bodyPr anchorCtr="0" anchor="t" bIns="91425" lIns="91425" spcFirstLastPara="1" rIns="91425" wrap="square" tIns="91425">
+          <a:bodyPr spcFirstLastPara="1" wrap="square" lIns="91425" tIns="91425" rIns="91425" bIns="91425" anchor="t" anchorCtr="0">
             <a:noAutofit/>
           </a:bodyPr>
           <a:lstStyle/>
           <a:p>
-            <a:pPr indent="0" lvl="0" marL="0" rtl="0" algn="l">
+            <a:pPr marL="0" lvl="0" indent="0" algn="l" rtl="0">
               <a:spcBef>
                 <a:spcPts val="0"/>
               </a:spcBef>
@@ -7970,25 +8109,17 @@
               <a:buNone/>
             </a:pPr>
             <a:r>
-              <a:rPr b="1" lang="en-GB"/>
+              <a:rPr lang="en-GB" b="1"/>
               <a:t>Default usage:</a:t>
             </a:r>
             <a:r>
               <a:rPr lang="en-GB"/>
-              <a:t> </a:t>
-            </a:r>
-            <a:r>
-              <a:rPr lang="en-GB"/>
-              <a:t>The following i</a:t>
-            </a:r>
-            <a:r>
-              <a:rPr lang="en-GB"/>
-              <a:t>nterfaces are must be implemented:</a:t>
+              <a:t> The following interfaces are must be implemented:</a:t>
             </a:r>
             <a:endParaRPr/>
           </a:p>
           <a:p>
-            <a:pPr indent="-342900" lvl="0" marL="457200" rtl="0" algn="l">
+            <a:pPr marL="457200" lvl="0" indent="-342900" algn="l" rtl="0">
               <a:spcBef>
                 <a:spcPts val="1600"/>
               </a:spcBef>
@@ -8005,7 +8136,7 @@
             <a:endParaRPr/>
           </a:p>
           <a:p>
-            <a:pPr indent="-342900" lvl="0" marL="457200" rtl="0" algn="l">
+            <a:pPr marL="457200" lvl="0" indent="-342900" algn="l" rtl="0">
               <a:spcBef>
                 <a:spcPts val="0"/>
               </a:spcBef>
@@ -8022,7 +8153,7 @@
             <a:endParaRPr/>
           </a:p>
           <a:p>
-            <a:pPr indent="0" lvl="0" marL="0" rtl="0" algn="l">
+            <a:pPr marL="0" lvl="0" indent="0" algn="l" rtl="0">
               <a:spcBef>
                 <a:spcPts val="1600"/>
               </a:spcBef>
@@ -8036,7 +8167,7 @@
               <a:t>App developer must create an Auction instance of selected auction type and </a:t>
             </a:r>
             <a:r>
-              <a:rPr b="1" lang="en-GB"/>
+              <a:rPr lang="en-GB" b="1"/>
               <a:t>ready to use.</a:t>
             </a:r>
             <a:r>
@@ -8046,7 +8177,7 @@
             <a:endParaRPr/>
           </a:p>
           <a:p>
-            <a:pPr indent="0" lvl="0" marL="0" rtl="0" algn="l">
+            <a:pPr marL="0" lvl="0" indent="0" algn="l" rtl="0">
               <a:spcBef>
                 <a:spcPts val="1600"/>
               </a:spcBef>
@@ -8062,7 +8193,7 @@
             <a:endParaRPr/>
           </a:p>
           <a:p>
-            <a:pPr indent="0" lvl="0" marL="0" rtl="0" algn="l">
+            <a:pPr marL="0" lvl="0" indent="0" algn="l" rtl="0">
               <a:spcBef>
                 <a:spcPts val="1600"/>
               </a:spcBef>
@@ -8076,13 +8207,10 @@
               <a:buFont typeface="Arial"/>
               <a:buNone/>
             </a:pPr>
-            <a:r>
-              <a:t/>
-            </a:r>
             <a:endParaRPr/>
           </a:p>
           <a:p>
-            <a:pPr indent="0" lvl="0" marL="0" rtl="0" algn="l">
+            <a:pPr marL="0" lvl="0" indent="0" algn="l" rtl="0">
               <a:spcBef>
                 <a:spcPts val="1600"/>
               </a:spcBef>
@@ -8096,13 +8224,10 @@
               <a:buFont typeface="Arial"/>
               <a:buNone/>
             </a:pPr>
-            <a:r>
-              <a:t/>
-            </a:r>
             <a:endParaRPr/>
           </a:p>
           <a:p>
-            <a:pPr indent="0" lvl="0" marL="0" rtl="0" algn="l">
+            <a:pPr marL="0" lvl="0" indent="0" algn="l" rtl="0">
               <a:spcBef>
                 <a:spcPts val="1600"/>
               </a:spcBef>
@@ -8111,9 +8236,6 @@
               </a:spcAft>
               <a:buNone/>
             </a:pPr>
-            <a:r>
-              <a:t/>
-            </a:r>
             <a:endParaRPr/>
           </a:p>
         </p:txBody>
@@ -8127,7 +8249,7 @@
 </file>
 
 <file path=ppt/theme/theme1.xml><?xml version="1.0" encoding="utf-8"?>
-<a:theme xmlns:a="http://schemas.openxmlformats.org/drawingml/2006/main" xmlns:r="http://schemas.openxmlformats.org/officeDocument/2006/relationships" name="Simple Light">
+<a:theme xmlns:a="http://schemas.openxmlformats.org/drawingml/2006/main" name="Simple Light">
   <a:themeElements>
     <a:clrScheme name="Simple Light">
       <a:dk1>
@@ -8402,11 +8524,13 @@
       </a:bgFillStyleLst>
     </a:fmtScheme>
   </a:themeElements>
+  <a:objectDefaults/>
+  <a:extraClrSchemeLst/>
 </a:theme>
 </file>
 
 <file path=ppt/theme/theme2.xml><?xml version="1.0" encoding="utf-8"?>
-<a:theme xmlns:a="http://schemas.openxmlformats.org/drawingml/2006/main" xmlns:r="http://schemas.openxmlformats.org/officeDocument/2006/relationships">
+<a:theme xmlns:a="http://schemas.openxmlformats.org/drawingml/2006/main">
   <a:themeElements>
     <a:clrScheme name="Default">
       <a:dk1>
@@ -8681,5 +8805,7 @@
       </a:bgFillStyleLst>
     </a:fmtScheme>
   </a:themeElements>
+  <a:objectDefaults/>
+  <a:extraClrSchemeLst/>
 </a:theme>
 </file>
</xml_diff>